<commit_message>
almost completed not tested
</commit_message>
<xml_diff>
--- a/RTLinf/propuesta_RTLinf.pptx
+++ b/RTLinf/propuesta_RTLinf.pptx
@@ -133,7 +133,7 @@
           <p:cNvPr id="2" name="Título 1">
             <a:extLst>
               <a:ext uri="{FF2B5EF4-FFF2-40B4-BE49-F238E27FC236}">
-                <a16:creationId xmlns:a16="http://schemas.microsoft.com/office/drawing/2014/main" id="{0C5AC8F7-E4E5-6C62-8FA1-E819A2B6EBCF}"/>
+                <a16:creationId xmlns:a16="http://schemas.microsoft.com/office/drawing/2014/main" xmlns="" id="{0C5AC8F7-E4E5-6C62-8FA1-E819A2B6EBCF}"/>
               </a:ext>
             </a:extLst>
           </p:cNvPr>
@@ -170,7 +170,7 @@
           <p:cNvPr id="3" name="Subtítulo 2">
             <a:extLst>
               <a:ext uri="{FF2B5EF4-FFF2-40B4-BE49-F238E27FC236}">
-                <a16:creationId xmlns:a16="http://schemas.microsoft.com/office/drawing/2014/main" id="{83D6B6F0-AD24-5206-94D6-69AC809B8252}"/>
+                <a16:creationId xmlns:a16="http://schemas.microsoft.com/office/drawing/2014/main" xmlns="" id="{83D6B6F0-AD24-5206-94D6-69AC809B8252}"/>
               </a:ext>
             </a:extLst>
           </p:cNvPr>
@@ -240,7 +240,7 @@
           <p:cNvPr id="4" name="Marcador de fecha 3">
             <a:extLst>
               <a:ext uri="{FF2B5EF4-FFF2-40B4-BE49-F238E27FC236}">
-                <a16:creationId xmlns:a16="http://schemas.microsoft.com/office/drawing/2014/main" id="{A4C048E9-672D-7C3A-1577-F19AEA4650BC}"/>
+                <a16:creationId xmlns:a16="http://schemas.microsoft.com/office/drawing/2014/main" xmlns="" id="{A4C048E9-672D-7C3A-1577-F19AEA4650BC}"/>
               </a:ext>
             </a:extLst>
           </p:cNvPr>
@@ -257,7 +257,7 @@
           <a:lstStyle/>
           <a:p>
             <a:fld id="{21FC31BB-37F9-9647-B0AE-D6F14E08AAAD}" type="datetimeFigureOut">
-              <a:t>26/1/24</a:t>
+              <a:t>4/2/24</a:t>
             </a:fld>
             <a:endParaRPr lang="es-ES"/>
           </a:p>
@@ -268,7 +268,7 @@
           <p:cNvPr id="5" name="Marcador de pie de página 4">
             <a:extLst>
               <a:ext uri="{FF2B5EF4-FFF2-40B4-BE49-F238E27FC236}">
-                <a16:creationId xmlns:a16="http://schemas.microsoft.com/office/drawing/2014/main" id="{78FFAACF-9F3C-9AFA-3366-91BDE8D65CF7}"/>
+                <a16:creationId xmlns:a16="http://schemas.microsoft.com/office/drawing/2014/main" xmlns="" id="{78FFAACF-9F3C-9AFA-3366-91BDE8D65CF7}"/>
               </a:ext>
             </a:extLst>
           </p:cNvPr>
@@ -293,7 +293,7 @@
           <p:cNvPr id="6" name="Marcador de número de diapositiva 5">
             <a:extLst>
               <a:ext uri="{FF2B5EF4-FFF2-40B4-BE49-F238E27FC236}">
-                <a16:creationId xmlns:a16="http://schemas.microsoft.com/office/drawing/2014/main" id="{913D8257-8BFA-BA5F-CAC4-ABA68F00E89C}"/>
+                <a16:creationId xmlns:a16="http://schemas.microsoft.com/office/drawing/2014/main" xmlns="" id="{913D8257-8BFA-BA5F-CAC4-ABA68F00E89C}"/>
               </a:ext>
             </a:extLst>
           </p:cNvPr>
@@ -310,7 +310,7 @@
           <a:lstStyle/>
           <a:p>
             <a:fld id="{759B9B3A-CA72-B441-95B9-AA6C177802C6}" type="slidenum">
-              <a:t>‹Nº›</a:t>
+              <a:t>‹Nr.›</a:t>
             </a:fld>
             <a:endParaRPr lang="es-ES"/>
           </a:p>
@@ -351,7 +351,7 @@
           <p:cNvPr id="2" name="Título 1">
             <a:extLst>
               <a:ext uri="{FF2B5EF4-FFF2-40B4-BE49-F238E27FC236}">
-                <a16:creationId xmlns:a16="http://schemas.microsoft.com/office/drawing/2014/main" id="{6C60B509-7186-D099-80AC-849368AD1B3D}"/>
+                <a16:creationId xmlns:a16="http://schemas.microsoft.com/office/drawing/2014/main" xmlns="" id="{6C60B509-7186-D099-80AC-849368AD1B3D}"/>
               </a:ext>
             </a:extLst>
           </p:cNvPr>
@@ -379,7 +379,7 @@
           <p:cNvPr id="3" name="Marcador de texto vertical 2">
             <a:extLst>
               <a:ext uri="{FF2B5EF4-FFF2-40B4-BE49-F238E27FC236}">
-                <a16:creationId xmlns:a16="http://schemas.microsoft.com/office/drawing/2014/main" id="{F4E56C1A-023D-3035-D53D-EBE76EC64B5D}"/>
+                <a16:creationId xmlns:a16="http://schemas.microsoft.com/office/drawing/2014/main" xmlns="" id="{F4E56C1A-023D-3035-D53D-EBE76EC64B5D}"/>
               </a:ext>
             </a:extLst>
           </p:cNvPr>
@@ -436,7 +436,7 @@
           <p:cNvPr id="4" name="Marcador de fecha 3">
             <a:extLst>
               <a:ext uri="{FF2B5EF4-FFF2-40B4-BE49-F238E27FC236}">
-                <a16:creationId xmlns:a16="http://schemas.microsoft.com/office/drawing/2014/main" id="{2B2D3D09-DE34-7393-56CF-F38A10FD3A94}"/>
+                <a16:creationId xmlns:a16="http://schemas.microsoft.com/office/drawing/2014/main" xmlns="" id="{2B2D3D09-DE34-7393-56CF-F38A10FD3A94}"/>
               </a:ext>
             </a:extLst>
           </p:cNvPr>
@@ -453,7 +453,7 @@
           <a:lstStyle/>
           <a:p>
             <a:fld id="{21FC31BB-37F9-9647-B0AE-D6F14E08AAAD}" type="datetimeFigureOut">
-              <a:t>26/1/24</a:t>
+              <a:t>4/2/24</a:t>
             </a:fld>
             <a:endParaRPr lang="es-ES"/>
           </a:p>
@@ -464,7 +464,7 @@
           <p:cNvPr id="5" name="Marcador de pie de página 4">
             <a:extLst>
               <a:ext uri="{FF2B5EF4-FFF2-40B4-BE49-F238E27FC236}">
-                <a16:creationId xmlns:a16="http://schemas.microsoft.com/office/drawing/2014/main" id="{0E99F21B-0AAD-29F4-4B19-19974D4B68DA}"/>
+                <a16:creationId xmlns:a16="http://schemas.microsoft.com/office/drawing/2014/main" xmlns="" id="{0E99F21B-0AAD-29F4-4B19-19974D4B68DA}"/>
               </a:ext>
             </a:extLst>
           </p:cNvPr>
@@ -489,7 +489,7 @@
           <p:cNvPr id="6" name="Marcador de número de diapositiva 5">
             <a:extLst>
               <a:ext uri="{FF2B5EF4-FFF2-40B4-BE49-F238E27FC236}">
-                <a16:creationId xmlns:a16="http://schemas.microsoft.com/office/drawing/2014/main" id="{1C653953-7400-9EBC-FA1A-035FA937D154}"/>
+                <a16:creationId xmlns:a16="http://schemas.microsoft.com/office/drawing/2014/main" xmlns="" id="{1C653953-7400-9EBC-FA1A-035FA937D154}"/>
               </a:ext>
             </a:extLst>
           </p:cNvPr>
@@ -506,7 +506,7 @@
           <a:lstStyle/>
           <a:p>
             <a:fld id="{759B9B3A-CA72-B441-95B9-AA6C177802C6}" type="slidenum">
-              <a:t>‹Nº›</a:t>
+              <a:t>‹Nr.›</a:t>
             </a:fld>
             <a:endParaRPr lang="es-ES"/>
           </a:p>
@@ -547,7 +547,7 @@
           <p:cNvPr id="2" name="Título vertical 1">
             <a:extLst>
               <a:ext uri="{FF2B5EF4-FFF2-40B4-BE49-F238E27FC236}">
-                <a16:creationId xmlns:a16="http://schemas.microsoft.com/office/drawing/2014/main" id="{B05BFFA0-F411-BA16-994F-B392719E4109}"/>
+                <a16:creationId xmlns:a16="http://schemas.microsoft.com/office/drawing/2014/main" xmlns="" id="{B05BFFA0-F411-BA16-994F-B392719E4109}"/>
               </a:ext>
             </a:extLst>
           </p:cNvPr>
@@ -580,7 +580,7 @@
           <p:cNvPr id="3" name="Marcador de texto vertical 2">
             <a:extLst>
               <a:ext uri="{FF2B5EF4-FFF2-40B4-BE49-F238E27FC236}">
-                <a16:creationId xmlns:a16="http://schemas.microsoft.com/office/drawing/2014/main" id="{312360A6-91EC-82D1-7946-159365116CAD}"/>
+                <a16:creationId xmlns:a16="http://schemas.microsoft.com/office/drawing/2014/main" xmlns="" id="{312360A6-91EC-82D1-7946-159365116CAD}"/>
               </a:ext>
             </a:extLst>
           </p:cNvPr>
@@ -642,7 +642,7 @@
           <p:cNvPr id="4" name="Marcador de fecha 3">
             <a:extLst>
               <a:ext uri="{FF2B5EF4-FFF2-40B4-BE49-F238E27FC236}">
-                <a16:creationId xmlns:a16="http://schemas.microsoft.com/office/drawing/2014/main" id="{2D9D9BBE-43DE-1F7E-BB2E-F968155BB54C}"/>
+                <a16:creationId xmlns:a16="http://schemas.microsoft.com/office/drawing/2014/main" xmlns="" id="{2D9D9BBE-43DE-1F7E-BB2E-F968155BB54C}"/>
               </a:ext>
             </a:extLst>
           </p:cNvPr>
@@ -659,7 +659,7 @@
           <a:lstStyle/>
           <a:p>
             <a:fld id="{21FC31BB-37F9-9647-B0AE-D6F14E08AAAD}" type="datetimeFigureOut">
-              <a:t>26/1/24</a:t>
+              <a:t>4/2/24</a:t>
             </a:fld>
             <a:endParaRPr lang="es-ES"/>
           </a:p>
@@ -670,7 +670,7 @@
           <p:cNvPr id="5" name="Marcador de pie de página 4">
             <a:extLst>
               <a:ext uri="{FF2B5EF4-FFF2-40B4-BE49-F238E27FC236}">
-                <a16:creationId xmlns:a16="http://schemas.microsoft.com/office/drawing/2014/main" id="{253C40D6-5B29-7E22-7375-F3191BE35651}"/>
+                <a16:creationId xmlns:a16="http://schemas.microsoft.com/office/drawing/2014/main" xmlns="" id="{253C40D6-5B29-7E22-7375-F3191BE35651}"/>
               </a:ext>
             </a:extLst>
           </p:cNvPr>
@@ -695,7 +695,7 @@
           <p:cNvPr id="6" name="Marcador de número de diapositiva 5">
             <a:extLst>
               <a:ext uri="{FF2B5EF4-FFF2-40B4-BE49-F238E27FC236}">
-                <a16:creationId xmlns:a16="http://schemas.microsoft.com/office/drawing/2014/main" id="{12DAE6F3-0F4D-C1C4-85BF-38B46239BC6E}"/>
+                <a16:creationId xmlns:a16="http://schemas.microsoft.com/office/drawing/2014/main" xmlns="" id="{12DAE6F3-0F4D-C1C4-85BF-38B46239BC6E}"/>
               </a:ext>
             </a:extLst>
           </p:cNvPr>
@@ -712,7 +712,7 @@
           <a:lstStyle/>
           <a:p>
             <a:fld id="{759B9B3A-CA72-B441-95B9-AA6C177802C6}" type="slidenum">
-              <a:t>‹Nº›</a:t>
+              <a:t>‹Nr.›</a:t>
             </a:fld>
             <a:endParaRPr lang="es-ES"/>
           </a:p>
@@ -753,7 +753,7 @@
           <p:cNvPr id="2" name="Título 1">
             <a:extLst>
               <a:ext uri="{FF2B5EF4-FFF2-40B4-BE49-F238E27FC236}">
-                <a16:creationId xmlns:a16="http://schemas.microsoft.com/office/drawing/2014/main" id="{88B7C436-0FE6-1264-9FC9-07688D884308}"/>
+                <a16:creationId xmlns:a16="http://schemas.microsoft.com/office/drawing/2014/main" xmlns="" id="{88B7C436-0FE6-1264-9FC9-07688D884308}"/>
               </a:ext>
             </a:extLst>
           </p:cNvPr>
@@ -781,7 +781,7 @@
           <p:cNvPr id="3" name="Marcador de contenido 2">
             <a:extLst>
               <a:ext uri="{FF2B5EF4-FFF2-40B4-BE49-F238E27FC236}">
-                <a16:creationId xmlns:a16="http://schemas.microsoft.com/office/drawing/2014/main" id="{71140213-401C-4862-9DC3-1E5034AA740B}"/>
+                <a16:creationId xmlns:a16="http://schemas.microsoft.com/office/drawing/2014/main" xmlns="" id="{71140213-401C-4862-9DC3-1E5034AA740B}"/>
               </a:ext>
             </a:extLst>
           </p:cNvPr>
@@ -838,7 +838,7 @@
           <p:cNvPr id="4" name="Marcador de fecha 3">
             <a:extLst>
               <a:ext uri="{FF2B5EF4-FFF2-40B4-BE49-F238E27FC236}">
-                <a16:creationId xmlns:a16="http://schemas.microsoft.com/office/drawing/2014/main" id="{BA34BB1F-47E7-4E64-C4DE-BCB974035B97}"/>
+                <a16:creationId xmlns:a16="http://schemas.microsoft.com/office/drawing/2014/main" xmlns="" id="{BA34BB1F-47E7-4E64-C4DE-BCB974035B97}"/>
               </a:ext>
             </a:extLst>
           </p:cNvPr>
@@ -855,7 +855,7 @@
           <a:lstStyle/>
           <a:p>
             <a:fld id="{21FC31BB-37F9-9647-B0AE-D6F14E08AAAD}" type="datetimeFigureOut">
-              <a:t>26/1/24</a:t>
+              <a:t>4/2/24</a:t>
             </a:fld>
             <a:endParaRPr lang="es-ES"/>
           </a:p>
@@ -866,7 +866,7 @@
           <p:cNvPr id="5" name="Marcador de pie de página 4">
             <a:extLst>
               <a:ext uri="{FF2B5EF4-FFF2-40B4-BE49-F238E27FC236}">
-                <a16:creationId xmlns:a16="http://schemas.microsoft.com/office/drawing/2014/main" id="{92667E4C-B501-6B5B-F4A2-4E2614408471}"/>
+                <a16:creationId xmlns:a16="http://schemas.microsoft.com/office/drawing/2014/main" xmlns="" id="{92667E4C-B501-6B5B-F4A2-4E2614408471}"/>
               </a:ext>
             </a:extLst>
           </p:cNvPr>
@@ -891,7 +891,7 @@
           <p:cNvPr id="6" name="Marcador de número de diapositiva 5">
             <a:extLst>
               <a:ext uri="{FF2B5EF4-FFF2-40B4-BE49-F238E27FC236}">
-                <a16:creationId xmlns:a16="http://schemas.microsoft.com/office/drawing/2014/main" id="{2572E61C-D674-55EE-2723-787CEE5470D2}"/>
+                <a16:creationId xmlns:a16="http://schemas.microsoft.com/office/drawing/2014/main" xmlns="" id="{2572E61C-D674-55EE-2723-787CEE5470D2}"/>
               </a:ext>
             </a:extLst>
           </p:cNvPr>
@@ -908,7 +908,7 @@
           <a:lstStyle/>
           <a:p>
             <a:fld id="{759B9B3A-CA72-B441-95B9-AA6C177802C6}" type="slidenum">
-              <a:t>‹Nº›</a:t>
+              <a:t>‹Nr.›</a:t>
             </a:fld>
             <a:endParaRPr lang="es-ES"/>
           </a:p>
@@ -949,7 +949,7 @@
           <p:cNvPr id="2" name="Título 1">
             <a:extLst>
               <a:ext uri="{FF2B5EF4-FFF2-40B4-BE49-F238E27FC236}">
-                <a16:creationId xmlns:a16="http://schemas.microsoft.com/office/drawing/2014/main" id="{6202D6D2-8FB7-CB38-663E-9E1D7891E861}"/>
+                <a16:creationId xmlns:a16="http://schemas.microsoft.com/office/drawing/2014/main" xmlns="" id="{6202D6D2-8FB7-CB38-663E-9E1D7891E861}"/>
               </a:ext>
             </a:extLst>
           </p:cNvPr>
@@ -986,7 +986,7 @@
           <p:cNvPr id="3" name="Marcador de texto 2">
             <a:extLst>
               <a:ext uri="{FF2B5EF4-FFF2-40B4-BE49-F238E27FC236}">
-                <a16:creationId xmlns:a16="http://schemas.microsoft.com/office/drawing/2014/main" id="{34EBF7C1-31D8-768A-29C2-940E7B1BDE6C}"/>
+                <a16:creationId xmlns:a16="http://schemas.microsoft.com/office/drawing/2014/main" xmlns="" id="{34EBF7C1-31D8-768A-29C2-940E7B1BDE6C}"/>
               </a:ext>
             </a:extLst>
           </p:cNvPr>
@@ -1111,7 +1111,7 @@
           <p:cNvPr id="4" name="Marcador de fecha 3">
             <a:extLst>
               <a:ext uri="{FF2B5EF4-FFF2-40B4-BE49-F238E27FC236}">
-                <a16:creationId xmlns:a16="http://schemas.microsoft.com/office/drawing/2014/main" id="{24B8E73D-4FA3-8465-8FC3-F29EBFA07C38}"/>
+                <a16:creationId xmlns:a16="http://schemas.microsoft.com/office/drawing/2014/main" xmlns="" id="{24B8E73D-4FA3-8465-8FC3-F29EBFA07C38}"/>
               </a:ext>
             </a:extLst>
           </p:cNvPr>
@@ -1128,7 +1128,7 @@
           <a:lstStyle/>
           <a:p>
             <a:fld id="{21FC31BB-37F9-9647-B0AE-D6F14E08AAAD}" type="datetimeFigureOut">
-              <a:t>26/1/24</a:t>
+              <a:t>4/2/24</a:t>
             </a:fld>
             <a:endParaRPr lang="es-ES"/>
           </a:p>
@@ -1139,7 +1139,7 @@
           <p:cNvPr id="5" name="Marcador de pie de página 4">
             <a:extLst>
               <a:ext uri="{FF2B5EF4-FFF2-40B4-BE49-F238E27FC236}">
-                <a16:creationId xmlns:a16="http://schemas.microsoft.com/office/drawing/2014/main" id="{F2691A8B-4D48-2142-D406-23DA2464914F}"/>
+                <a16:creationId xmlns:a16="http://schemas.microsoft.com/office/drawing/2014/main" xmlns="" id="{F2691A8B-4D48-2142-D406-23DA2464914F}"/>
               </a:ext>
             </a:extLst>
           </p:cNvPr>
@@ -1164,7 +1164,7 @@
           <p:cNvPr id="6" name="Marcador de número de diapositiva 5">
             <a:extLst>
               <a:ext uri="{FF2B5EF4-FFF2-40B4-BE49-F238E27FC236}">
-                <a16:creationId xmlns:a16="http://schemas.microsoft.com/office/drawing/2014/main" id="{96B23F70-B42D-EFA0-299C-97A258714FE2}"/>
+                <a16:creationId xmlns:a16="http://schemas.microsoft.com/office/drawing/2014/main" xmlns="" id="{96B23F70-B42D-EFA0-299C-97A258714FE2}"/>
               </a:ext>
             </a:extLst>
           </p:cNvPr>
@@ -1181,7 +1181,7 @@
           <a:lstStyle/>
           <a:p>
             <a:fld id="{759B9B3A-CA72-B441-95B9-AA6C177802C6}" type="slidenum">
-              <a:t>‹Nº›</a:t>
+              <a:t>‹Nr.›</a:t>
             </a:fld>
             <a:endParaRPr lang="es-ES"/>
           </a:p>
@@ -1222,7 +1222,7 @@
           <p:cNvPr id="2" name="Título 1">
             <a:extLst>
               <a:ext uri="{FF2B5EF4-FFF2-40B4-BE49-F238E27FC236}">
-                <a16:creationId xmlns:a16="http://schemas.microsoft.com/office/drawing/2014/main" id="{A337A8C6-FBA5-8C11-9EF2-B62764819815}"/>
+                <a16:creationId xmlns:a16="http://schemas.microsoft.com/office/drawing/2014/main" xmlns="" id="{A337A8C6-FBA5-8C11-9EF2-B62764819815}"/>
               </a:ext>
             </a:extLst>
           </p:cNvPr>
@@ -1250,7 +1250,7 @@
           <p:cNvPr id="3" name="Marcador de contenido 2">
             <a:extLst>
               <a:ext uri="{FF2B5EF4-FFF2-40B4-BE49-F238E27FC236}">
-                <a16:creationId xmlns:a16="http://schemas.microsoft.com/office/drawing/2014/main" id="{8035A986-AFEF-FD86-509D-19A0BD382E01}"/>
+                <a16:creationId xmlns:a16="http://schemas.microsoft.com/office/drawing/2014/main" xmlns="" id="{8035A986-AFEF-FD86-509D-19A0BD382E01}"/>
               </a:ext>
             </a:extLst>
           </p:cNvPr>
@@ -1312,7 +1312,7 @@
           <p:cNvPr id="4" name="Marcador de contenido 3">
             <a:extLst>
               <a:ext uri="{FF2B5EF4-FFF2-40B4-BE49-F238E27FC236}">
-                <a16:creationId xmlns:a16="http://schemas.microsoft.com/office/drawing/2014/main" id="{C4717131-E094-716A-C4D0-46F05836FD5E}"/>
+                <a16:creationId xmlns:a16="http://schemas.microsoft.com/office/drawing/2014/main" xmlns="" id="{C4717131-E094-716A-C4D0-46F05836FD5E}"/>
               </a:ext>
             </a:extLst>
           </p:cNvPr>
@@ -1374,7 +1374,7 @@
           <p:cNvPr id="5" name="Marcador de fecha 4">
             <a:extLst>
               <a:ext uri="{FF2B5EF4-FFF2-40B4-BE49-F238E27FC236}">
-                <a16:creationId xmlns:a16="http://schemas.microsoft.com/office/drawing/2014/main" id="{071B8E19-ACCE-9E00-66C8-5A5356AD838F}"/>
+                <a16:creationId xmlns:a16="http://schemas.microsoft.com/office/drawing/2014/main" xmlns="" id="{071B8E19-ACCE-9E00-66C8-5A5356AD838F}"/>
               </a:ext>
             </a:extLst>
           </p:cNvPr>
@@ -1391,7 +1391,7 @@
           <a:lstStyle/>
           <a:p>
             <a:fld id="{21FC31BB-37F9-9647-B0AE-D6F14E08AAAD}" type="datetimeFigureOut">
-              <a:t>26/1/24</a:t>
+              <a:t>4/2/24</a:t>
             </a:fld>
             <a:endParaRPr lang="es-ES"/>
           </a:p>
@@ -1402,7 +1402,7 @@
           <p:cNvPr id="6" name="Marcador de pie de página 5">
             <a:extLst>
               <a:ext uri="{FF2B5EF4-FFF2-40B4-BE49-F238E27FC236}">
-                <a16:creationId xmlns:a16="http://schemas.microsoft.com/office/drawing/2014/main" id="{56DF90D9-CC91-8DAD-6A3C-277FAD077F8D}"/>
+                <a16:creationId xmlns:a16="http://schemas.microsoft.com/office/drawing/2014/main" xmlns="" id="{56DF90D9-CC91-8DAD-6A3C-277FAD077F8D}"/>
               </a:ext>
             </a:extLst>
           </p:cNvPr>
@@ -1427,7 +1427,7 @@
           <p:cNvPr id="7" name="Marcador de número de diapositiva 6">
             <a:extLst>
               <a:ext uri="{FF2B5EF4-FFF2-40B4-BE49-F238E27FC236}">
-                <a16:creationId xmlns:a16="http://schemas.microsoft.com/office/drawing/2014/main" id="{CE9681C5-AD69-C917-5CD9-4B1335338153}"/>
+                <a16:creationId xmlns:a16="http://schemas.microsoft.com/office/drawing/2014/main" xmlns="" id="{CE9681C5-AD69-C917-5CD9-4B1335338153}"/>
               </a:ext>
             </a:extLst>
           </p:cNvPr>
@@ -1444,7 +1444,7 @@
           <a:lstStyle/>
           <a:p>
             <a:fld id="{759B9B3A-CA72-B441-95B9-AA6C177802C6}" type="slidenum">
-              <a:t>‹Nº›</a:t>
+              <a:t>‹Nr.›</a:t>
             </a:fld>
             <a:endParaRPr lang="es-ES"/>
           </a:p>
@@ -1485,7 +1485,7 @@
           <p:cNvPr id="2" name="Título 1">
             <a:extLst>
               <a:ext uri="{FF2B5EF4-FFF2-40B4-BE49-F238E27FC236}">
-                <a16:creationId xmlns:a16="http://schemas.microsoft.com/office/drawing/2014/main" id="{0F9E4A1C-B979-2EF3-F8A1-EB933271E705}"/>
+                <a16:creationId xmlns:a16="http://schemas.microsoft.com/office/drawing/2014/main" xmlns="" id="{0F9E4A1C-B979-2EF3-F8A1-EB933271E705}"/>
               </a:ext>
             </a:extLst>
           </p:cNvPr>
@@ -1518,7 +1518,7 @@
           <p:cNvPr id="3" name="Marcador de texto 2">
             <a:extLst>
               <a:ext uri="{FF2B5EF4-FFF2-40B4-BE49-F238E27FC236}">
-                <a16:creationId xmlns:a16="http://schemas.microsoft.com/office/drawing/2014/main" id="{D7FB7AF0-D6C5-B420-26B4-C1F966245D2C}"/>
+                <a16:creationId xmlns:a16="http://schemas.microsoft.com/office/drawing/2014/main" xmlns="" id="{D7FB7AF0-D6C5-B420-26B4-C1F966245D2C}"/>
               </a:ext>
             </a:extLst>
           </p:cNvPr>
@@ -1589,7 +1589,7 @@
           <p:cNvPr id="4" name="Marcador de contenido 3">
             <a:extLst>
               <a:ext uri="{FF2B5EF4-FFF2-40B4-BE49-F238E27FC236}">
-                <a16:creationId xmlns:a16="http://schemas.microsoft.com/office/drawing/2014/main" id="{BCA3819F-A294-33EC-47DC-24BF8618557B}"/>
+                <a16:creationId xmlns:a16="http://schemas.microsoft.com/office/drawing/2014/main" xmlns="" id="{BCA3819F-A294-33EC-47DC-24BF8618557B}"/>
               </a:ext>
             </a:extLst>
           </p:cNvPr>
@@ -1651,7 +1651,7 @@
           <p:cNvPr id="5" name="Marcador de texto 4">
             <a:extLst>
               <a:ext uri="{FF2B5EF4-FFF2-40B4-BE49-F238E27FC236}">
-                <a16:creationId xmlns:a16="http://schemas.microsoft.com/office/drawing/2014/main" id="{C08D2A5A-6973-0531-FA56-D7AB7F55C9AE}"/>
+                <a16:creationId xmlns:a16="http://schemas.microsoft.com/office/drawing/2014/main" xmlns="" id="{C08D2A5A-6973-0531-FA56-D7AB7F55C9AE}"/>
               </a:ext>
             </a:extLst>
           </p:cNvPr>
@@ -1722,7 +1722,7 @@
           <p:cNvPr id="6" name="Marcador de contenido 5">
             <a:extLst>
               <a:ext uri="{FF2B5EF4-FFF2-40B4-BE49-F238E27FC236}">
-                <a16:creationId xmlns:a16="http://schemas.microsoft.com/office/drawing/2014/main" id="{B538688D-2E03-F127-970C-CF15E4278AAE}"/>
+                <a16:creationId xmlns:a16="http://schemas.microsoft.com/office/drawing/2014/main" xmlns="" id="{B538688D-2E03-F127-970C-CF15E4278AAE}"/>
               </a:ext>
             </a:extLst>
           </p:cNvPr>
@@ -1784,7 +1784,7 @@
           <p:cNvPr id="7" name="Marcador de fecha 6">
             <a:extLst>
               <a:ext uri="{FF2B5EF4-FFF2-40B4-BE49-F238E27FC236}">
-                <a16:creationId xmlns:a16="http://schemas.microsoft.com/office/drawing/2014/main" id="{0DA6D652-EF57-7619-383A-F60C60731F01}"/>
+                <a16:creationId xmlns:a16="http://schemas.microsoft.com/office/drawing/2014/main" xmlns="" id="{0DA6D652-EF57-7619-383A-F60C60731F01}"/>
               </a:ext>
             </a:extLst>
           </p:cNvPr>
@@ -1801,7 +1801,7 @@
           <a:lstStyle/>
           <a:p>
             <a:fld id="{21FC31BB-37F9-9647-B0AE-D6F14E08AAAD}" type="datetimeFigureOut">
-              <a:t>26/1/24</a:t>
+              <a:t>4/2/24</a:t>
             </a:fld>
             <a:endParaRPr lang="es-ES"/>
           </a:p>
@@ -1812,7 +1812,7 @@
           <p:cNvPr id="8" name="Marcador de pie de página 7">
             <a:extLst>
               <a:ext uri="{FF2B5EF4-FFF2-40B4-BE49-F238E27FC236}">
-                <a16:creationId xmlns:a16="http://schemas.microsoft.com/office/drawing/2014/main" id="{E1D6EAEB-0992-DE32-025E-F8EE7A003E0B}"/>
+                <a16:creationId xmlns:a16="http://schemas.microsoft.com/office/drawing/2014/main" xmlns="" id="{E1D6EAEB-0992-DE32-025E-F8EE7A003E0B}"/>
               </a:ext>
             </a:extLst>
           </p:cNvPr>
@@ -1837,7 +1837,7 @@
           <p:cNvPr id="9" name="Marcador de número de diapositiva 8">
             <a:extLst>
               <a:ext uri="{FF2B5EF4-FFF2-40B4-BE49-F238E27FC236}">
-                <a16:creationId xmlns:a16="http://schemas.microsoft.com/office/drawing/2014/main" id="{156EFAAB-1E47-A1CB-8591-BBA5995AD199}"/>
+                <a16:creationId xmlns:a16="http://schemas.microsoft.com/office/drawing/2014/main" xmlns="" id="{156EFAAB-1E47-A1CB-8591-BBA5995AD199}"/>
               </a:ext>
             </a:extLst>
           </p:cNvPr>
@@ -1854,7 +1854,7 @@
           <a:lstStyle/>
           <a:p>
             <a:fld id="{759B9B3A-CA72-B441-95B9-AA6C177802C6}" type="slidenum">
-              <a:t>‹Nº›</a:t>
+              <a:t>‹Nr.›</a:t>
             </a:fld>
             <a:endParaRPr lang="es-ES"/>
           </a:p>
@@ -1895,7 +1895,7 @@
           <p:cNvPr id="2" name="Título 1">
             <a:extLst>
               <a:ext uri="{FF2B5EF4-FFF2-40B4-BE49-F238E27FC236}">
-                <a16:creationId xmlns:a16="http://schemas.microsoft.com/office/drawing/2014/main" id="{CB060BEC-06F9-6F15-3239-F537F6A70742}"/>
+                <a16:creationId xmlns:a16="http://schemas.microsoft.com/office/drawing/2014/main" xmlns="" id="{CB060BEC-06F9-6F15-3239-F537F6A70742}"/>
               </a:ext>
             </a:extLst>
           </p:cNvPr>
@@ -1923,7 +1923,7 @@
           <p:cNvPr id="3" name="Marcador de fecha 2">
             <a:extLst>
               <a:ext uri="{FF2B5EF4-FFF2-40B4-BE49-F238E27FC236}">
-                <a16:creationId xmlns:a16="http://schemas.microsoft.com/office/drawing/2014/main" id="{4FE8F189-C5FD-DB69-8C55-17910DB8A6A3}"/>
+                <a16:creationId xmlns:a16="http://schemas.microsoft.com/office/drawing/2014/main" xmlns="" id="{4FE8F189-C5FD-DB69-8C55-17910DB8A6A3}"/>
               </a:ext>
             </a:extLst>
           </p:cNvPr>
@@ -1940,7 +1940,7 @@
           <a:lstStyle/>
           <a:p>
             <a:fld id="{21FC31BB-37F9-9647-B0AE-D6F14E08AAAD}" type="datetimeFigureOut">
-              <a:t>26/1/24</a:t>
+              <a:t>4/2/24</a:t>
             </a:fld>
             <a:endParaRPr lang="es-ES"/>
           </a:p>
@@ -1951,7 +1951,7 @@
           <p:cNvPr id="4" name="Marcador de pie de página 3">
             <a:extLst>
               <a:ext uri="{FF2B5EF4-FFF2-40B4-BE49-F238E27FC236}">
-                <a16:creationId xmlns:a16="http://schemas.microsoft.com/office/drawing/2014/main" id="{508E7C2D-E61D-388A-4C03-9B655E234DC9}"/>
+                <a16:creationId xmlns:a16="http://schemas.microsoft.com/office/drawing/2014/main" xmlns="" id="{508E7C2D-E61D-388A-4C03-9B655E234DC9}"/>
               </a:ext>
             </a:extLst>
           </p:cNvPr>
@@ -1976,7 +1976,7 @@
           <p:cNvPr id="5" name="Marcador de número de diapositiva 4">
             <a:extLst>
               <a:ext uri="{FF2B5EF4-FFF2-40B4-BE49-F238E27FC236}">
-                <a16:creationId xmlns:a16="http://schemas.microsoft.com/office/drawing/2014/main" id="{19ABA8C6-78F2-459B-A38D-99DD52F138A6}"/>
+                <a16:creationId xmlns:a16="http://schemas.microsoft.com/office/drawing/2014/main" xmlns="" id="{19ABA8C6-78F2-459B-A38D-99DD52F138A6}"/>
               </a:ext>
             </a:extLst>
           </p:cNvPr>
@@ -1993,7 +1993,7 @@
           <a:lstStyle/>
           <a:p>
             <a:fld id="{759B9B3A-CA72-B441-95B9-AA6C177802C6}" type="slidenum">
-              <a:t>‹Nº›</a:t>
+              <a:t>‹Nr.›</a:t>
             </a:fld>
             <a:endParaRPr lang="es-ES"/>
           </a:p>
@@ -2034,7 +2034,7 @@
           <p:cNvPr id="2" name="Marcador de fecha 1">
             <a:extLst>
               <a:ext uri="{FF2B5EF4-FFF2-40B4-BE49-F238E27FC236}">
-                <a16:creationId xmlns:a16="http://schemas.microsoft.com/office/drawing/2014/main" id="{5401701C-8AF4-C657-9AEC-AEDBC59CDDDF}"/>
+                <a16:creationId xmlns:a16="http://schemas.microsoft.com/office/drawing/2014/main" xmlns="" id="{5401701C-8AF4-C657-9AEC-AEDBC59CDDDF}"/>
               </a:ext>
             </a:extLst>
           </p:cNvPr>
@@ -2051,7 +2051,7 @@
           <a:lstStyle/>
           <a:p>
             <a:fld id="{21FC31BB-37F9-9647-B0AE-D6F14E08AAAD}" type="datetimeFigureOut">
-              <a:t>26/1/24</a:t>
+              <a:t>4/2/24</a:t>
             </a:fld>
             <a:endParaRPr lang="es-ES"/>
           </a:p>
@@ -2062,7 +2062,7 @@
           <p:cNvPr id="3" name="Marcador de pie de página 2">
             <a:extLst>
               <a:ext uri="{FF2B5EF4-FFF2-40B4-BE49-F238E27FC236}">
-                <a16:creationId xmlns:a16="http://schemas.microsoft.com/office/drawing/2014/main" id="{B4049CDB-0BFC-88DD-C49E-4206DF11C3EC}"/>
+                <a16:creationId xmlns:a16="http://schemas.microsoft.com/office/drawing/2014/main" xmlns="" id="{B4049CDB-0BFC-88DD-C49E-4206DF11C3EC}"/>
               </a:ext>
             </a:extLst>
           </p:cNvPr>
@@ -2087,7 +2087,7 @@
           <p:cNvPr id="4" name="Marcador de número de diapositiva 3">
             <a:extLst>
               <a:ext uri="{FF2B5EF4-FFF2-40B4-BE49-F238E27FC236}">
-                <a16:creationId xmlns:a16="http://schemas.microsoft.com/office/drawing/2014/main" id="{BF412775-3385-3FD3-F709-8DBAFC925063}"/>
+                <a16:creationId xmlns:a16="http://schemas.microsoft.com/office/drawing/2014/main" xmlns="" id="{BF412775-3385-3FD3-F709-8DBAFC925063}"/>
               </a:ext>
             </a:extLst>
           </p:cNvPr>
@@ -2104,7 +2104,7 @@
           <a:lstStyle/>
           <a:p>
             <a:fld id="{759B9B3A-CA72-B441-95B9-AA6C177802C6}" type="slidenum">
-              <a:t>‹Nº›</a:t>
+              <a:t>‹Nr.›</a:t>
             </a:fld>
             <a:endParaRPr lang="es-ES"/>
           </a:p>
@@ -2145,7 +2145,7 @@
           <p:cNvPr id="2" name="Título 1">
             <a:extLst>
               <a:ext uri="{FF2B5EF4-FFF2-40B4-BE49-F238E27FC236}">
-                <a16:creationId xmlns:a16="http://schemas.microsoft.com/office/drawing/2014/main" id="{40AB7E98-06CB-C4A2-6C65-6113308482C3}"/>
+                <a16:creationId xmlns:a16="http://schemas.microsoft.com/office/drawing/2014/main" xmlns="" id="{40AB7E98-06CB-C4A2-6C65-6113308482C3}"/>
               </a:ext>
             </a:extLst>
           </p:cNvPr>
@@ -2182,7 +2182,7 @@
           <p:cNvPr id="3" name="Marcador de contenido 2">
             <a:extLst>
               <a:ext uri="{FF2B5EF4-FFF2-40B4-BE49-F238E27FC236}">
-                <a16:creationId xmlns:a16="http://schemas.microsoft.com/office/drawing/2014/main" id="{151CC3FE-339D-F34C-0EB5-A9EE78422D8C}"/>
+                <a16:creationId xmlns:a16="http://schemas.microsoft.com/office/drawing/2014/main" xmlns="" id="{151CC3FE-339D-F34C-0EB5-A9EE78422D8C}"/>
               </a:ext>
             </a:extLst>
           </p:cNvPr>
@@ -2272,7 +2272,7 @@
           <p:cNvPr id="4" name="Marcador de texto 3">
             <a:extLst>
               <a:ext uri="{FF2B5EF4-FFF2-40B4-BE49-F238E27FC236}">
-                <a16:creationId xmlns:a16="http://schemas.microsoft.com/office/drawing/2014/main" id="{7503646E-46EB-8783-A1C1-769B9BFDF739}"/>
+                <a16:creationId xmlns:a16="http://schemas.microsoft.com/office/drawing/2014/main" xmlns="" id="{7503646E-46EB-8783-A1C1-769B9BFDF739}"/>
               </a:ext>
             </a:extLst>
           </p:cNvPr>
@@ -2343,7 +2343,7 @@
           <p:cNvPr id="5" name="Marcador de fecha 4">
             <a:extLst>
               <a:ext uri="{FF2B5EF4-FFF2-40B4-BE49-F238E27FC236}">
-                <a16:creationId xmlns:a16="http://schemas.microsoft.com/office/drawing/2014/main" id="{09875438-964B-EB90-35DE-94A428B623CD}"/>
+                <a16:creationId xmlns:a16="http://schemas.microsoft.com/office/drawing/2014/main" xmlns="" id="{09875438-964B-EB90-35DE-94A428B623CD}"/>
               </a:ext>
             </a:extLst>
           </p:cNvPr>
@@ -2360,7 +2360,7 @@
           <a:lstStyle/>
           <a:p>
             <a:fld id="{21FC31BB-37F9-9647-B0AE-D6F14E08AAAD}" type="datetimeFigureOut">
-              <a:t>26/1/24</a:t>
+              <a:t>4/2/24</a:t>
             </a:fld>
             <a:endParaRPr lang="es-ES"/>
           </a:p>
@@ -2371,7 +2371,7 @@
           <p:cNvPr id="6" name="Marcador de pie de página 5">
             <a:extLst>
               <a:ext uri="{FF2B5EF4-FFF2-40B4-BE49-F238E27FC236}">
-                <a16:creationId xmlns:a16="http://schemas.microsoft.com/office/drawing/2014/main" id="{F06F5D7D-CB52-205A-6E84-8B18CE9CE433}"/>
+                <a16:creationId xmlns:a16="http://schemas.microsoft.com/office/drawing/2014/main" xmlns="" id="{F06F5D7D-CB52-205A-6E84-8B18CE9CE433}"/>
               </a:ext>
             </a:extLst>
           </p:cNvPr>
@@ -2396,7 +2396,7 @@
           <p:cNvPr id="7" name="Marcador de número de diapositiva 6">
             <a:extLst>
               <a:ext uri="{FF2B5EF4-FFF2-40B4-BE49-F238E27FC236}">
-                <a16:creationId xmlns:a16="http://schemas.microsoft.com/office/drawing/2014/main" id="{AD7E240A-2F30-83EF-8FBA-73D77F4D33B1}"/>
+                <a16:creationId xmlns:a16="http://schemas.microsoft.com/office/drawing/2014/main" xmlns="" id="{AD7E240A-2F30-83EF-8FBA-73D77F4D33B1}"/>
               </a:ext>
             </a:extLst>
           </p:cNvPr>
@@ -2413,7 +2413,7 @@
           <a:lstStyle/>
           <a:p>
             <a:fld id="{759B9B3A-CA72-B441-95B9-AA6C177802C6}" type="slidenum">
-              <a:t>‹Nº›</a:t>
+              <a:t>‹Nr.›</a:t>
             </a:fld>
             <a:endParaRPr lang="es-ES"/>
           </a:p>
@@ -2454,7 +2454,7 @@
           <p:cNvPr id="2" name="Título 1">
             <a:extLst>
               <a:ext uri="{FF2B5EF4-FFF2-40B4-BE49-F238E27FC236}">
-                <a16:creationId xmlns:a16="http://schemas.microsoft.com/office/drawing/2014/main" id="{D5B535BF-5767-6ABA-8A61-E398283D5116}"/>
+                <a16:creationId xmlns:a16="http://schemas.microsoft.com/office/drawing/2014/main" xmlns="" id="{D5B535BF-5767-6ABA-8A61-E398283D5116}"/>
               </a:ext>
             </a:extLst>
           </p:cNvPr>
@@ -2491,7 +2491,7 @@
           <p:cNvPr id="3" name="Marcador de posición de imagen 2">
             <a:extLst>
               <a:ext uri="{FF2B5EF4-FFF2-40B4-BE49-F238E27FC236}">
-                <a16:creationId xmlns:a16="http://schemas.microsoft.com/office/drawing/2014/main" id="{A669E747-D958-B1D6-9A3F-927CFD222260}"/>
+                <a16:creationId xmlns:a16="http://schemas.microsoft.com/office/drawing/2014/main" xmlns="" id="{A669E747-D958-B1D6-9A3F-927CFD222260}"/>
               </a:ext>
             </a:extLst>
           </p:cNvPr>
@@ -2558,7 +2558,7 @@
           <p:cNvPr id="4" name="Marcador de texto 3">
             <a:extLst>
               <a:ext uri="{FF2B5EF4-FFF2-40B4-BE49-F238E27FC236}">
-                <a16:creationId xmlns:a16="http://schemas.microsoft.com/office/drawing/2014/main" id="{24B8F379-CCBE-DD7C-26C6-43F18D9434F2}"/>
+                <a16:creationId xmlns:a16="http://schemas.microsoft.com/office/drawing/2014/main" xmlns="" id="{24B8F379-CCBE-DD7C-26C6-43F18D9434F2}"/>
               </a:ext>
             </a:extLst>
           </p:cNvPr>
@@ -2629,7 +2629,7 @@
           <p:cNvPr id="5" name="Marcador de fecha 4">
             <a:extLst>
               <a:ext uri="{FF2B5EF4-FFF2-40B4-BE49-F238E27FC236}">
-                <a16:creationId xmlns:a16="http://schemas.microsoft.com/office/drawing/2014/main" id="{19104133-A656-B165-9DE9-326C9CB0F26C}"/>
+                <a16:creationId xmlns:a16="http://schemas.microsoft.com/office/drawing/2014/main" xmlns="" id="{19104133-A656-B165-9DE9-326C9CB0F26C}"/>
               </a:ext>
             </a:extLst>
           </p:cNvPr>
@@ -2646,7 +2646,7 @@
           <a:lstStyle/>
           <a:p>
             <a:fld id="{21FC31BB-37F9-9647-B0AE-D6F14E08AAAD}" type="datetimeFigureOut">
-              <a:t>26/1/24</a:t>
+              <a:t>4/2/24</a:t>
             </a:fld>
             <a:endParaRPr lang="es-ES"/>
           </a:p>
@@ -2657,7 +2657,7 @@
           <p:cNvPr id="6" name="Marcador de pie de página 5">
             <a:extLst>
               <a:ext uri="{FF2B5EF4-FFF2-40B4-BE49-F238E27FC236}">
-                <a16:creationId xmlns:a16="http://schemas.microsoft.com/office/drawing/2014/main" id="{97C4A618-A759-B61B-818D-DC2AC298308D}"/>
+                <a16:creationId xmlns:a16="http://schemas.microsoft.com/office/drawing/2014/main" xmlns="" id="{97C4A618-A759-B61B-818D-DC2AC298308D}"/>
               </a:ext>
             </a:extLst>
           </p:cNvPr>
@@ -2682,7 +2682,7 @@
           <p:cNvPr id="7" name="Marcador de número de diapositiva 6">
             <a:extLst>
               <a:ext uri="{FF2B5EF4-FFF2-40B4-BE49-F238E27FC236}">
-                <a16:creationId xmlns:a16="http://schemas.microsoft.com/office/drawing/2014/main" id="{65440279-3209-1169-53C6-AE9C6C2D27C8}"/>
+                <a16:creationId xmlns:a16="http://schemas.microsoft.com/office/drawing/2014/main" xmlns="" id="{65440279-3209-1169-53C6-AE9C6C2D27C8}"/>
               </a:ext>
             </a:extLst>
           </p:cNvPr>
@@ -2699,7 +2699,7 @@
           <a:lstStyle/>
           <a:p>
             <a:fld id="{759B9B3A-CA72-B441-95B9-AA6C177802C6}" type="slidenum">
-              <a:t>‹Nº›</a:t>
+              <a:t>‹Nr.›</a:t>
             </a:fld>
             <a:endParaRPr lang="es-ES"/>
           </a:p>
@@ -2745,7 +2745,7 @@
           <p:cNvPr id="2" name="Marcador de título 1">
             <a:extLst>
               <a:ext uri="{FF2B5EF4-FFF2-40B4-BE49-F238E27FC236}">
-                <a16:creationId xmlns:a16="http://schemas.microsoft.com/office/drawing/2014/main" id="{F1F62B78-0282-4356-08DB-A9AC7ED67C95}"/>
+                <a16:creationId xmlns:a16="http://schemas.microsoft.com/office/drawing/2014/main" xmlns="" id="{F1F62B78-0282-4356-08DB-A9AC7ED67C95}"/>
               </a:ext>
             </a:extLst>
           </p:cNvPr>
@@ -2783,7 +2783,7 @@
           <p:cNvPr id="3" name="Marcador de texto 2">
             <a:extLst>
               <a:ext uri="{FF2B5EF4-FFF2-40B4-BE49-F238E27FC236}">
-                <a16:creationId xmlns:a16="http://schemas.microsoft.com/office/drawing/2014/main" id="{1673D2F1-BFA3-D399-2B9A-555DD1903D71}"/>
+                <a16:creationId xmlns:a16="http://schemas.microsoft.com/office/drawing/2014/main" xmlns="" id="{1673D2F1-BFA3-D399-2B9A-555DD1903D71}"/>
               </a:ext>
             </a:extLst>
           </p:cNvPr>
@@ -2850,7 +2850,7 @@
           <p:cNvPr id="4" name="Marcador de fecha 3">
             <a:extLst>
               <a:ext uri="{FF2B5EF4-FFF2-40B4-BE49-F238E27FC236}">
-                <a16:creationId xmlns:a16="http://schemas.microsoft.com/office/drawing/2014/main" id="{FB51A92F-FD1D-5A15-50C5-FB19CDF4078C}"/>
+                <a16:creationId xmlns:a16="http://schemas.microsoft.com/office/drawing/2014/main" xmlns="" id="{FB51A92F-FD1D-5A15-50C5-FB19CDF4078C}"/>
               </a:ext>
             </a:extLst>
           </p:cNvPr>
@@ -2885,7 +2885,7 @@
           </a:lstStyle>
           <a:p>
             <a:fld id="{21FC31BB-37F9-9647-B0AE-D6F14E08AAAD}" type="datetimeFigureOut">
-              <a:t>26/1/24</a:t>
+              <a:t>4/2/24</a:t>
             </a:fld>
             <a:endParaRPr lang="es-ES"/>
           </a:p>
@@ -2896,7 +2896,7 @@
           <p:cNvPr id="5" name="Marcador de pie de página 4">
             <a:extLst>
               <a:ext uri="{FF2B5EF4-FFF2-40B4-BE49-F238E27FC236}">
-                <a16:creationId xmlns:a16="http://schemas.microsoft.com/office/drawing/2014/main" id="{EC4E2CAC-0308-ACE7-35C8-BE89FEAA16BF}"/>
+                <a16:creationId xmlns:a16="http://schemas.microsoft.com/office/drawing/2014/main" xmlns="" id="{EC4E2CAC-0308-ACE7-35C8-BE89FEAA16BF}"/>
               </a:ext>
             </a:extLst>
           </p:cNvPr>
@@ -2939,7 +2939,7 @@
           <p:cNvPr id="6" name="Marcador de número de diapositiva 5">
             <a:extLst>
               <a:ext uri="{FF2B5EF4-FFF2-40B4-BE49-F238E27FC236}">
-                <a16:creationId xmlns:a16="http://schemas.microsoft.com/office/drawing/2014/main" id="{935BDA00-769A-24E9-E037-0F454A0E8130}"/>
+                <a16:creationId xmlns:a16="http://schemas.microsoft.com/office/drawing/2014/main" xmlns="" id="{935BDA00-769A-24E9-E037-0F454A0E8130}"/>
               </a:ext>
             </a:extLst>
           </p:cNvPr>
@@ -2974,7 +2974,7 @@
           </a:lstStyle>
           <a:p>
             <a:fld id="{759B9B3A-CA72-B441-95B9-AA6C177802C6}" type="slidenum">
-              <a:t>‹Nº›</a:t>
+              <a:t>‹Nr.›</a:t>
             </a:fld>
             <a:endParaRPr lang="es-ES"/>
           </a:p>
@@ -3306,7 +3306,7 @@
           <p:cNvPr id="2" name="Título 1">
             <a:extLst>
               <a:ext uri="{FF2B5EF4-FFF2-40B4-BE49-F238E27FC236}">
-                <a16:creationId xmlns:a16="http://schemas.microsoft.com/office/drawing/2014/main" id="{CF4C926D-EEC8-8697-A68B-30CE840AF6FB}"/>
+                <a16:creationId xmlns:a16="http://schemas.microsoft.com/office/drawing/2014/main" xmlns="" id="{CF4C926D-EEC8-8697-A68B-30CE840AF6FB}"/>
               </a:ext>
             </a:extLst>
           </p:cNvPr>
@@ -3334,7 +3334,7 @@
           <p:cNvPr id="3" name="Subtítulo 2">
             <a:extLst>
               <a:ext uri="{FF2B5EF4-FFF2-40B4-BE49-F238E27FC236}">
-                <a16:creationId xmlns:a16="http://schemas.microsoft.com/office/drawing/2014/main" id="{6D7912C4-2F37-A260-93EA-AC1D40670A44}"/>
+                <a16:creationId xmlns:a16="http://schemas.microsoft.com/office/drawing/2014/main" xmlns="" id="{6D7912C4-2F37-A260-93EA-AC1D40670A44}"/>
               </a:ext>
             </a:extLst>
           </p:cNvPr>
@@ -3389,7 +3389,7 @@
           <p:cNvPr id="74" name="Flecha doblada hacia arriba 73">
             <a:extLst>
               <a:ext uri="{FF2B5EF4-FFF2-40B4-BE49-F238E27FC236}">
-                <a16:creationId xmlns:a16="http://schemas.microsoft.com/office/drawing/2014/main" id="{CB3D3808-2B82-7C87-DA5E-551C6531C24F}"/>
+                <a16:creationId xmlns:a16="http://schemas.microsoft.com/office/drawing/2014/main" xmlns="" id="{CB3D3808-2B82-7C87-DA5E-551C6531C24F}"/>
               </a:ext>
             </a:extLst>
           </p:cNvPr>
@@ -3445,7 +3445,7 @@
           <p:cNvPr id="73" name="Rectángulo 72">
             <a:extLst>
               <a:ext uri="{FF2B5EF4-FFF2-40B4-BE49-F238E27FC236}">
-                <a16:creationId xmlns:a16="http://schemas.microsoft.com/office/drawing/2014/main" id="{DC7E3D8F-D039-95CF-5EE7-4A938BA6571C}"/>
+                <a16:creationId xmlns:a16="http://schemas.microsoft.com/office/drawing/2014/main" xmlns="" id="{DC7E3D8F-D039-95CF-5EE7-4A938BA6571C}"/>
               </a:ext>
             </a:extLst>
           </p:cNvPr>
@@ -3496,7 +3496,7 @@
           <p:cNvPr id="72" name="Rectángulo 71">
             <a:extLst>
               <a:ext uri="{FF2B5EF4-FFF2-40B4-BE49-F238E27FC236}">
-                <a16:creationId xmlns:a16="http://schemas.microsoft.com/office/drawing/2014/main" id="{5FAF26A6-C7F1-9BD7-278A-9046FAD83975}"/>
+                <a16:creationId xmlns:a16="http://schemas.microsoft.com/office/drawing/2014/main" xmlns="" id="{5FAF26A6-C7F1-9BD7-278A-9046FAD83975}"/>
               </a:ext>
             </a:extLst>
           </p:cNvPr>
@@ -3547,7 +3547,7 @@
           <p:cNvPr id="71" name="Rectángulo 70">
             <a:extLst>
               <a:ext uri="{FF2B5EF4-FFF2-40B4-BE49-F238E27FC236}">
-                <a16:creationId xmlns:a16="http://schemas.microsoft.com/office/drawing/2014/main" id="{DEB07855-62C9-9087-6233-449365B0F345}"/>
+                <a16:creationId xmlns:a16="http://schemas.microsoft.com/office/drawing/2014/main" xmlns="" id="{DEB07855-62C9-9087-6233-449365B0F345}"/>
               </a:ext>
             </a:extLst>
           </p:cNvPr>
@@ -3598,7 +3598,7 @@
           <p:cNvPr id="70" name="Rectángulo 69">
             <a:extLst>
               <a:ext uri="{FF2B5EF4-FFF2-40B4-BE49-F238E27FC236}">
-                <a16:creationId xmlns:a16="http://schemas.microsoft.com/office/drawing/2014/main" id="{68505F9B-4F4B-D880-897C-06BB9052FC5A}"/>
+                <a16:creationId xmlns:a16="http://schemas.microsoft.com/office/drawing/2014/main" xmlns="" id="{68505F9B-4F4B-D880-897C-06BB9052FC5A}"/>
               </a:ext>
             </a:extLst>
           </p:cNvPr>
@@ -3649,7 +3649,7 @@
           <p:cNvPr id="4" name="Rectángulo 3">
             <a:extLst>
               <a:ext uri="{FF2B5EF4-FFF2-40B4-BE49-F238E27FC236}">
-                <a16:creationId xmlns:a16="http://schemas.microsoft.com/office/drawing/2014/main" id="{610A6117-40F7-D113-5C45-A5C735F3D157}"/>
+                <a16:creationId xmlns:a16="http://schemas.microsoft.com/office/drawing/2014/main" xmlns="" id="{610A6117-40F7-D113-5C45-A5C735F3D157}"/>
               </a:ext>
             </a:extLst>
           </p:cNvPr>
@@ -3698,7 +3698,7 @@
           <p:cNvPr id="5" name="Rectángulo 4">
             <a:extLst>
               <a:ext uri="{FF2B5EF4-FFF2-40B4-BE49-F238E27FC236}">
-                <a16:creationId xmlns:a16="http://schemas.microsoft.com/office/drawing/2014/main" id="{9A975246-2BAC-1505-1437-E3E43F305FEE}"/>
+                <a16:creationId xmlns:a16="http://schemas.microsoft.com/office/drawing/2014/main" xmlns="" id="{9A975246-2BAC-1505-1437-E3E43F305FEE}"/>
               </a:ext>
             </a:extLst>
           </p:cNvPr>
@@ -3747,7 +3747,7 @@
           <p:cNvPr id="6" name="CuadroTexto 5">
             <a:extLst>
               <a:ext uri="{FF2B5EF4-FFF2-40B4-BE49-F238E27FC236}">
-                <a16:creationId xmlns:a16="http://schemas.microsoft.com/office/drawing/2014/main" id="{DF6345E0-BA79-07E7-3CE0-5EEA068F63C4}"/>
+                <a16:creationId xmlns:a16="http://schemas.microsoft.com/office/drawing/2014/main" xmlns="" id="{DF6345E0-BA79-07E7-3CE0-5EEA068F63C4}"/>
               </a:ext>
             </a:extLst>
           </p:cNvPr>
@@ -3782,7 +3782,7 @@
           <p:cNvPr id="7" name="CuadroTexto 6">
             <a:extLst>
               <a:ext uri="{FF2B5EF4-FFF2-40B4-BE49-F238E27FC236}">
-                <a16:creationId xmlns:a16="http://schemas.microsoft.com/office/drawing/2014/main" id="{5A9860CE-115A-7E65-A3FE-916766B20B2E}"/>
+                <a16:creationId xmlns:a16="http://schemas.microsoft.com/office/drawing/2014/main" xmlns="" id="{5A9860CE-115A-7E65-A3FE-916766B20B2E}"/>
               </a:ext>
             </a:extLst>
           </p:cNvPr>
@@ -3817,7 +3817,7 @@
           <p:cNvPr id="8" name="Rectángulo 7">
             <a:extLst>
               <a:ext uri="{FF2B5EF4-FFF2-40B4-BE49-F238E27FC236}">
-                <a16:creationId xmlns:a16="http://schemas.microsoft.com/office/drawing/2014/main" id="{EE47F4DA-F3B7-2406-FCB8-25780B54F613}"/>
+                <a16:creationId xmlns:a16="http://schemas.microsoft.com/office/drawing/2014/main" xmlns="" id="{EE47F4DA-F3B7-2406-FCB8-25780B54F613}"/>
               </a:ext>
             </a:extLst>
           </p:cNvPr>
@@ -3876,7 +3876,7 @@
           <p:cNvPr id="9" name="Flecha derecha 8">
             <a:extLst>
               <a:ext uri="{FF2B5EF4-FFF2-40B4-BE49-F238E27FC236}">
-                <a16:creationId xmlns:a16="http://schemas.microsoft.com/office/drawing/2014/main" id="{E75A6010-E518-C9BC-58FD-105EECF8DCD5}"/>
+                <a16:creationId xmlns:a16="http://schemas.microsoft.com/office/drawing/2014/main" xmlns="" id="{E75A6010-E518-C9BC-58FD-105EECF8DCD5}"/>
               </a:ext>
             </a:extLst>
           </p:cNvPr>
@@ -3932,7 +3932,7 @@
           <p:cNvPr id="10" name="CuadroTexto 9">
             <a:extLst>
               <a:ext uri="{FF2B5EF4-FFF2-40B4-BE49-F238E27FC236}">
-                <a16:creationId xmlns:a16="http://schemas.microsoft.com/office/drawing/2014/main" id="{79AD70CA-4D14-C21C-AF0A-2E16DED31D46}"/>
+                <a16:creationId xmlns:a16="http://schemas.microsoft.com/office/drawing/2014/main" xmlns="" id="{79AD70CA-4D14-C21C-AF0A-2E16DED31D46}"/>
               </a:ext>
             </a:extLst>
           </p:cNvPr>
@@ -3968,7 +3968,7 @@
           <p:cNvPr id="11" name="Flecha derecha 10">
             <a:extLst>
               <a:ext uri="{FF2B5EF4-FFF2-40B4-BE49-F238E27FC236}">
-                <a16:creationId xmlns:a16="http://schemas.microsoft.com/office/drawing/2014/main" id="{6C1F77ED-11A3-93DE-316E-A2EDB34A431C}"/>
+                <a16:creationId xmlns:a16="http://schemas.microsoft.com/office/drawing/2014/main" xmlns="" id="{6C1F77ED-11A3-93DE-316E-A2EDB34A431C}"/>
               </a:ext>
             </a:extLst>
           </p:cNvPr>
@@ -4024,7 +4024,7 @@
           <p:cNvPr id="12" name="CuadroTexto 11">
             <a:extLst>
               <a:ext uri="{FF2B5EF4-FFF2-40B4-BE49-F238E27FC236}">
-                <a16:creationId xmlns:a16="http://schemas.microsoft.com/office/drawing/2014/main" id="{BFB6859A-BE2F-F776-1F65-6955626372D2}"/>
+                <a16:creationId xmlns:a16="http://schemas.microsoft.com/office/drawing/2014/main" xmlns="" id="{BFB6859A-BE2F-F776-1F65-6955626372D2}"/>
               </a:ext>
             </a:extLst>
           </p:cNvPr>
@@ -4060,7 +4060,7 @@
           <p:cNvPr id="21" name="Rectángulo 20">
             <a:extLst>
               <a:ext uri="{FF2B5EF4-FFF2-40B4-BE49-F238E27FC236}">
-                <a16:creationId xmlns:a16="http://schemas.microsoft.com/office/drawing/2014/main" id="{46FDBD73-6A2A-EFE0-EF47-B0796D441DE6}"/>
+                <a16:creationId xmlns:a16="http://schemas.microsoft.com/office/drawing/2014/main" xmlns="" id="{46FDBD73-6A2A-EFE0-EF47-B0796D441DE6}"/>
               </a:ext>
             </a:extLst>
           </p:cNvPr>
@@ -4119,7 +4119,7 @@
           <p:cNvPr id="24" name="Rectángulo 23">
             <a:extLst>
               <a:ext uri="{FF2B5EF4-FFF2-40B4-BE49-F238E27FC236}">
-                <a16:creationId xmlns:a16="http://schemas.microsoft.com/office/drawing/2014/main" id="{72311D3D-9FF4-ED5E-29A7-CB4940044B82}"/>
+                <a16:creationId xmlns:a16="http://schemas.microsoft.com/office/drawing/2014/main" xmlns="" id="{72311D3D-9FF4-ED5E-29A7-CB4940044B82}"/>
               </a:ext>
             </a:extLst>
           </p:cNvPr>
@@ -4178,7 +4178,7 @@
           <p:cNvPr id="25" name="Flecha derecha 24">
             <a:extLst>
               <a:ext uri="{FF2B5EF4-FFF2-40B4-BE49-F238E27FC236}">
-                <a16:creationId xmlns:a16="http://schemas.microsoft.com/office/drawing/2014/main" id="{C2B0B9D0-EEF6-B7EB-0FE9-E03CEC9FCFE4}"/>
+                <a16:creationId xmlns:a16="http://schemas.microsoft.com/office/drawing/2014/main" xmlns="" id="{C2B0B9D0-EEF6-B7EB-0FE9-E03CEC9FCFE4}"/>
               </a:ext>
             </a:extLst>
           </p:cNvPr>
@@ -4234,7 +4234,7 @@
           <p:cNvPr id="26" name="CuadroTexto 25">
             <a:extLst>
               <a:ext uri="{FF2B5EF4-FFF2-40B4-BE49-F238E27FC236}">
-                <a16:creationId xmlns:a16="http://schemas.microsoft.com/office/drawing/2014/main" id="{C30522C0-91DB-2469-0E4C-51134671EA68}"/>
+                <a16:creationId xmlns:a16="http://schemas.microsoft.com/office/drawing/2014/main" xmlns="" id="{C30522C0-91DB-2469-0E4C-51134671EA68}"/>
               </a:ext>
             </a:extLst>
           </p:cNvPr>
@@ -4270,7 +4270,7 @@
           <p:cNvPr id="29" name="Rectángulo 28">
             <a:extLst>
               <a:ext uri="{FF2B5EF4-FFF2-40B4-BE49-F238E27FC236}">
-                <a16:creationId xmlns:a16="http://schemas.microsoft.com/office/drawing/2014/main" id="{45FD781D-0CD2-3649-04DF-B3FE549CD2C6}"/>
+                <a16:creationId xmlns:a16="http://schemas.microsoft.com/office/drawing/2014/main" xmlns="" id="{45FD781D-0CD2-3649-04DF-B3FE549CD2C6}"/>
               </a:ext>
             </a:extLst>
           </p:cNvPr>
@@ -4319,7 +4319,7 @@
           <p:cNvPr id="31" name="Rectángulo 30">
             <a:extLst>
               <a:ext uri="{FF2B5EF4-FFF2-40B4-BE49-F238E27FC236}">
-                <a16:creationId xmlns:a16="http://schemas.microsoft.com/office/drawing/2014/main" id="{CECFCCD5-3606-FC20-FACE-6AE86ED17B8F}"/>
+                <a16:creationId xmlns:a16="http://schemas.microsoft.com/office/drawing/2014/main" xmlns="" id="{CECFCCD5-3606-FC20-FACE-6AE86ED17B8F}"/>
               </a:ext>
             </a:extLst>
           </p:cNvPr>
@@ -4368,7 +4368,7 @@
           <p:cNvPr id="32" name="Rectángulo 31">
             <a:extLst>
               <a:ext uri="{FF2B5EF4-FFF2-40B4-BE49-F238E27FC236}">
-                <a16:creationId xmlns:a16="http://schemas.microsoft.com/office/drawing/2014/main" id="{A1A29D7E-8AC3-9469-1C48-86014810749C}"/>
+                <a16:creationId xmlns:a16="http://schemas.microsoft.com/office/drawing/2014/main" xmlns="" id="{A1A29D7E-8AC3-9469-1C48-86014810749C}"/>
               </a:ext>
             </a:extLst>
           </p:cNvPr>
@@ -4417,7 +4417,7 @@
           <p:cNvPr id="33" name="Rectángulo 32">
             <a:extLst>
               <a:ext uri="{FF2B5EF4-FFF2-40B4-BE49-F238E27FC236}">
-                <a16:creationId xmlns:a16="http://schemas.microsoft.com/office/drawing/2014/main" id="{5787B6DA-8437-4820-EE55-EE8DE0E9341A}"/>
+                <a16:creationId xmlns:a16="http://schemas.microsoft.com/office/drawing/2014/main" xmlns="" id="{5787B6DA-8437-4820-EE55-EE8DE0E9341A}"/>
               </a:ext>
             </a:extLst>
           </p:cNvPr>
@@ -4466,7 +4466,7 @@
           <p:cNvPr id="34" name="CuadroTexto 33">
             <a:extLst>
               <a:ext uri="{FF2B5EF4-FFF2-40B4-BE49-F238E27FC236}">
-                <a16:creationId xmlns:a16="http://schemas.microsoft.com/office/drawing/2014/main" id="{93D1646F-63F9-869F-27F2-E87963B327EE}"/>
+                <a16:creationId xmlns:a16="http://schemas.microsoft.com/office/drawing/2014/main" xmlns="" id="{93D1646F-63F9-869F-27F2-E87963B327EE}"/>
               </a:ext>
             </a:extLst>
           </p:cNvPr>
@@ -4502,7 +4502,7 @@
           <p:cNvPr id="36" name="Conector angular 35">
             <a:extLst>
               <a:ext uri="{FF2B5EF4-FFF2-40B4-BE49-F238E27FC236}">
-                <a16:creationId xmlns:a16="http://schemas.microsoft.com/office/drawing/2014/main" id="{9FB0A27D-E41A-33CC-8A40-2CB7CDCF9EC7}"/>
+                <a16:creationId xmlns:a16="http://schemas.microsoft.com/office/drawing/2014/main" xmlns="" id="{9FB0A27D-E41A-33CC-8A40-2CB7CDCF9EC7}"/>
               </a:ext>
             </a:extLst>
           </p:cNvPr>
@@ -4543,7 +4543,7 @@
           <p:cNvPr id="37" name="Flecha derecha 36">
             <a:extLst>
               <a:ext uri="{FF2B5EF4-FFF2-40B4-BE49-F238E27FC236}">
-                <a16:creationId xmlns:a16="http://schemas.microsoft.com/office/drawing/2014/main" id="{D86C5218-4081-7CF8-B11D-D164A0556C9B}"/>
+                <a16:creationId xmlns:a16="http://schemas.microsoft.com/office/drawing/2014/main" xmlns="" id="{D86C5218-4081-7CF8-B11D-D164A0556C9B}"/>
               </a:ext>
             </a:extLst>
           </p:cNvPr>
@@ -4599,7 +4599,7 @@
           <p:cNvPr id="38" name="CuadroTexto 37">
             <a:extLst>
               <a:ext uri="{FF2B5EF4-FFF2-40B4-BE49-F238E27FC236}">
-                <a16:creationId xmlns:a16="http://schemas.microsoft.com/office/drawing/2014/main" id="{65AD267C-1F8B-90F5-C8DF-11C29BA5BE4C}"/>
+                <a16:creationId xmlns:a16="http://schemas.microsoft.com/office/drawing/2014/main" xmlns="" id="{65AD267C-1F8B-90F5-C8DF-11C29BA5BE4C}"/>
               </a:ext>
             </a:extLst>
           </p:cNvPr>
@@ -4635,7 +4635,7 @@
           <p:cNvPr id="39" name="Rectángulo 38">
             <a:extLst>
               <a:ext uri="{FF2B5EF4-FFF2-40B4-BE49-F238E27FC236}">
-                <a16:creationId xmlns:a16="http://schemas.microsoft.com/office/drawing/2014/main" id="{E814E3A3-76C0-A2A7-E534-65A5B6583CA6}"/>
+                <a16:creationId xmlns:a16="http://schemas.microsoft.com/office/drawing/2014/main" xmlns="" id="{E814E3A3-76C0-A2A7-E534-65A5B6583CA6}"/>
               </a:ext>
             </a:extLst>
           </p:cNvPr>
@@ -4694,7 +4694,7 @@
           <p:cNvPr id="40" name="Flecha derecha 39">
             <a:extLst>
               <a:ext uri="{FF2B5EF4-FFF2-40B4-BE49-F238E27FC236}">
-                <a16:creationId xmlns:a16="http://schemas.microsoft.com/office/drawing/2014/main" id="{6D0F1B2C-00A1-8E4C-9CD6-0D715070266A}"/>
+                <a16:creationId xmlns:a16="http://schemas.microsoft.com/office/drawing/2014/main" xmlns="" id="{6D0F1B2C-00A1-8E4C-9CD6-0D715070266A}"/>
               </a:ext>
             </a:extLst>
           </p:cNvPr>
@@ -4750,7 +4750,7 @@
           <p:cNvPr id="41" name="CuadroTexto 40">
             <a:extLst>
               <a:ext uri="{FF2B5EF4-FFF2-40B4-BE49-F238E27FC236}">
-                <a16:creationId xmlns:a16="http://schemas.microsoft.com/office/drawing/2014/main" id="{497622AA-D9D5-29BB-824F-0CAF2BA21A3D}"/>
+                <a16:creationId xmlns:a16="http://schemas.microsoft.com/office/drawing/2014/main" xmlns="" id="{497622AA-D9D5-29BB-824F-0CAF2BA21A3D}"/>
               </a:ext>
             </a:extLst>
           </p:cNvPr>
@@ -4786,7 +4786,7 @@
           <p:cNvPr id="42" name="Rectángulo 41">
             <a:extLst>
               <a:ext uri="{FF2B5EF4-FFF2-40B4-BE49-F238E27FC236}">
-                <a16:creationId xmlns:a16="http://schemas.microsoft.com/office/drawing/2014/main" id="{7301A2E0-EA14-8668-EC12-1F195ADF19DD}"/>
+                <a16:creationId xmlns:a16="http://schemas.microsoft.com/office/drawing/2014/main" xmlns="" id="{7301A2E0-EA14-8668-EC12-1F195ADF19DD}"/>
               </a:ext>
             </a:extLst>
           </p:cNvPr>
@@ -4835,7 +4835,7 @@
           <p:cNvPr id="43" name="CuadroTexto 42">
             <a:extLst>
               <a:ext uri="{FF2B5EF4-FFF2-40B4-BE49-F238E27FC236}">
-                <a16:creationId xmlns:a16="http://schemas.microsoft.com/office/drawing/2014/main" id="{C18868E3-E398-DFBC-EDB5-7EF403BA7F3D}"/>
+                <a16:creationId xmlns:a16="http://schemas.microsoft.com/office/drawing/2014/main" xmlns="" id="{C18868E3-E398-DFBC-EDB5-7EF403BA7F3D}"/>
               </a:ext>
             </a:extLst>
           </p:cNvPr>
@@ -4870,7 +4870,7 @@
           <p:cNvPr id="44" name="Rectángulo 43">
             <a:extLst>
               <a:ext uri="{FF2B5EF4-FFF2-40B4-BE49-F238E27FC236}">
-                <a16:creationId xmlns:a16="http://schemas.microsoft.com/office/drawing/2014/main" id="{3D07F28F-4A6B-14C0-FA12-E6646C29DB8B}"/>
+                <a16:creationId xmlns:a16="http://schemas.microsoft.com/office/drawing/2014/main" xmlns="" id="{3D07F28F-4A6B-14C0-FA12-E6646C29DB8B}"/>
               </a:ext>
             </a:extLst>
           </p:cNvPr>
@@ -4929,7 +4929,7 @@
           <p:cNvPr id="45" name="Flecha derecha 44">
             <a:extLst>
               <a:ext uri="{FF2B5EF4-FFF2-40B4-BE49-F238E27FC236}">
-                <a16:creationId xmlns:a16="http://schemas.microsoft.com/office/drawing/2014/main" id="{0EE6CC89-2313-5D7D-A2C9-6DD0151AEFF3}"/>
+                <a16:creationId xmlns:a16="http://schemas.microsoft.com/office/drawing/2014/main" xmlns="" id="{0EE6CC89-2313-5D7D-A2C9-6DD0151AEFF3}"/>
               </a:ext>
             </a:extLst>
           </p:cNvPr>
@@ -4985,7 +4985,7 @@
           <p:cNvPr id="46" name="CuadroTexto 45">
             <a:extLst>
               <a:ext uri="{FF2B5EF4-FFF2-40B4-BE49-F238E27FC236}">
-                <a16:creationId xmlns:a16="http://schemas.microsoft.com/office/drawing/2014/main" id="{75E30002-B72B-E593-9F95-876CE6B255BE}"/>
+                <a16:creationId xmlns:a16="http://schemas.microsoft.com/office/drawing/2014/main" xmlns="" id="{75E30002-B72B-E593-9F95-876CE6B255BE}"/>
               </a:ext>
             </a:extLst>
           </p:cNvPr>
@@ -5021,7 +5021,7 @@
           <p:cNvPr id="47" name="Flecha doblada hacia arriba 46">
             <a:extLst>
               <a:ext uri="{FF2B5EF4-FFF2-40B4-BE49-F238E27FC236}">
-                <a16:creationId xmlns:a16="http://schemas.microsoft.com/office/drawing/2014/main" id="{9139217A-98CE-9452-1996-4675FE76E8D7}"/>
+                <a16:creationId xmlns:a16="http://schemas.microsoft.com/office/drawing/2014/main" xmlns="" id="{9139217A-98CE-9452-1996-4675FE76E8D7}"/>
               </a:ext>
             </a:extLst>
           </p:cNvPr>
@@ -5077,7 +5077,7 @@
           <p:cNvPr id="48" name="CuadroTexto 47">
             <a:extLst>
               <a:ext uri="{FF2B5EF4-FFF2-40B4-BE49-F238E27FC236}">
-                <a16:creationId xmlns:a16="http://schemas.microsoft.com/office/drawing/2014/main" id="{3BDD3AAE-5583-F740-728D-A0CB4BD59249}"/>
+                <a16:creationId xmlns:a16="http://schemas.microsoft.com/office/drawing/2014/main" xmlns="" id="{3BDD3AAE-5583-F740-728D-A0CB4BD59249}"/>
               </a:ext>
             </a:extLst>
           </p:cNvPr>
@@ -5113,7 +5113,7 @@
           <p:cNvPr id="49" name="Rectángulo 48">
             <a:extLst>
               <a:ext uri="{FF2B5EF4-FFF2-40B4-BE49-F238E27FC236}">
-                <a16:creationId xmlns:a16="http://schemas.microsoft.com/office/drawing/2014/main" id="{311EBB26-C5C1-4610-52A8-EFD4CF1F10D4}"/>
+                <a16:creationId xmlns:a16="http://schemas.microsoft.com/office/drawing/2014/main" xmlns="" id="{311EBB26-C5C1-4610-52A8-EFD4CF1F10D4}"/>
               </a:ext>
             </a:extLst>
           </p:cNvPr>
@@ -5171,7 +5171,7 @@
           <p:cNvPr id="54" name="Rectángulo 53">
             <a:extLst>
               <a:ext uri="{FF2B5EF4-FFF2-40B4-BE49-F238E27FC236}">
-                <a16:creationId xmlns:a16="http://schemas.microsoft.com/office/drawing/2014/main" id="{9592DC45-0921-29B0-C4D6-8C662B710304}"/>
+                <a16:creationId xmlns:a16="http://schemas.microsoft.com/office/drawing/2014/main" xmlns="" id="{9592DC45-0921-29B0-C4D6-8C662B710304}"/>
               </a:ext>
             </a:extLst>
           </p:cNvPr>
@@ -5229,7 +5229,7 @@
           <p:cNvPr id="75" name="CuadroTexto 74">
             <a:extLst>
               <a:ext uri="{FF2B5EF4-FFF2-40B4-BE49-F238E27FC236}">
-                <a16:creationId xmlns:a16="http://schemas.microsoft.com/office/drawing/2014/main" id="{80539901-BEAF-D8DA-5A8E-A0D33DDB350F}"/>
+                <a16:creationId xmlns:a16="http://schemas.microsoft.com/office/drawing/2014/main" xmlns="" id="{80539901-BEAF-D8DA-5A8E-A0D33DDB350F}"/>
               </a:ext>
             </a:extLst>
           </p:cNvPr>
@@ -5295,7 +5295,7 @@
           <p:cNvPr id="52" name="Conector angular 51">
             <a:extLst>
               <a:ext uri="{FF2B5EF4-FFF2-40B4-BE49-F238E27FC236}">
-                <a16:creationId xmlns:a16="http://schemas.microsoft.com/office/drawing/2014/main" id="{00200FFA-488D-6E0F-50E1-76E987A1AE54}"/>
+                <a16:creationId xmlns:a16="http://schemas.microsoft.com/office/drawing/2014/main" xmlns="" id="{00200FFA-488D-6E0F-50E1-76E987A1AE54}"/>
               </a:ext>
             </a:extLst>
           </p:cNvPr>
@@ -5338,7 +5338,7 @@
           <p:cNvPr id="4" name="Rectángulo 3">
             <a:extLst>
               <a:ext uri="{FF2B5EF4-FFF2-40B4-BE49-F238E27FC236}">
-                <a16:creationId xmlns:a16="http://schemas.microsoft.com/office/drawing/2014/main" id="{50299D0B-F828-23E8-7A1F-BD322D30789A}"/>
+                <a16:creationId xmlns:a16="http://schemas.microsoft.com/office/drawing/2014/main" xmlns="" id="{50299D0B-F828-23E8-7A1F-BD322D30789A}"/>
               </a:ext>
             </a:extLst>
           </p:cNvPr>
@@ -5387,7 +5387,7 @@
           <p:cNvPr id="5" name="Rectángulo 4">
             <a:extLst>
               <a:ext uri="{FF2B5EF4-FFF2-40B4-BE49-F238E27FC236}">
-                <a16:creationId xmlns:a16="http://schemas.microsoft.com/office/drawing/2014/main" id="{F9E878FE-D71D-FBDF-C9E5-E9E91FA40087}"/>
+                <a16:creationId xmlns:a16="http://schemas.microsoft.com/office/drawing/2014/main" xmlns="" id="{F9E878FE-D71D-FBDF-C9E5-E9E91FA40087}"/>
               </a:ext>
             </a:extLst>
           </p:cNvPr>
@@ -5446,7 +5446,7 @@
           <p:cNvPr id="7" name="Conector recto de flecha 6">
             <a:extLst>
               <a:ext uri="{FF2B5EF4-FFF2-40B4-BE49-F238E27FC236}">
-                <a16:creationId xmlns:a16="http://schemas.microsoft.com/office/drawing/2014/main" id="{20DF3A8D-E89C-BCBB-51D4-D4354EA2534C}"/>
+                <a16:creationId xmlns:a16="http://schemas.microsoft.com/office/drawing/2014/main" xmlns="" id="{20DF3A8D-E89C-BCBB-51D4-D4354EA2534C}"/>
               </a:ext>
             </a:extLst>
           </p:cNvPr>
@@ -5489,7 +5489,7 @@
           <p:cNvPr id="8" name="Rectángulo 7">
             <a:extLst>
               <a:ext uri="{FF2B5EF4-FFF2-40B4-BE49-F238E27FC236}">
-                <a16:creationId xmlns:a16="http://schemas.microsoft.com/office/drawing/2014/main" id="{F9C0A696-566D-C9B9-B032-B4B421C86F24}"/>
+                <a16:creationId xmlns:a16="http://schemas.microsoft.com/office/drawing/2014/main" xmlns="" id="{F9C0A696-566D-C9B9-B032-B4B421C86F24}"/>
               </a:ext>
             </a:extLst>
           </p:cNvPr>
@@ -5548,7 +5548,7 @@
           <p:cNvPr id="9" name="Rectángulo 8">
             <a:extLst>
               <a:ext uri="{FF2B5EF4-FFF2-40B4-BE49-F238E27FC236}">
-                <a16:creationId xmlns:a16="http://schemas.microsoft.com/office/drawing/2014/main" id="{633E14A0-2A23-BCC9-CB9C-1DE44A0094C5}"/>
+                <a16:creationId xmlns:a16="http://schemas.microsoft.com/office/drawing/2014/main" xmlns="" id="{633E14A0-2A23-BCC9-CB9C-1DE44A0094C5}"/>
               </a:ext>
             </a:extLst>
           </p:cNvPr>
@@ -5607,7 +5607,7 @@
           <p:cNvPr id="11" name="Conector angular 10">
             <a:extLst>
               <a:ext uri="{FF2B5EF4-FFF2-40B4-BE49-F238E27FC236}">
-                <a16:creationId xmlns:a16="http://schemas.microsoft.com/office/drawing/2014/main" id="{575C4B35-6980-5F47-7E6B-B1EA6B9F577B}"/>
+                <a16:creationId xmlns:a16="http://schemas.microsoft.com/office/drawing/2014/main" xmlns="" id="{575C4B35-6980-5F47-7E6B-B1EA6B9F577B}"/>
               </a:ext>
             </a:extLst>
           </p:cNvPr>
@@ -5650,7 +5650,7 @@
           <p:cNvPr id="12" name="Conector angular 11">
             <a:extLst>
               <a:ext uri="{FF2B5EF4-FFF2-40B4-BE49-F238E27FC236}">
-                <a16:creationId xmlns:a16="http://schemas.microsoft.com/office/drawing/2014/main" id="{C6B2914E-0AC6-E097-93E5-838B83CB8DB9}"/>
+                <a16:creationId xmlns:a16="http://schemas.microsoft.com/office/drawing/2014/main" xmlns="" id="{C6B2914E-0AC6-E097-93E5-838B83CB8DB9}"/>
               </a:ext>
             </a:extLst>
           </p:cNvPr>
@@ -5695,7 +5695,7 @@
           <p:cNvPr id="21" name="CuadroTexto 20">
             <a:extLst>
               <a:ext uri="{FF2B5EF4-FFF2-40B4-BE49-F238E27FC236}">
-                <a16:creationId xmlns:a16="http://schemas.microsoft.com/office/drawing/2014/main" id="{D1D139D9-5A3C-2A5D-2BAE-22C1CD903940}"/>
+                <a16:creationId xmlns:a16="http://schemas.microsoft.com/office/drawing/2014/main" xmlns="" id="{D1D139D9-5A3C-2A5D-2BAE-22C1CD903940}"/>
               </a:ext>
             </a:extLst>
           </p:cNvPr>
@@ -5730,7 +5730,7 @@
           <p:cNvPr id="22" name="Rectángulo 21">
             <a:extLst>
               <a:ext uri="{FF2B5EF4-FFF2-40B4-BE49-F238E27FC236}">
-                <a16:creationId xmlns:a16="http://schemas.microsoft.com/office/drawing/2014/main" id="{F092DE0D-4903-1967-4E6D-7B790C013EF2}"/>
+                <a16:creationId xmlns:a16="http://schemas.microsoft.com/office/drawing/2014/main" xmlns="" id="{F092DE0D-4903-1967-4E6D-7B790C013EF2}"/>
               </a:ext>
             </a:extLst>
           </p:cNvPr>
@@ -5789,7 +5789,7 @@
           <p:cNvPr id="23" name="Conector angular 22">
             <a:extLst>
               <a:ext uri="{FF2B5EF4-FFF2-40B4-BE49-F238E27FC236}">
-                <a16:creationId xmlns:a16="http://schemas.microsoft.com/office/drawing/2014/main" id="{0D9F7698-6915-3493-B9EC-C4051B29E700}"/>
+                <a16:creationId xmlns:a16="http://schemas.microsoft.com/office/drawing/2014/main" xmlns="" id="{0D9F7698-6915-3493-B9EC-C4051B29E700}"/>
               </a:ext>
             </a:extLst>
           </p:cNvPr>
@@ -5833,7 +5833,7 @@
           <p:cNvPr id="26" name="Conector angular 25">
             <a:extLst>
               <a:ext uri="{FF2B5EF4-FFF2-40B4-BE49-F238E27FC236}">
-                <a16:creationId xmlns:a16="http://schemas.microsoft.com/office/drawing/2014/main" id="{970FFA5E-4E4E-D3AA-43AC-9272CC59283B}"/>
+                <a16:creationId xmlns:a16="http://schemas.microsoft.com/office/drawing/2014/main" xmlns="" id="{970FFA5E-4E4E-D3AA-43AC-9272CC59283B}"/>
               </a:ext>
             </a:extLst>
           </p:cNvPr>
@@ -5877,7 +5877,7 @@
           <p:cNvPr id="41" name="Rectángulo 40">
             <a:extLst>
               <a:ext uri="{FF2B5EF4-FFF2-40B4-BE49-F238E27FC236}">
-                <a16:creationId xmlns:a16="http://schemas.microsoft.com/office/drawing/2014/main" id="{8CD60801-972C-CBAE-297B-C79AFDE606D2}"/>
+                <a16:creationId xmlns:a16="http://schemas.microsoft.com/office/drawing/2014/main" xmlns="" id="{8CD60801-972C-CBAE-297B-C79AFDE606D2}"/>
               </a:ext>
             </a:extLst>
           </p:cNvPr>
@@ -5926,7 +5926,7 @@
           <p:cNvPr id="42" name="Rectángulo 41">
             <a:extLst>
               <a:ext uri="{FF2B5EF4-FFF2-40B4-BE49-F238E27FC236}">
-                <a16:creationId xmlns:a16="http://schemas.microsoft.com/office/drawing/2014/main" id="{FD9CB591-DF6C-4CA4-15C0-9B1701D1518B}"/>
+                <a16:creationId xmlns:a16="http://schemas.microsoft.com/office/drawing/2014/main" xmlns="" id="{FD9CB591-DF6C-4CA4-15C0-9B1701D1518B}"/>
               </a:ext>
             </a:extLst>
           </p:cNvPr>
@@ -5985,7 +5985,7 @@
           <p:cNvPr id="43" name="Conector recto de flecha 42">
             <a:extLst>
               <a:ext uri="{FF2B5EF4-FFF2-40B4-BE49-F238E27FC236}">
-                <a16:creationId xmlns:a16="http://schemas.microsoft.com/office/drawing/2014/main" id="{7788DEB9-F0EF-8F98-CB0E-AE2790710A95}"/>
+                <a16:creationId xmlns:a16="http://schemas.microsoft.com/office/drawing/2014/main" xmlns="" id="{7788DEB9-F0EF-8F98-CB0E-AE2790710A95}"/>
               </a:ext>
             </a:extLst>
           </p:cNvPr>
@@ -6028,7 +6028,7 @@
           <p:cNvPr id="48" name="Conector angular 47">
             <a:extLst>
               <a:ext uri="{FF2B5EF4-FFF2-40B4-BE49-F238E27FC236}">
-                <a16:creationId xmlns:a16="http://schemas.microsoft.com/office/drawing/2014/main" id="{D81B295A-52E7-D71F-3912-AF3BFEC49458}"/>
+                <a16:creationId xmlns:a16="http://schemas.microsoft.com/office/drawing/2014/main" xmlns="" id="{D81B295A-52E7-D71F-3912-AF3BFEC49458}"/>
               </a:ext>
             </a:extLst>
           </p:cNvPr>
@@ -6070,7 +6070,7 @@
           <p:cNvPr id="57" name="Rectángulo 56">
             <a:extLst>
               <a:ext uri="{FF2B5EF4-FFF2-40B4-BE49-F238E27FC236}">
-                <a16:creationId xmlns:a16="http://schemas.microsoft.com/office/drawing/2014/main" id="{C1C63946-B5A1-1CA2-2605-78718ACF0B42}"/>
+                <a16:creationId xmlns:a16="http://schemas.microsoft.com/office/drawing/2014/main" xmlns="" id="{C1C63946-B5A1-1CA2-2605-78718ACF0B42}"/>
               </a:ext>
             </a:extLst>
           </p:cNvPr>
@@ -6120,7 +6120,7 @@
           <p:cNvPr id="58" name="CuadroTexto 57">
             <a:extLst>
               <a:ext uri="{FF2B5EF4-FFF2-40B4-BE49-F238E27FC236}">
-                <a16:creationId xmlns:a16="http://schemas.microsoft.com/office/drawing/2014/main" id="{096071E2-92DD-9872-E184-E06E999B6A86}"/>
+                <a16:creationId xmlns:a16="http://schemas.microsoft.com/office/drawing/2014/main" xmlns="" id="{096071E2-92DD-9872-E184-E06E999B6A86}"/>
               </a:ext>
             </a:extLst>
           </p:cNvPr>
@@ -6155,7 +6155,7 @@
           <p:cNvPr id="59" name="Rectángulo 58">
             <a:extLst>
               <a:ext uri="{FF2B5EF4-FFF2-40B4-BE49-F238E27FC236}">
-                <a16:creationId xmlns:a16="http://schemas.microsoft.com/office/drawing/2014/main" id="{5E950370-CFE8-CE93-B3B9-E90CA8CC0144}"/>
+                <a16:creationId xmlns:a16="http://schemas.microsoft.com/office/drawing/2014/main" xmlns="" id="{5E950370-CFE8-CE93-B3B9-E90CA8CC0144}"/>
               </a:ext>
             </a:extLst>
           </p:cNvPr>
@@ -6214,7 +6214,7 @@
           <p:cNvPr id="60" name="Conector angular 59">
             <a:extLst>
               <a:ext uri="{FF2B5EF4-FFF2-40B4-BE49-F238E27FC236}">
-                <a16:creationId xmlns:a16="http://schemas.microsoft.com/office/drawing/2014/main" id="{75018FE1-106B-14BF-A7F8-363AE7DA5020}"/>
+                <a16:creationId xmlns:a16="http://schemas.microsoft.com/office/drawing/2014/main" xmlns="" id="{75018FE1-106B-14BF-A7F8-363AE7DA5020}"/>
               </a:ext>
             </a:extLst>
           </p:cNvPr>
@@ -6257,7 +6257,7 @@
           <p:cNvPr id="61" name="Rectángulo 60">
             <a:extLst>
               <a:ext uri="{FF2B5EF4-FFF2-40B4-BE49-F238E27FC236}">
-                <a16:creationId xmlns:a16="http://schemas.microsoft.com/office/drawing/2014/main" id="{BE2D497D-222E-B881-6293-953ADCEC8FFB}"/>
+                <a16:creationId xmlns:a16="http://schemas.microsoft.com/office/drawing/2014/main" xmlns="" id="{BE2D497D-222E-B881-6293-953ADCEC8FFB}"/>
               </a:ext>
             </a:extLst>
           </p:cNvPr>
@@ -6306,7 +6306,7 @@
           <p:cNvPr id="62" name="Rectángulo 61">
             <a:extLst>
               <a:ext uri="{FF2B5EF4-FFF2-40B4-BE49-F238E27FC236}">
-                <a16:creationId xmlns:a16="http://schemas.microsoft.com/office/drawing/2014/main" id="{EC85C8F7-65C3-0C02-DB15-D6ECCF4F5E15}"/>
+                <a16:creationId xmlns:a16="http://schemas.microsoft.com/office/drawing/2014/main" xmlns="" id="{EC85C8F7-65C3-0C02-DB15-D6ECCF4F5E15}"/>
               </a:ext>
             </a:extLst>
           </p:cNvPr>
@@ -6365,7 +6365,7 @@
           <p:cNvPr id="63" name="Conector recto de flecha 62">
             <a:extLst>
               <a:ext uri="{FF2B5EF4-FFF2-40B4-BE49-F238E27FC236}">
-                <a16:creationId xmlns:a16="http://schemas.microsoft.com/office/drawing/2014/main" id="{D1A41541-B88B-FB2E-5B7F-FD969F7F0BD2}"/>
+                <a16:creationId xmlns:a16="http://schemas.microsoft.com/office/drawing/2014/main" xmlns="" id="{D1A41541-B88B-FB2E-5B7F-FD969F7F0BD2}"/>
               </a:ext>
             </a:extLst>
           </p:cNvPr>
@@ -6408,7 +6408,7 @@
           <p:cNvPr id="64" name="Rectángulo 63">
             <a:extLst>
               <a:ext uri="{FF2B5EF4-FFF2-40B4-BE49-F238E27FC236}">
-                <a16:creationId xmlns:a16="http://schemas.microsoft.com/office/drawing/2014/main" id="{BD10D6DD-3DD6-232F-60E7-39DCD8461368}"/>
+                <a16:creationId xmlns:a16="http://schemas.microsoft.com/office/drawing/2014/main" xmlns="" id="{BD10D6DD-3DD6-232F-60E7-39DCD8461368}"/>
               </a:ext>
             </a:extLst>
           </p:cNvPr>
@@ -6467,7 +6467,7 @@
           <p:cNvPr id="65" name="Rectángulo 64">
             <a:extLst>
               <a:ext uri="{FF2B5EF4-FFF2-40B4-BE49-F238E27FC236}">
-                <a16:creationId xmlns:a16="http://schemas.microsoft.com/office/drawing/2014/main" id="{D76DCDC5-47B0-8773-658A-325352DD4C2A}"/>
+                <a16:creationId xmlns:a16="http://schemas.microsoft.com/office/drawing/2014/main" xmlns="" id="{D76DCDC5-47B0-8773-658A-325352DD4C2A}"/>
               </a:ext>
             </a:extLst>
           </p:cNvPr>
@@ -6526,7 +6526,7 @@
           <p:cNvPr id="66" name="Conector angular 65">
             <a:extLst>
               <a:ext uri="{FF2B5EF4-FFF2-40B4-BE49-F238E27FC236}">
-                <a16:creationId xmlns:a16="http://schemas.microsoft.com/office/drawing/2014/main" id="{8A81E8B6-8162-A538-7F0E-D4BD1590E0C6}"/>
+                <a16:creationId xmlns:a16="http://schemas.microsoft.com/office/drawing/2014/main" xmlns="" id="{8A81E8B6-8162-A538-7F0E-D4BD1590E0C6}"/>
               </a:ext>
             </a:extLst>
           </p:cNvPr>
@@ -6569,7 +6569,7 @@
           <p:cNvPr id="67" name="Conector angular 66">
             <a:extLst>
               <a:ext uri="{FF2B5EF4-FFF2-40B4-BE49-F238E27FC236}">
-                <a16:creationId xmlns:a16="http://schemas.microsoft.com/office/drawing/2014/main" id="{8FCE1427-B7B0-A270-6582-D24F48C787D7}"/>
+                <a16:creationId xmlns:a16="http://schemas.microsoft.com/office/drawing/2014/main" xmlns="" id="{8FCE1427-B7B0-A270-6582-D24F48C787D7}"/>
               </a:ext>
             </a:extLst>
           </p:cNvPr>
@@ -6614,7 +6614,7 @@
           <p:cNvPr id="69" name="Rectángulo 68">
             <a:extLst>
               <a:ext uri="{FF2B5EF4-FFF2-40B4-BE49-F238E27FC236}">
-                <a16:creationId xmlns:a16="http://schemas.microsoft.com/office/drawing/2014/main" id="{5A059C2C-6283-975D-AABF-45FF296F2CB2}"/>
+                <a16:creationId xmlns:a16="http://schemas.microsoft.com/office/drawing/2014/main" xmlns="" id="{5A059C2C-6283-975D-AABF-45FF296F2CB2}"/>
               </a:ext>
             </a:extLst>
           </p:cNvPr>
@@ -6673,7 +6673,7 @@
           <p:cNvPr id="70" name="Conector angular 69">
             <a:extLst>
               <a:ext uri="{FF2B5EF4-FFF2-40B4-BE49-F238E27FC236}">
-                <a16:creationId xmlns:a16="http://schemas.microsoft.com/office/drawing/2014/main" id="{305C319F-03FD-8589-D19A-7F8E85A3CABE}"/>
+                <a16:creationId xmlns:a16="http://schemas.microsoft.com/office/drawing/2014/main" xmlns="" id="{305C319F-03FD-8589-D19A-7F8E85A3CABE}"/>
               </a:ext>
             </a:extLst>
           </p:cNvPr>
@@ -6717,7 +6717,7 @@
           <p:cNvPr id="71" name="Conector angular 70">
             <a:extLst>
               <a:ext uri="{FF2B5EF4-FFF2-40B4-BE49-F238E27FC236}">
-                <a16:creationId xmlns:a16="http://schemas.microsoft.com/office/drawing/2014/main" id="{9E622FA8-DFDA-498F-B2EC-3B8D0B14772A}"/>
+                <a16:creationId xmlns:a16="http://schemas.microsoft.com/office/drawing/2014/main" xmlns="" id="{9E622FA8-DFDA-498F-B2EC-3B8D0B14772A}"/>
               </a:ext>
             </a:extLst>
           </p:cNvPr>
@@ -6761,7 +6761,7 @@
           <p:cNvPr id="72" name="Rectángulo 71">
             <a:extLst>
               <a:ext uri="{FF2B5EF4-FFF2-40B4-BE49-F238E27FC236}">
-                <a16:creationId xmlns:a16="http://schemas.microsoft.com/office/drawing/2014/main" id="{160A19DE-03DD-ACE4-8CBB-7EDD24320EE4}"/>
+                <a16:creationId xmlns:a16="http://schemas.microsoft.com/office/drawing/2014/main" xmlns="" id="{160A19DE-03DD-ACE4-8CBB-7EDD24320EE4}"/>
               </a:ext>
             </a:extLst>
           </p:cNvPr>
@@ -6810,7 +6810,7 @@
           <p:cNvPr id="73" name="Rectángulo 72">
             <a:extLst>
               <a:ext uri="{FF2B5EF4-FFF2-40B4-BE49-F238E27FC236}">
-                <a16:creationId xmlns:a16="http://schemas.microsoft.com/office/drawing/2014/main" id="{56854184-09C6-C079-17F7-59D132DBF6AA}"/>
+                <a16:creationId xmlns:a16="http://schemas.microsoft.com/office/drawing/2014/main" xmlns="" id="{56854184-09C6-C079-17F7-59D132DBF6AA}"/>
               </a:ext>
             </a:extLst>
           </p:cNvPr>
@@ -6869,7 +6869,7 @@
           <p:cNvPr id="74" name="Conector recto de flecha 73">
             <a:extLst>
               <a:ext uri="{FF2B5EF4-FFF2-40B4-BE49-F238E27FC236}">
-                <a16:creationId xmlns:a16="http://schemas.microsoft.com/office/drawing/2014/main" id="{1549748D-6362-FA4F-1950-F375184D9D25}"/>
+                <a16:creationId xmlns:a16="http://schemas.microsoft.com/office/drawing/2014/main" xmlns="" id="{1549748D-6362-FA4F-1950-F375184D9D25}"/>
               </a:ext>
             </a:extLst>
           </p:cNvPr>
@@ -6912,7 +6912,7 @@
           <p:cNvPr id="75" name="Conector angular 74">
             <a:extLst>
               <a:ext uri="{FF2B5EF4-FFF2-40B4-BE49-F238E27FC236}">
-                <a16:creationId xmlns:a16="http://schemas.microsoft.com/office/drawing/2014/main" id="{294F7833-2E0F-118F-A685-42C76536814A}"/>
+                <a16:creationId xmlns:a16="http://schemas.microsoft.com/office/drawing/2014/main" xmlns="" id="{294F7833-2E0F-118F-A685-42C76536814A}"/>
               </a:ext>
             </a:extLst>
           </p:cNvPr>
@@ -6954,7 +6954,7 @@
           <p:cNvPr id="76" name="Rectángulo 75">
             <a:extLst>
               <a:ext uri="{FF2B5EF4-FFF2-40B4-BE49-F238E27FC236}">
-                <a16:creationId xmlns:a16="http://schemas.microsoft.com/office/drawing/2014/main" id="{105F49D7-177A-A271-2094-0122360F7356}"/>
+                <a16:creationId xmlns:a16="http://schemas.microsoft.com/office/drawing/2014/main" xmlns="" id="{105F49D7-177A-A271-2094-0122360F7356}"/>
               </a:ext>
             </a:extLst>
           </p:cNvPr>
@@ -7004,7 +7004,7 @@
           <p:cNvPr id="77" name="CuadroTexto 76">
             <a:extLst>
               <a:ext uri="{FF2B5EF4-FFF2-40B4-BE49-F238E27FC236}">
-                <a16:creationId xmlns:a16="http://schemas.microsoft.com/office/drawing/2014/main" id="{4358989D-838D-D5BA-3D03-5703BBB60BA9}"/>
+                <a16:creationId xmlns:a16="http://schemas.microsoft.com/office/drawing/2014/main" xmlns="" id="{4358989D-838D-D5BA-3D03-5703BBB60BA9}"/>
               </a:ext>
             </a:extLst>
           </p:cNvPr>
@@ -7039,7 +7039,7 @@
           <p:cNvPr id="78" name="CuadroTexto 77">
             <a:extLst>
               <a:ext uri="{FF2B5EF4-FFF2-40B4-BE49-F238E27FC236}">
-                <a16:creationId xmlns:a16="http://schemas.microsoft.com/office/drawing/2014/main" id="{EDB7657E-5D3E-350D-EAAB-96D8BBE1C9B4}"/>
+                <a16:creationId xmlns:a16="http://schemas.microsoft.com/office/drawing/2014/main" xmlns="" id="{EDB7657E-5D3E-350D-EAAB-96D8BBE1C9B4}"/>
               </a:ext>
             </a:extLst>
           </p:cNvPr>
@@ -7074,7 +7074,7 @@
           <p:cNvPr id="79" name="Rectángulo 78">
             <a:extLst>
               <a:ext uri="{FF2B5EF4-FFF2-40B4-BE49-F238E27FC236}">
-                <a16:creationId xmlns:a16="http://schemas.microsoft.com/office/drawing/2014/main" id="{82D4EF91-09FB-23B0-7977-BB504DBBD7F7}"/>
+                <a16:creationId xmlns:a16="http://schemas.microsoft.com/office/drawing/2014/main" xmlns="" id="{82D4EF91-09FB-23B0-7977-BB504DBBD7F7}"/>
               </a:ext>
             </a:extLst>
           </p:cNvPr>
@@ -7123,7 +7123,7 @@
           <p:cNvPr id="80" name="Rectángulo 79">
             <a:extLst>
               <a:ext uri="{FF2B5EF4-FFF2-40B4-BE49-F238E27FC236}">
-                <a16:creationId xmlns:a16="http://schemas.microsoft.com/office/drawing/2014/main" id="{A2A02225-0710-5BCB-84BD-2EB963BD9654}"/>
+                <a16:creationId xmlns:a16="http://schemas.microsoft.com/office/drawing/2014/main" xmlns="" id="{A2A02225-0710-5BCB-84BD-2EB963BD9654}"/>
               </a:ext>
             </a:extLst>
           </p:cNvPr>
@@ -7182,7 +7182,7 @@
           <p:cNvPr id="81" name="Conector recto de flecha 80">
             <a:extLst>
               <a:ext uri="{FF2B5EF4-FFF2-40B4-BE49-F238E27FC236}">
-                <a16:creationId xmlns:a16="http://schemas.microsoft.com/office/drawing/2014/main" id="{18BA2644-875D-CDD0-C1B4-131F46AB55C6}"/>
+                <a16:creationId xmlns:a16="http://schemas.microsoft.com/office/drawing/2014/main" xmlns="" id="{18BA2644-875D-CDD0-C1B4-131F46AB55C6}"/>
               </a:ext>
             </a:extLst>
           </p:cNvPr>
@@ -7225,7 +7225,7 @@
           <p:cNvPr id="94" name="Rectángulo 93">
             <a:extLst>
               <a:ext uri="{FF2B5EF4-FFF2-40B4-BE49-F238E27FC236}">
-                <a16:creationId xmlns:a16="http://schemas.microsoft.com/office/drawing/2014/main" id="{FFA93323-5382-2191-0F68-8FEB2569DF97}"/>
+                <a16:creationId xmlns:a16="http://schemas.microsoft.com/office/drawing/2014/main" xmlns="" id="{FFA93323-5382-2191-0F68-8FEB2569DF97}"/>
               </a:ext>
             </a:extLst>
           </p:cNvPr>
@@ -7274,7 +7274,7 @@
           <p:cNvPr id="95" name="Rectángulo 94">
             <a:extLst>
               <a:ext uri="{FF2B5EF4-FFF2-40B4-BE49-F238E27FC236}">
-                <a16:creationId xmlns:a16="http://schemas.microsoft.com/office/drawing/2014/main" id="{48DFD903-5BBB-751A-42BC-FF63B5E97D27}"/>
+                <a16:creationId xmlns:a16="http://schemas.microsoft.com/office/drawing/2014/main" xmlns="" id="{48DFD903-5BBB-751A-42BC-FF63B5E97D27}"/>
               </a:ext>
             </a:extLst>
           </p:cNvPr>
@@ -7333,7 +7333,7 @@
           <p:cNvPr id="96" name="Conector recto de flecha 95">
             <a:extLst>
               <a:ext uri="{FF2B5EF4-FFF2-40B4-BE49-F238E27FC236}">
-                <a16:creationId xmlns:a16="http://schemas.microsoft.com/office/drawing/2014/main" id="{1BA2E105-5994-AEFC-E1C8-2D67029094A5}"/>
+                <a16:creationId xmlns:a16="http://schemas.microsoft.com/office/drawing/2014/main" xmlns="" id="{1BA2E105-5994-AEFC-E1C8-2D67029094A5}"/>
               </a:ext>
             </a:extLst>
           </p:cNvPr>
@@ -7376,7 +7376,7 @@
           <p:cNvPr id="100" name="Conector angular 99">
             <a:extLst>
               <a:ext uri="{FF2B5EF4-FFF2-40B4-BE49-F238E27FC236}">
-                <a16:creationId xmlns:a16="http://schemas.microsoft.com/office/drawing/2014/main" id="{DDEA36B8-8D56-BE1D-9DEE-316936F4B767}"/>
+                <a16:creationId xmlns:a16="http://schemas.microsoft.com/office/drawing/2014/main" xmlns="" id="{DDEA36B8-8D56-BE1D-9DEE-316936F4B767}"/>
               </a:ext>
             </a:extLst>
           </p:cNvPr>
@@ -7420,7 +7420,7 @@
           <p:cNvPr id="103" name="Conector angular 102">
             <a:extLst>
               <a:ext uri="{FF2B5EF4-FFF2-40B4-BE49-F238E27FC236}">
-                <a16:creationId xmlns:a16="http://schemas.microsoft.com/office/drawing/2014/main" id="{E79D151F-B083-4812-8EBC-B1496F344AD3}"/>
+                <a16:creationId xmlns:a16="http://schemas.microsoft.com/office/drawing/2014/main" xmlns="" id="{E79D151F-B083-4812-8EBC-B1496F344AD3}"/>
               </a:ext>
             </a:extLst>
           </p:cNvPr>
@@ -7464,7 +7464,7 @@
           <p:cNvPr id="106" name="Conector angular 105">
             <a:extLst>
               <a:ext uri="{FF2B5EF4-FFF2-40B4-BE49-F238E27FC236}">
-                <a16:creationId xmlns:a16="http://schemas.microsoft.com/office/drawing/2014/main" id="{2A3929CA-A96A-F88F-BBE3-BA7583416CE1}"/>
+                <a16:creationId xmlns:a16="http://schemas.microsoft.com/office/drawing/2014/main" xmlns="" id="{2A3929CA-A96A-F88F-BBE3-BA7583416CE1}"/>
               </a:ext>
             </a:extLst>
           </p:cNvPr>
@@ -7507,7 +7507,7 @@
           <p:cNvPr id="112" name="Conector angular 111">
             <a:extLst>
               <a:ext uri="{FF2B5EF4-FFF2-40B4-BE49-F238E27FC236}">
-                <a16:creationId xmlns:a16="http://schemas.microsoft.com/office/drawing/2014/main" id="{52D6713A-ED34-66E2-4C3F-78ECA941BDA5}"/>
+                <a16:creationId xmlns:a16="http://schemas.microsoft.com/office/drawing/2014/main" xmlns="" id="{52D6713A-ED34-66E2-4C3F-78ECA941BDA5}"/>
               </a:ext>
             </a:extLst>
           </p:cNvPr>
@@ -7550,7 +7550,7 @@
           <p:cNvPr id="116" name="CuadroTexto 115">
             <a:extLst>
               <a:ext uri="{FF2B5EF4-FFF2-40B4-BE49-F238E27FC236}">
-                <a16:creationId xmlns:a16="http://schemas.microsoft.com/office/drawing/2014/main" id="{6C3D0BEF-523F-271F-EC2A-5E81FD4F8903}"/>
+                <a16:creationId xmlns:a16="http://schemas.microsoft.com/office/drawing/2014/main" xmlns="" id="{6C3D0BEF-523F-271F-EC2A-5E81FD4F8903}"/>
               </a:ext>
             </a:extLst>
           </p:cNvPr>
@@ -7585,7 +7585,7 @@
           <p:cNvPr id="117" name="CuadroTexto 116">
             <a:extLst>
               <a:ext uri="{FF2B5EF4-FFF2-40B4-BE49-F238E27FC236}">
-                <a16:creationId xmlns:a16="http://schemas.microsoft.com/office/drawing/2014/main" id="{99527D0E-F5FD-9216-0430-2B3D25260E5B}"/>
+                <a16:creationId xmlns:a16="http://schemas.microsoft.com/office/drawing/2014/main" xmlns="" id="{99527D0E-F5FD-9216-0430-2B3D25260E5B}"/>
               </a:ext>
             </a:extLst>
           </p:cNvPr>
@@ -7620,7 +7620,7 @@
           <p:cNvPr id="118" name="CuadroTexto 117">
             <a:extLst>
               <a:ext uri="{FF2B5EF4-FFF2-40B4-BE49-F238E27FC236}">
-                <a16:creationId xmlns:a16="http://schemas.microsoft.com/office/drawing/2014/main" id="{A04DC27A-307B-C37C-5028-1EC7CA9C0C7C}"/>
+                <a16:creationId xmlns:a16="http://schemas.microsoft.com/office/drawing/2014/main" xmlns="" id="{A04DC27A-307B-C37C-5028-1EC7CA9C0C7C}"/>
               </a:ext>
             </a:extLst>
           </p:cNvPr>
@@ -7655,7 +7655,7 @@
           <p:cNvPr id="119" name="CuadroTexto 118">
             <a:extLst>
               <a:ext uri="{FF2B5EF4-FFF2-40B4-BE49-F238E27FC236}">
-                <a16:creationId xmlns:a16="http://schemas.microsoft.com/office/drawing/2014/main" id="{862DDE4C-5947-6AAA-5EB6-0B5C6788F0A4}"/>
+                <a16:creationId xmlns:a16="http://schemas.microsoft.com/office/drawing/2014/main" xmlns="" id="{862DDE4C-5947-6AAA-5EB6-0B5C6788F0A4}"/>
               </a:ext>
             </a:extLst>
           </p:cNvPr>
@@ -7690,7 +7690,7 @@
           <p:cNvPr id="120" name="Rectángulo 119">
             <a:extLst>
               <a:ext uri="{FF2B5EF4-FFF2-40B4-BE49-F238E27FC236}">
-                <a16:creationId xmlns:a16="http://schemas.microsoft.com/office/drawing/2014/main" id="{82D3AD4E-267E-B485-2A7E-CEB783E0BEDC}"/>
+                <a16:creationId xmlns:a16="http://schemas.microsoft.com/office/drawing/2014/main" xmlns="" id="{82D3AD4E-267E-B485-2A7E-CEB783E0BEDC}"/>
               </a:ext>
             </a:extLst>
           </p:cNvPr>
@@ -7748,7 +7748,7 @@
           <p:cNvPr id="121" name="Rectángulo 120">
             <a:extLst>
               <a:ext uri="{FF2B5EF4-FFF2-40B4-BE49-F238E27FC236}">
-                <a16:creationId xmlns:a16="http://schemas.microsoft.com/office/drawing/2014/main" id="{167B5BAA-788D-9EBE-D1C7-B70E52DCDB2F}"/>
+                <a16:creationId xmlns:a16="http://schemas.microsoft.com/office/drawing/2014/main" xmlns="" id="{167B5BAA-788D-9EBE-D1C7-B70E52DCDB2F}"/>
               </a:ext>
             </a:extLst>
           </p:cNvPr>
@@ -7806,7 +7806,7 @@
           <p:cNvPr id="122" name="Abrir llave 121">
             <a:extLst>
               <a:ext uri="{FF2B5EF4-FFF2-40B4-BE49-F238E27FC236}">
-                <a16:creationId xmlns:a16="http://schemas.microsoft.com/office/drawing/2014/main" id="{D1198275-CA54-B409-B882-B73D4E146A82}"/>
+                <a16:creationId xmlns:a16="http://schemas.microsoft.com/office/drawing/2014/main" xmlns="" id="{D1198275-CA54-B409-B882-B73D4E146A82}"/>
               </a:ext>
             </a:extLst>
           </p:cNvPr>
@@ -7850,7 +7850,7 @@
           <p:cNvPr id="123" name="CuadroTexto 122">
             <a:extLst>
               <a:ext uri="{FF2B5EF4-FFF2-40B4-BE49-F238E27FC236}">
-                <a16:creationId xmlns:a16="http://schemas.microsoft.com/office/drawing/2014/main" id="{B0FD5605-8648-6848-EFA4-15B509B22976}"/>
+                <a16:creationId xmlns:a16="http://schemas.microsoft.com/office/drawing/2014/main" xmlns="" id="{B0FD5605-8648-6848-EFA4-15B509B22976}"/>
               </a:ext>
             </a:extLst>
           </p:cNvPr>
@@ -7885,7 +7885,7 @@
           <p:cNvPr id="124" name="CuadroTexto 123">
             <a:extLst>
               <a:ext uri="{FF2B5EF4-FFF2-40B4-BE49-F238E27FC236}">
-                <a16:creationId xmlns:a16="http://schemas.microsoft.com/office/drawing/2014/main" id="{50692991-6E28-6D25-70B2-C3147750DE0D}"/>
+                <a16:creationId xmlns:a16="http://schemas.microsoft.com/office/drawing/2014/main" xmlns="" id="{50692991-6E28-6D25-70B2-C3147750DE0D}"/>
               </a:ext>
             </a:extLst>
           </p:cNvPr>
@@ -7932,7 +7932,7 @@
           <p:cNvPr id="125" name="CuadroTexto 124">
             <a:extLst>
               <a:ext uri="{FF2B5EF4-FFF2-40B4-BE49-F238E27FC236}">
-                <a16:creationId xmlns:a16="http://schemas.microsoft.com/office/drawing/2014/main" id="{8FE3B799-1F0B-7E1E-9710-A8692EA8E647}"/>
+                <a16:creationId xmlns:a16="http://schemas.microsoft.com/office/drawing/2014/main" xmlns="" id="{8FE3B799-1F0B-7E1E-9710-A8692EA8E647}"/>
               </a:ext>
             </a:extLst>
           </p:cNvPr>
@@ -7967,7 +7967,7 @@
           <p:cNvPr id="136" name="CuadroTexto 135">
             <a:extLst>
               <a:ext uri="{FF2B5EF4-FFF2-40B4-BE49-F238E27FC236}">
-                <a16:creationId xmlns:a16="http://schemas.microsoft.com/office/drawing/2014/main" id="{A2FD1BC5-0310-C7A1-0BCE-7F7F464B23B6}"/>
+                <a16:creationId xmlns:a16="http://schemas.microsoft.com/office/drawing/2014/main" xmlns="" id="{A2FD1BC5-0310-C7A1-0BCE-7F7F464B23B6}"/>
               </a:ext>
             </a:extLst>
           </p:cNvPr>
@@ -8032,7 +8032,7 @@
           <p:cNvPr id="231" name="Rectángulo 230">
             <a:extLst>
               <a:ext uri="{FF2B5EF4-FFF2-40B4-BE49-F238E27FC236}">
-                <a16:creationId xmlns:a16="http://schemas.microsoft.com/office/drawing/2014/main" id="{97354863-13F8-4AC7-C4F2-F3E5F4CBE2C0}"/>
+                <a16:creationId xmlns:a16="http://schemas.microsoft.com/office/drawing/2014/main" xmlns="" id="{97354863-13F8-4AC7-C4F2-F3E5F4CBE2C0}"/>
               </a:ext>
             </a:extLst>
           </p:cNvPr>
@@ -8079,7 +8079,7 @@
           <p:cNvPr id="4" name="Rectángulo 3">
             <a:extLst>
               <a:ext uri="{FF2B5EF4-FFF2-40B4-BE49-F238E27FC236}">
-                <a16:creationId xmlns:a16="http://schemas.microsoft.com/office/drawing/2014/main" id="{50299D0B-F828-23E8-7A1F-BD322D30789A}"/>
+                <a16:creationId xmlns:a16="http://schemas.microsoft.com/office/drawing/2014/main" xmlns="" id="{50299D0B-F828-23E8-7A1F-BD322D30789A}"/>
               </a:ext>
             </a:extLst>
           </p:cNvPr>
@@ -8128,7 +8128,7 @@
           <p:cNvPr id="5" name="Rectángulo 4">
             <a:extLst>
               <a:ext uri="{FF2B5EF4-FFF2-40B4-BE49-F238E27FC236}">
-                <a16:creationId xmlns:a16="http://schemas.microsoft.com/office/drawing/2014/main" id="{F9E878FE-D71D-FBDF-C9E5-E9E91FA40087}"/>
+                <a16:creationId xmlns:a16="http://schemas.microsoft.com/office/drawing/2014/main" xmlns="" id="{F9E878FE-D71D-FBDF-C9E5-E9E91FA40087}"/>
               </a:ext>
             </a:extLst>
           </p:cNvPr>
@@ -8187,7 +8187,7 @@
           <p:cNvPr id="7" name="Conector recto de flecha 6">
             <a:extLst>
               <a:ext uri="{FF2B5EF4-FFF2-40B4-BE49-F238E27FC236}">
-                <a16:creationId xmlns:a16="http://schemas.microsoft.com/office/drawing/2014/main" id="{20DF3A8D-E89C-BCBB-51D4-D4354EA2534C}"/>
+                <a16:creationId xmlns:a16="http://schemas.microsoft.com/office/drawing/2014/main" xmlns="" id="{20DF3A8D-E89C-BCBB-51D4-D4354EA2534C}"/>
               </a:ext>
             </a:extLst>
           </p:cNvPr>
@@ -8230,7 +8230,7 @@
           <p:cNvPr id="8" name="Rectángulo 7">
             <a:extLst>
               <a:ext uri="{FF2B5EF4-FFF2-40B4-BE49-F238E27FC236}">
-                <a16:creationId xmlns:a16="http://schemas.microsoft.com/office/drawing/2014/main" id="{F9C0A696-566D-C9B9-B032-B4B421C86F24}"/>
+                <a16:creationId xmlns:a16="http://schemas.microsoft.com/office/drawing/2014/main" xmlns="" id="{F9C0A696-566D-C9B9-B032-B4B421C86F24}"/>
               </a:ext>
             </a:extLst>
           </p:cNvPr>
@@ -8289,7 +8289,7 @@
           <p:cNvPr id="41" name="Rectángulo 40">
             <a:extLst>
               <a:ext uri="{FF2B5EF4-FFF2-40B4-BE49-F238E27FC236}">
-                <a16:creationId xmlns:a16="http://schemas.microsoft.com/office/drawing/2014/main" id="{8CD60801-972C-CBAE-297B-C79AFDE606D2}"/>
+                <a16:creationId xmlns:a16="http://schemas.microsoft.com/office/drawing/2014/main" xmlns="" id="{8CD60801-972C-CBAE-297B-C79AFDE606D2}"/>
               </a:ext>
             </a:extLst>
           </p:cNvPr>
@@ -8338,7 +8338,7 @@
           <p:cNvPr id="42" name="Rectángulo 41">
             <a:extLst>
               <a:ext uri="{FF2B5EF4-FFF2-40B4-BE49-F238E27FC236}">
-                <a16:creationId xmlns:a16="http://schemas.microsoft.com/office/drawing/2014/main" id="{FD9CB591-DF6C-4CA4-15C0-9B1701D1518B}"/>
+                <a16:creationId xmlns:a16="http://schemas.microsoft.com/office/drawing/2014/main" xmlns="" id="{FD9CB591-DF6C-4CA4-15C0-9B1701D1518B}"/>
               </a:ext>
             </a:extLst>
           </p:cNvPr>
@@ -8397,7 +8397,7 @@
           <p:cNvPr id="43" name="Conector recto de flecha 42">
             <a:extLst>
               <a:ext uri="{FF2B5EF4-FFF2-40B4-BE49-F238E27FC236}">
-                <a16:creationId xmlns:a16="http://schemas.microsoft.com/office/drawing/2014/main" id="{7788DEB9-F0EF-8F98-CB0E-AE2790710A95}"/>
+                <a16:creationId xmlns:a16="http://schemas.microsoft.com/office/drawing/2014/main" xmlns="" id="{7788DEB9-F0EF-8F98-CB0E-AE2790710A95}"/>
               </a:ext>
             </a:extLst>
           </p:cNvPr>
@@ -8440,7 +8440,7 @@
           <p:cNvPr id="48" name="Conector angular 47">
             <a:extLst>
               <a:ext uri="{FF2B5EF4-FFF2-40B4-BE49-F238E27FC236}">
-                <a16:creationId xmlns:a16="http://schemas.microsoft.com/office/drawing/2014/main" id="{D81B295A-52E7-D71F-3912-AF3BFEC49458}"/>
+                <a16:creationId xmlns:a16="http://schemas.microsoft.com/office/drawing/2014/main" xmlns="" id="{D81B295A-52E7-D71F-3912-AF3BFEC49458}"/>
               </a:ext>
             </a:extLst>
           </p:cNvPr>
@@ -8483,7 +8483,7 @@
           <p:cNvPr id="79" name="Rectángulo 78">
             <a:extLst>
               <a:ext uri="{FF2B5EF4-FFF2-40B4-BE49-F238E27FC236}">
-                <a16:creationId xmlns:a16="http://schemas.microsoft.com/office/drawing/2014/main" id="{82D4EF91-09FB-23B0-7977-BB504DBBD7F7}"/>
+                <a16:creationId xmlns:a16="http://schemas.microsoft.com/office/drawing/2014/main" xmlns="" id="{82D4EF91-09FB-23B0-7977-BB504DBBD7F7}"/>
               </a:ext>
             </a:extLst>
           </p:cNvPr>
@@ -8532,7 +8532,7 @@
           <p:cNvPr id="80" name="Rectángulo 79">
             <a:extLst>
               <a:ext uri="{FF2B5EF4-FFF2-40B4-BE49-F238E27FC236}">
-                <a16:creationId xmlns:a16="http://schemas.microsoft.com/office/drawing/2014/main" id="{A2A02225-0710-5BCB-84BD-2EB963BD9654}"/>
+                <a16:creationId xmlns:a16="http://schemas.microsoft.com/office/drawing/2014/main" xmlns="" id="{A2A02225-0710-5BCB-84BD-2EB963BD9654}"/>
               </a:ext>
             </a:extLst>
           </p:cNvPr>
@@ -8591,7 +8591,7 @@
           <p:cNvPr id="81" name="Conector recto de flecha 80">
             <a:extLst>
               <a:ext uri="{FF2B5EF4-FFF2-40B4-BE49-F238E27FC236}">
-                <a16:creationId xmlns:a16="http://schemas.microsoft.com/office/drawing/2014/main" id="{18BA2644-875D-CDD0-C1B4-131F46AB55C6}"/>
+                <a16:creationId xmlns:a16="http://schemas.microsoft.com/office/drawing/2014/main" xmlns="" id="{18BA2644-875D-CDD0-C1B4-131F46AB55C6}"/>
               </a:ext>
             </a:extLst>
           </p:cNvPr>
@@ -8634,7 +8634,7 @@
           <p:cNvPr id="118" name="CuadroTexto 117">
             <a:extLst>
               <a:ext uri="{FF2B5EF4-FFF2-40B4-BE49-F238E27FC236}">
-                <a16:creationId xmlns:a16="http://schemas.microsoft.com/office/drawing/2014/main" id="{A04DC27A-307B-C37C-5028-1EC7CA9C0C7C}"/>
+                <a16:creationId xmlns:a16="http://schemas.microsoft.com/office/drawing/2014/main" xmlns="" id="{A04DC27A-307B-C37C-5028-1EC7CA9C0C7C}"/>
               </a:ext>
             </a:extLst>
           </p:cNvPr>
@@ -8669,7 +8669,7 @@
           <p:cNvPr id="20" name="Rectángulo 19">
             <a:extLst>
               <a:ext uri="{FF2B5EF4-FFF2-40B4-BE49-F238E27FC236}">
-                <a16:creationId xmlns:a16="http://schemas.microsoft.com/office/drawing/2014/main" id="{F60B0B7E-DE6F-0830-EC82-3DEE24A82B62}"/>
+                <a16:creationId xmlns:a16="http://schemas.microsoft.com/office/drawing/2014/main" xmlns="" id="{F60B0B7E-DE6F-0830-EC82-3DEE24A82B62}"/>
               </a:ext>
             </a:extLst>
           </p:cNvPr>
@@ -8728,7 +8728,7 @@
           <p:cNvPr id="24" name="Rectángulo 23">
             <a:extLst>
               <a:ext uri="{FF2B5EF4-FFF2-40B4-BE49-F238E27FC236}">
-                <a16:creationId xmlns:a16="http://schemas.microsoft.com/office/drawing/2014/main" id="{EC106E45-42F5-8E1B-A83F-4C2CA1EA6A7F}"/>
+                <a16:creationId xmlns:a16="http://schemas.microsoft.com/office/drawing/2014/main" xmlns="" id="{EC106E45-42F5-8E1B-A83F-4C2CA1EA6A7F}"/>
               </a:ext>
             </a:extLst>
           </p:cNvPr>
@@ -8787,7 +8787,7 @@
           <p:cNvPr id="25" name="Rectángulo 24">
             <a:extLst>
               <a:ext uri="{FF2B5EF4-FFF2-40B4-BE49-F238E27FC236}">
-                <a16:creationId xmlns:a16="http://schemas.microsoft.com/office/drawing/2014/main" id="{E50364BC-331E-6A3C-DB80-A7C3CFA4719A}"/>
+                <a16:creationId xmlns:a16="http://schemas.microsoft.com/office/drawing/2014/main" xmlns="" id="{E50364BC-331E-6A3C-DB80-A7C3CFA4719A}"/>
               </a:ext>
             </a:extLst>
           </p:cNvPr>
@@ -8846,7 +8846,7 @@
           <p:cNvPr id="27" name="Rectángulo 26">
             <a:extLst>
               <a:ext uri="{FF2B5EF4-FFF2-40B4-BE49-F238E27FC236}">
-                <a16:creationId xmlns:a16="http://schemas.microsoft.com/office/drawing/2014/main" id="{CA91E6AC-44EE-7006-036A-D177DEAEFFDC}"/>
+                <a16:creationId xmlns:a16="http://schemas.microsoft.com/office/drawing/2014/main" xmlns="" id="{CA91E6AC-44EE-7006-036A-D177DEAEFFDC}"/>
               </a:ext>
             </a:extLst>
           </p:cNvPr>
@@ -8905,7 +8905,7 @@
           <p:cNvPr id="28" name="Rectángulo 27">
             <a:extLst>
               <a:ext uri="{FF2B5EF4-FFF2-40B4-BE49-F238E27FC236}">
-                <a16:creationId xmlns:a16="http://schemas.microsoft.com/office/drawing/2014/main" id="{AD136541-81CB-4F08-2816-DEEF229143BE}"/>
+                <a16:creationId xmlns:a16="http://schemas.microsoft.com/office/drawing/2014/main" xmlns="" id="{AD136541-81CB-4F08-2816-DEEF229143BE}"/>
               </a:ext>
             </a:extLst>
           </p:cNvPr>
@@ -8964,7 +8964,7 @@
           <p:cNvPr id="29" name="Rectángulo 28">
             <a:extLst>
               <a:ext uri="{FF2B5EF4-FFF2-40B4-BE49-F238E27FC236}">
-                <a16:creationId xmlns:a16="http://schemas.microsoft.com/office/drawing/2014/main" id="{2CC16F00-B541-A5E9-4997-D432084B1BA0}"/>
+                <a16:creationId xmlns:a16="http://schemas.microsoft.com/office/drawing/2014/main" xmlns="" id="{2CC16F00-B541-A5E9-4997-D432084B1BA0}"/>
               </a:ext>
             </a:extLst>
           </p:cNvPr>
@@ -9023,7 +9023,7 @@
           <p:cNvPr id="30" name="Rectángulo 29">
             <a:extLst>
               <a:ext uri="{FF2B5EF4-FFF2-40B4-BE49-F238E27FC236}">
-                <a16:creationId xmlns:a16="http://schemas.microsoft.com/office/drawing/2014/main" id="{8B489418-8DA7-F622-4B9F-B75B7A68F39E}"/>
+                <a16:creationId xmlns:a16="http://schemas.microsoft.com/office/drawing/2014/main" xmlns="" id="{8B489418-8DA7-F622-4B9F-B75B7A68F39E}"/>
               </a:ext>
             </a:extLst>
           </p:cNvPr>
@@ -9082,7 +9082,7 @@
           <p:cNvPr id="31" name="Rectángulo 30">
             <a:extLst>
               <a:ext uri="{FF2B5EF4-FFF2-40B4-BE49-F238E27FC236}">
-                <a16:creationId xmlns:a16="http://schemas.microsoft.com/office/drawing/2014/main" id="{BC36BE83-A16B-96F8-C79C-08E301B19894}"/>
+                <a16:creationId xmlns:a16="http://schemas.microsoft.com/office/drawing/2014/main" xmlns="" id="{BC36BE83-A16B-96F8-C79C-08E301B19894}"/>
               </a:ext>
             </a:extLst>
           </p:cNvPr>
@@ -9141,7 +9141,7 @@
           <p:cNvPr id="107" name="Conector angular 106">
             <a:extLst>
               <a:ext uri="{FF2B5EF4-FFF2-40B4-BE49-F238E27FC236}">
-                <a16:creationId xmlns:a16="http://schemas.microsoft.com/office/drawing/2014/main" id="{4C918E83-5557-1E6A-F776-21FFCEF00F07}"/>
+                <a16:creationId xmlns:a16="http://schemas.microsoft.com/office/drawing/2014/main" xmlns="" id="{4C918E83-5557-1E6A-F776-21FFCEF00F07}"/>
               </a:ext>
             </a:extLst>
           </p:cNvPr>
@@ -9184,7 +9184,7 @@
           <p:cNvPr id="110" name="Rectángulo 109">
             <a:extLst>
               <a:ext uri="{FF2B5EF4-FFF2-40B4-BE49-F238E27FC236}">
-                <a16:creationId xmlns:a16="http://schemas.microsoft.com/office/drawing/2014/main" id="{32D6F13B-7CFE-0DA3-7C65-6479C9C25AF2}"/>
+                <a16:creationId xmlns:a16="http://schemas.microsoft.com/office/drawing/2014/main" xmlns="" id="{32D6F13B-7CFE-0DA3-7C65-6479C9C25AF2}"/>
               </a:ext>
             </a:extLst>
           </p:cNvPr>
@@ -9243,7 +9243,7 @@
           <p:cNvPr id="111" name="Rectángulo 110">
             <a:extLst>
               <a:ext uri="{FF2B5EF4-FFF2-40B4-BE49-F238E27FC236}">
-                <a16:creationId xmlns:a16="http://schemas.microsoft.com/office/drawing/2014/main" id="{79533871-17BA-1CE3-07FB-E1FFA0907ADE}"/>
+                <a16:creationId xmlns:a16="http://schemas.microsoft.com/office/drawing/2014/main" xmlns="" id="{79533871-17BA-1CE3-07FB-E1FFA0907ADE}"/>
               </a:ext>
             </a:extLst>
           </p:cNvPr>
@@ -9302,7 +9302,7 @@
           <p:cNvPr id="114" name="Rectángulo 113">
             <a:extLst>
               <a:ext uri="{FF2B5EF4-FFF2-40B4-BE49-F238E27FC236}">
-                <a16:creationId xmlns:a16="http://schemas.microsoft.com/office/drawing/2014/main" id="{4CE7F5CE-6432-366E-3B84-5A4CBAFBB7CA}"/>
+                <a16:creationId xmlns:a16="http://schemas.microsoft.com/office/drawing/2014/main" xmlns="" id="{4CE7F5CE-6432-366E-3B84-5A4CBAFBB7CA}"/>
               </a:ext>
             </a:extLst>
           </p:cNvPr>
@@ -9361,7 +9361,7 @@
           <p:cNvPr id="126" name="Rectángulo 125">
             <a:extLst>
               <a:ext uri="{FF2B5EF4-FFF2-40B4-BE49-F238E27FC236}">
-                <a16:creationId xmlns:a16="http://schemas.microsoft.com/office/drawing/2014/main" id="{AC789DCD-7B2C-2458-417D-E71805A00F36}"/>
+                <a16:creationId xmlns:a16="http://schemas.microsoft.com/office/drawing/2014/main" xmlns="" id="{AC789DCD-7B2C-2458-417D-E71805A00F36}"/>
               </a:ext>
             </a:extLst>
           </p:cNvPr>
@@ -9420,7 +9420,7 @@
           <p:cNvPr id="129" name="Rectángulo 128">
             <a:extLst>
               <a:ext uri="{FF2B5EF4-FFF2-40B4-BE49-F238E27FC236}">
-                <a16:creationId xmlns:a16="http://schemas.microsoft.com/office/drawing/2014/main" id="{7DEE8C02-A0F8-DB83-60EE-994420413ACC}"/>
+                <a16:creationId xmlns:a16="http://schemas.microsoft.com/office/drawing/2014/main" xmlns="" id="{7DEE8C02-A0F8-DB83-60EE-994420413ACC}"/>
               </a:ext>
             </a:extLst>
           </p:cNvPr>
@@ -9479,7 +9479,7 @@
           <p:cNvPr id="131" name="Rectángulo 130">
             <a:extLst>
               <a:ext uri="{FF2B5EF4-FFF2-40B4-BE49-F238E27FC236}">
-                <a16:creationId xmlns:a16="http://schemas.microsoft.com/office/drawing/2014/main" id="{3C4D0E0A-17A1-63D0-B680-5546C9BDBDC7}"/>
+                <a16:creationId xmlns:a16="http://schemas.microsoft.com/office/drawing/2014/main" xmlns="" id="{3C4D0E0A-17A1-63D0-B680-5546C9BDBDC7}"/>
               </a:ext>
             </a:extLst>
           </p:cNvPr>
@@ -9538,7 +9538,7 @@
           <p:cNvPr id="133" name="Rectángulo 132">
             <a:extLst>
               <a:ext uri="{FF2B5EF4-FFF2-40B4-BE49-F238E27FC236}">
-                <a16:creationId xmlns:a16="http://schemas.microsoft.com/office/drawing/2014/main" id="{D33FE729-4BC1-C67C-DE77-F9F7C1434727}"/>
+                <a16:creationId xmlns:a16="http://schemas.microsoft.com/office/drawing/2014/main" xmlns="" id="{D33FE729-4BC1-C67C-DE77-F9F7C1434727}"/>
               </a:ext>
             </a:extLst>
           </p:cNvPr>
@@ -9597,7 +9597,7 @@
           <p:cNvPr id="135" name="Rectángulo 134">
             <a:extLst>
               <a:ext uri="{FF2B5EF4-FFF2-40B4-BE49-F238E27FC236}">
-                <a16:creationId xmlns:a16="http://schemas.microsoft.com/office/drawing/2014/main" id="{264DC577-BE5F-1635-0A31-AF9317F4AC9F}"/>
+                <a16:creationId xmlns:a16="http://schemas.microsoft.com/office/drawing/2014/main" xmlns="" id="{264DC577-BE5F-1635-0A31-AF9317F4AC9F}"/>
               </a:ext>
             </a:extLst>
           </p:cNvPr>
@@ -9656,7 +9656,7 @@
           <p:cNvPr id="138" name="Rectángulo 137">
             <a:extLst>
               <a:ext uri="{FF2B5EF4-FFF2-40B4-BE49-F238E27FC236}">
-                <a16:creationId xmlns:a16="http://schemas.microsoft.com/office/drawing/2014/main" id="{9A93EF46-F064-2BB4-FD5C-4933717B13D1}"/>
+                <a16:creationId xmlns:a16="http://schemas.microsoft.com/office/drawing/2014/main" xmlns="" id="{9A93EF46-F064-2BB4-FD5C-4933717B13D1}"/>
               </a:ext>
             </a:extLst>
           </p:cNvPr>
@@ -9715,7 +9715,7 @@
           <p:cNvPr id="140" name="Rectángulo 139">
             <a:extLst>
               <a:ext uri="{FF2B5EF4-FFF2-40B4-BE49-F238E27FC236}">
-                <a16:creationId xmlns:a16="http://schemas.microsoft.com/office/drawing/2014/main" id="{5C006779-C920-07F9-7506-5EEFC2B3142C}"/>
+                <a16:creationId xmlns:a16="http://schemas.microsoft.com/office/drawing/2014/main" xmlns="" id="{5C006779-C920-07F9-7506-5EEFC2B3142C}"/>
               </a:ext>
             </a:extLst>
           </p:cNvPr>
@@ -9774,7 +9774,7 @@
           <p:cNvPr id="147" name="Rectángulo 146">
             <a:extLst>
               <a:ext uri="{FF2B5EF4-FFF2-40B4-BE49-F238E27FC236}">
-                <a16:creationId xmlns:a16="http://schemas.microsoft.com/office/drawing/2014/main" id="{F7978295-5534-52AC-B9B8-3B447C11D43B}"/>
+                <a16:creationId xmlns:a16="http://schemas.microsoft.com/office/drawing/2014/main" xmlns="" id="{F7978295-5534-52AC-B9B8-3B447C11D43B}"/>
               </a:ext>
             </a:extLst>
           </p:cNvPr>
@@ -9844,7 +9844,7 @@
           <p:cNvPr id="153" name="Conector recto de flecha 152">
             <a:extLst>
               <a:ext uri="{FF2B5EF4-FFF2-40B4-BE49-F238E27FC236}">
-                <a16:creationId xmlns:a16="http://schemas.microsoft.com/office/drawing/2014/main" id="{EB246504-7426-7F90-30E6-7AE7556A9DBA}"/>
+                <a16:creationId xmlns:a16="http://schemas.microsoft.com/office/drawing/2014/main" xmlns="" id="{EB246504-7426-7F90-30E6-7AE7556A9DBA}"/>
               </a:ext>
             </a:extLst>
           </p:cNvPr>
@@ -9885,7 +9885,7 @@
           <p:cNvPr id="154" name="Rectángulo 153">
             <a:extLst>
               <a:ext uri="{FF2B5EF4-FFF2-40B4-BE49-F238E27FC236}">
-                <a16:creationId xmlns:a16="http://schemas.microsoft.com/office/drawing/2014/main" id="{0CFBD426-F36C-6F95-CF60-91AECF056AFD}"/>
+                <a16:creationId xmlns:a16="http://schemas.microsoft.com/office/drawing/2014/main" xmlns="" id="{0CFBD426-F36C-6F95-CF60-91AECF056AFD}"/>
               </a:ext>
             </a:extLst>
           </p:cNvPr>
@@ -9934,7 +9934,7 @@
           <p:cNvPr id="155" name="Rectángulo 154">
             <a:extLst>
               <a:ext uri="{FF2B5EF4-FFF2-40B4-BE49-F238E27FC236}">
-                <a16:creationId xmlns:a16="http://schemas.microsoft.com/office/drawing/2014/main" id="{163F9EF4-9B98-2A18-D570-47DBD1C944C7}"/>
+                <a16:creationId xmlns:a16="http://schemas.microsoft.com/office/drawing/2014/main" xmlns="" id="{163F9EF4-9B98-2A18-D570-47DBD1C944C7}"/>
               </a:ext>
             </a:extLst>
           </p:cNvPr>
@@ -9993,7 +9993,7 @@
           <p:cNvPr id="156" name="Conector recto de flecha 155">
             <a:extLst>
               <a:ext uri="{FF2B5EF4-FFF2-40B4-BE49-F238E27FC236}">
-                <a16:creationId xmlns:a16="http://schemas.microsoft.com/office/drawing/2014/main" id="{4720E8DE-83CD-55D7-4ED6-BC1A1B239CBD}"/>
+                <a16:creationId xmlns:a16="http://schemas.microsoft.com/office/drawing/2014/main" xmlns="" id="{4720E8DE-83CD-55D7-4ED6-BC1A1B239CBD}"/>
               </a:ext>
             </a:extLst>
           </p:cNvPr>
@@ -10036,7 +10036,7 @@
           <p:cNvPr id="157" name="Conector recto de flecha 156">
             <a:extLst>
               <a:ext uri="{FF2B5EF4-FFF2-40B4-BE49-F238E27FC236}">
-                <a16:creationId xmlns:a16="http://schemas.microsoft.com/office/drawing/2014/main" id="{1CA3AF30-DBB6-DBAA-940A-4D885B6BBB7B}"/>
+                <a16:creationId xmlns:a16="http://schemas.microsoft.com/office/drawing/2014/main" xmlns="" id="{1CA3AF30-DBB6-DBAA-940A-4D885B6BBB7B}"/>
               </a:ext>
             </a:extLst>
           </p:cNvPr>
@@ -10077,7 +10077,7 @@
           <p:cNvPr id="159" name="Rectángulo 158">
             <a:extLst>
               <a:ext uri="{FF2B5EF4-FFF2-40B4-BE49-F238E27FC236}">
-                <a16:creationId xmlns:a16="http://schemas.microsoft.com/office/drawing/2014/main" id="{9945424D-973D-85DC-05AB-16B2071FC33D}"/>
+                <a16:creationId xmlns:a16="http://schemas.microsoft.com/office/drawing/2014/main" xmlns="" id="{9945424D-973D-85DC-05AB-16B2071FC33D}"/>
               </a:ext>
             </a:extLst>
           </p:cNvPr>
@@ -10147,7 +10147,7 @@
           <p:cNvPr id="160" name="Rectángulo 159">
             <a:extLst>
               <a:ext uri="{FF2B5EF4-FFF2-40B4-BE49-F238E27FC236}">
-                <a16:creationId xmlns:a16="http://schemas.microsoft.com/office/drawing/2014/main" id="{88140AE8-24B9-0FAF-4C3E-168395A9E3D5}"/>
+                <a16:creationId xmlns:a16="http://schemas.microsoft.com/office/drawing/2014/main" xmlns="" id="{88140AE8-24B9-0FAF-4C3E-168395A9E3D5}"/>
               </a:ext>
             </a:extLst>
           </p:cNvPr>
@@ -10196,7 +10196,7 @@
           <p:cNvPr id="161" name="Rectángulo 160">
             <a:extLst>
               <a:ext uri="{FF2B5EF4-FFF2-40B4-BE49-F238E27FC236}">
-                <a16:creationId xmlns:a16="http://schemas.microsoft.com/office/drawing/2014/main" id="{9F6D98BC-2076-4F9F-AC4F-96EA614AD6DA}"/>
+                <a16:creationId xmlns:a16="http://schemas.microsoft.com/office/drawing/2014/main" xmlns="" id="{9F6D98BC-2076-4F9F-AC4F-96EA614AD6DA}"/>
               </a:ext>
             </a:extLst>
           </p:cNvPr>
@@ -10255,7 +10255,7 @@
           <p:cNvPr id="162" name="Conector recto de flecha 161">
             <a:extLst>
               <a:ext uri="{FF2B5EF4-FFF2-40B4-BE49-F238E27FC236}">
-                <a16:creationId xmlns:a16="http://schemas.microsoft.com/office/drawing/2014/main" id="{125C251C-D9D0-416D-83D7-EC6C61EDD330}"/>
+                <a16:creationId xmlns:a16="http://schemas.microsoft.com/office/drawing/2014/main" xmlns="" id="{125C251C-D9D0-416D-83D7-EC6C61EDD330}"/>
               </a:ext>
             </a:extLst>
           </p:cNvPr>
@@ -10298,7 +10298,7 @@
           <p:cNvPr id="163" name="Conector angular 162">
             <a:extLst>
               <a:ext uri="{FF2B5EF4-FFF2-40B4-BE49-F238E27FC236}">
-                <a16:creationId xmlns:a16="http://schemas.microsoft.com/office/drawing/2014/main" id="{19A6E3A0-1CBE-FEB0-1C02-FE1022015AF8}"/>
+                <a16:creationId xmlns:a16="http://schemas.microsoft.com/office/drawing/2014/main" xmlns="" id="{19A6E3A0-1CBE-FEB0-1C02-FE1022015AF8}"/>
               </a:ext>
             </a:extLst>
           </p:cNvPr>
@@ -10341,7 +10341,7 @@
           <p:cNvPr id="164" name="CuadroTexto 163">
             <a:extLst>
               <a:ext uri="{FF2B5EF4-FFF2-40B4-BE49-F238E27FC236}">
-                <a16:creationId xmlns:a16="http://schemas.microsoft.com/office/drawing/2014/main" id="{F21E4610-58A7-5D99-D23A-918748B6D734}"/>
+                <a16:creationId xmlns:a16="http://schemas.microsoft.com/office/drawing/2014/main" xmlns="" id="{F21E4610-58A7-5D99-D23A-918748B6D734}"/>
               </a:ext>
             </a:extLst>
           </p:cNvPr>
@@ -10376,7 +10376,7 @@
           <p:cNvPr id="165" name="CuadroTexto 164">
             <a:extLst>
               <a:ext uri="{FF2B5EF4-FFF2-40B4-BE49-F238E27FC236}">
-                <a16:creationId xmlns:a16="http://schemas.microsoft.com/office/drawing/2014/main" id="{22FD59CD-13C1-9A4B-685B-33114ED686E4}"/>
+                <a16:creationId xmlns:a16="http://schemas.microsoft.com/office/drawing/2014/main" xmlns="" id="{22FD59CD-13C1-9A4B-685B-33114ED686E4}"/>
               </a:ext>
             </a:extLst>
           </p:cNvPr>
@@ -10411,7 +10411,7 @@
           <p:cNvPr id="166" name="CuadroTexto 165">
             <a:extLst>
               <a:ext uri="{FF2B5EF4-FFF2-40B4-BE49-F238E27FC236}">
-                <a16:creationId xmlns:a16="http://schemas.microsoft.com/office/drawing/2014/main" id="{DFFF6137-AE3B-C0A9-DBAE-BBE0A538B10B}"/>
+                <a16:creationId xmlns:a16="http://schemas.microsoft.com/office/drawing/2014/main" xmlns="" id="{DFFF6137-AE3B-C0A9-DBAE-BBE0A538B10B}"/>
               </a:ext>
             </a:extLst>
           </p:cNvPr>
@@ -10446,7 +10446,7 @@
           <p:cNvPr id="168" name="Conector recto de flecha 167">
             <a:extLst>
               <a:ext uri="{FF2B5EF4-FFF2-40B4-BE49-F238E27FC236}">
-                <a16:creationId xmlns:a16="http://schemas.microsoft.com/office/drawing/2014/main" id="{A2371E42-FE94-28F4-2C6C-0708FB10E87A}"/>
+                <a16:creationId xmlns:a16="http://schemas.microsoft.com/office/drawing/2014/main" xmlns="" id="{A2371E42-FE94-28F4-2C6C-0708FB10E87A}"/>
               </a:ext>
             </a:extLst>
           </p:cNvPr>
@@ -10485,7 +10485,7 @@
           <p:cNvPr id="169" name="CuadroTexto 168">
             <a:extLst>
               <a:ext uri="{FF2B5EF4-FFF2-40B4-BE49-F238E27FC236}">
-                <a16:creationId xmlns:a16="http://schemas.microsoft.com/office/drawing/2014/main" id="{359EFD4A-B2D2-3494-F694-605A87EAF61B}"/>
+                <a16:creationId xmlns:a16="http://schemas.microsoft.com/office/drawing/2014/main" xmlns="" id="{359EFD4A-B2D2-3494-F694-605A87EAF61B}"/>
               </a:ext>
             </a:extLst>
           </p:cNvPr>
@@ -10520,7 +10520,7 @@
           <p:cNvPr id="170" name="Rectángulo 169">
             <a:extLst>
               <a:ext uri="{FF2B5EF4-FFF2-40B4-BE49-F238E27FC236}">
-                <a16:creationId xmlns:a16="http://schemas.microsoft.com/office/drawing/2014/main" id="{BF4170E8-75C2-9096-F3E8-5877D0D4ED26}"/>
+                <a16:creationId xmlns:a16="http://schemas.microsoft.com/office/drawing/2014/main" xmlns="" id="{BF4170E8-75C2-9096-F3E8-5877D0D4ED26}"/>
               </a:ext>
             </a:extLst>
           </p:cNvPr>
@@ -10579,7 +10579,7 @@
           <p:cNvPr id="171" name="Flecha derecha 170">
             <a:extLst>
               <a:ext uri="{FF2B5EF4-FFF2-40B4-BE49-F238E27FC236}">
-                <a16:creationId xmlns:a16="http://schemas.microsoft.com/office/drawing/2014/main" id="{95DAAB8E-A801-2E0E-5A2E-2AA0D70DA98E}"/>
+                <a16:creationId xmlns:a16="http://schemas.microsoft.com/office/drawing/2014/main" xmlns="" id="{95DAAB8E-A801-2E0E-5A2E-2AA0D70DA98E}"/>
               </a:ext>
             </a:extLst>
           </p:cNvPr>
@@ -10625,7 +10625,7 @@
           <p:cNvPr id="172" name="Flecha derecha 171">
             <a:extLst>
               <a:ext uri="{FF2B5EF4-FFF2-40B4-BE49-F238E27FC236}">
-                <a16:creationId xmlns:a16="http://schemas.microsoft.com/office/drawing/2014/main" id="{DAB8D6E9-3FAB-61EC-9565-1DA97871F928}"/>
+                <a16:creationId xmlns:a16="http://schemas.microsoft.com/office/drawing/2014/main" xmlns="" id="{DAB8D6E9-3FAB-61EC-9565-1DA97871F928}"/>
               </a:ext>
             </a:extLst>
           </p:cNvPr>
@@ -10671,7 +10671,7 @@
           <p:cNvPr id="173" name="CuadroTexto 172">
             <a:extLst>
               <a:ext uri="{FF2B5EF4-FFF2-40B4-BE49-F238E27FC236}">
-                <a16:creationId xmlns:a16="http://schemas.microsoft.com/office/drawing/2014/main" id="{CB10B9E4-577A-5B73-2CE8-C85D6EF2D961}"/>
+                <a16:creationId xmlns:a16="http://schemas.microsoft.com/office/drawing/2014/main" xmlns="" id="{CB10B9E4-577A-5B73-2CE8-C85D6EF2D961}"/>
               </a:ext>
             </a:extLst>
           </p:cNvPr>
@@ -10748,7 +10748,7 @@
           <p:cNvPr id="174" name="Rectángulo 173">
             <a:extLst>
               <a:ext uri="{FF2B5EF4-FFF2-40B4-BE49-F238E27FC236}">
-                <a16:creationId xmlns:a16="http://schemas.microsoft.com/office/drawing/2014/main" id="{B412031C-0C2D-54F9-3A1E-32D6C6C7BDE4}"/>
+                <a16:creationId xmlns:a16="http://schemas.microsoft.com/office/drawing/2014/main" xmlns="" id="{B412031C-0C2D-54F9-3A1E-32D6C6C7BDE4}"/>
               </a:ext>
             </a:extLst>
           </p:cNvPr>
@@ -10807,7 +10807,7 @@
           <p:cNvPr id="175" name="Flecha derecha 174">
             <a:extLst>
               <a:ext uri="{FF2B5EF4-FFF2-40B4-BE49-F238E27FC236}">
-                <a16:creationId xmlns:a16="http://schemas.microsoft.com/office/drawing/2014/main" id="{54636C18-A8B3-2482-06F6-DA7EFEDBDF98}"/>
+                <a16:creationId xmlns:a16="http://schemas.microsoft.com/office/drawing/2014/main" xmlns="" id="{54636C18-A8B3-2482-06F6-DA7EFEDBDF98}"/>
               </a:ext>
             </a:extLst>
           </p:cNvPr>
@@ -10853,7 +10853,7 @@
           <p:cNvPr id="176" name="Flecha derecha 175">
             <a:extLst>
               <a:ext uri="{FF2B5EF4-FFF2-40B4-BE49-F238E27FC236}">
-                <a16:creationId xmlns:a16="http://schemas.microsoft.com/office/drawing/2014/main" id="{B8427374-FA4C-B240-E4E7-D63714C94C1F}"/>
+                <a16:creationId xmlns:a16="http://schemas.microsoft.com/office/drawing/2014/main" xmlns="" id="{B8427374-FA4C-B240-E4E7-D63714C94C1F}"/>
               </a:ext>
             </a:extLst>
           </p:cNvPr>
@@ -10899,7 +10899,7 @@
           <p:cNvPr id="177" name="CuadroTexto 176">
             <a:extLst>
               <a:ext uri="{FF2B5EF4-FFF2-40B4-BE49-F238E27FC236}">
-                <a16:creationId xmlns:a16="http://schemas.microsoft.com/office/drawing/2014/main" id="{445ED7D9-E2B1-C2B6-361E-A0647C107079}"/>
+                <a16:creationId xmlns:a16="http://schemas.microsoft.com/office/drawing/2014/main" xmlns="" id="{445ED7D9-E2B1-C2B6-361E-A0647C107079}"/>
               </a:ext>
             </a:extLst>
           </p:cNvPr>
@@ -10970,7 +10970,7 @@
           <p:cNvPr id="178" name="CuadroTexto 177">
             <a:extLst>
               <a:ext uri="{FF2B5EF4-FFF2-40B4-BE49-F238E27FC236}">
-                <a16:creationId xmlns:a16="http://schemas.microsoft.com/office/drawing/2014/main" id="{F756E17F-D86A-0553-3775-25FE29331483}"/>
+                <a16:creationId xmlns:a16="http://schemas.microsoft.com/office/drawing/2014/main" xmlns="" id="{F756E17F-D86A-0553-3775-25FE29331483}"/>
               </a:ext>
             </a:extLst>
           </p:cNvPr>
@@ -11005,7 +11005,7 @@
           <p:cNvPr id="180" name="CuadroTexto 179">
             <a:extLst>
               <a:ext uri="{FF2B5EF4-FFF2-40B4-BE49-F238E27FC236}">
-                <a16:creationId xmlns:a16="http://schemas.microsoft.com/office/drawing/2014/main" id="{966D2B77-8E88-A956-94CE-A16B584DD24C}"/>
+                <a16:creationId xmlns:a16="http://schemas.microsoft.com/office/drawing/2014/main" xmlns="" id="{966D2B77-8E88-A956-94CE-A16B584DD24C}"/>
               </a:ext>
             </a:extLst>
           </p:cNvPr>
@@ -11040,7 +11040,7 @@
           <p:cNvPr id="181" name="CuadroTexto 180">
             <a:extLst>
               <a:ext uri="{FF2B5EF4-FFF2-40B4-BE49-F238E27FC236}">
-                <a16:creationId xmlns:a16="http://schemas.microsoft.com/office/drawing/2014/main" id="{DEE510DB-A2BD-8ACD-7ED6-C8E97453C610}"/>
+                <a16:creationId xmlns:a16="http://schemas.microsoft.com/office/drawing/2014/main" xmlns="" id="{DEE510DB-A2BD-8ACD-7ED6-C8E97453C610}"/>
               </a:ext>
             </a:extLst>
           </p:cNvPr>
@@ -11075,7 +11075,7 @@
           <p:cNvPr id="182" name="CuadroTexto 181">
             <a:extLst>
               <a:ext uri="{FF2B5EF4-FFF2-40B4-BE49-F238E27FC236}">
-                <a16:creationId xmlns:a16="http://schemas.microsoft.com/office/drawing/2014/main" id="{4F2C724A-7D38-E458-E0AF-05232CF43F39}"/>
+                <a16:creationId xmlns:a16="http://schemas.microsoft.com/office/drawing/2014/main" xmlns="" id="{4F2C724A-7D38-E458-E0AF-05232CF43F39}"/>
               </a:ext>
             </a:extLst>
           </p:cNvPr>
@@ -11110,7 +11110,7 @@
           <p:cNvPr id="183" name="Rectángulo 182">
             <a:extLst>
               <a:ext uri="{FF2B5EF4-FFF2-40B4-BE49-F238E27FC236}">
-                <a16:creationId xmlns:a16="http://schemas.microsoft.com/office/drawing/2014/main" id="{B9A45210-9D58-254A-29FA-452B7E108B89}"/>
+                <a16:creationId xmlns:a16="http://schemas.microsoft.com/office/drawing/2014/main" xmlns="" id="{B9A45210-9D58-254A-29FA-452B7E108B89}"/>
               </a:ext>
             </a:extLst>
           </p:cNvPr>
@@ -11180,7 +11180,7 @@
           <p:cNvPr id="184" name="Flecha derecha 183">
             <a:extLst>
               <a:ext uri="{FF2B5EF4-FFF2-40B4-BE49-F238E27FC236}">
-                <a16:creationId xmlns:a16="http://schemas.microsoft.com/office/drawing/2014/main" id="{BBAC7515-A733-4D63-ACD0-A755236D81DA}"/>
+                <a16:creationId xmlns:a16="http://schemas.microsoft.com/office/drawing/2014/main" xmlns="" id="{BBAC7515-A733-4D63-ACD0-A755236D81DA}"/>
               </a:ext>
             </a:extLst>
           </p:cNvPr>
@@ -11226,7 +11226,7 @@
           <p:cNvPr id="185" name="Flecha derecha 184">
             <a:extLst>
               <a:ext uri="{FF2B5EF4-FFF2-40B4-BE49-F238E27FC236}">
-                <a16:creationId xmlns:a16="http://schemas.microsoft.com/office/drawing/2014/main" id="{D4783150-D301-469A-FFCB-7FA3D112994D}"/>
+                <a16:creationId xmlns:a16="http://schemas.microsoft.com/office/drawing/2014/main" xmlns="" id="{D4783150-D301-469A-FFCB-7FA3D112994D}"/>
               </a:ext>
             </a:extLst>
           </p:cNvPr>
@@ -11272,7 +11272,7 @@
           <p:cNvPr id="186" name="CuadroTexto 185">
             <a:extLst>
               <a:ext uri="{FF2B5EF4-FFF2-40B4-BE49-F238E27FC236}">
-                <a16:creationId xmlns:a16="http://schemas.microsoft.com/office/drawing/2014/main" id="{1BA4A698-7970-F284-DF8E-622079A57D55}"/>
+                <a16:creationId xmlns:a16="http://schemas.microsoft.com/office/drawing/2014/main" xmlns="" id="{1BA4A698-7970-F284-DF8E-622079A57D55}"/>
               </a:ext>
             </a:extLst>
           </p:cNvPr>
@@ -11361,7 +11361,7 @@
           <p:cNvPr id="187" name="CuadroTexto 186">
             <a:extLst>
               <a:ext uri="{FF2B5EF4-FFF2-40B4-BE49-F238E27FC236}">
-                <a16:creationId xmlns:a16="http://schemas.microsoft.com/office/drawing/2014/main" id="{B5F16E53-06B6-C721-553E-391A606C2808}"/>
+                <a16:creationId xmlns:a16="http://schemas.microsoft.com/office/drawing/2014/main" xmlns="" id="{B5F16E53-06B6-C721-553E-391A606C2808}"/>
               </a:ext>
             </a:extLst>
           </p:cNvPr>
@@ -11404,7 +11404,7 @@
           <p:cNvPr id="188" name="CuadroTexto 187">
             <a:extLst>
               <a:ext uri="{FF2B5EF4-FFF2-40B4-BE49-F238E27FC236}">
-                <a16:creationId xmlns:a16="http://schemas.microsoft.com/office/drawing/2014/main" id="{3F8F2342-E9ED-AAF0-EDE3-9BA6623BBCCC}"/>
+                <a16:creationId xmlns:a16="http://schemas.microsoft.com/office/drawing/2014/main" xmlns="" id="{3F8F2342-E9ED-AAF0-EDE3-9BA6623BBCCC}"/>
               </a:ext>
             </a:extLst>
           </p:cNvPr>
@@ -11447,7 +11447,7 @@
           <p:cNvPr id="189" name="Flecha derecha 188">
             <a:extLst>
               <a:ext uri="{FF2B5EF4-FFF2-40B4-BE49-F238E27FC236}">
-                <a16:creationId xmlns:a16="http://schemas.microsoft.com/office/drawing/2014/main" id="{06EAE4B0-7556-BF06-485E-3B108E9F4821}"/>
+                <a16:creationId xmlns:a16="http://schemas.microsoft.com/office/drawing/2014/main" xmlns="" id="{06EAE4B0-7556-BF06-485E-3B108E9F4821}"/>
               </a:ext>
             </a:extLst>
           </p:cNvPr>
@@ -11493,7 +11493,7 @@
           <p:cNvPr id="190" name="CuadroTexto 189">
             <a:extLst>
               <a:ext uri="{FF2B5EF4-FFF2-40B4-BE49-F238E27FC236}">
-                <a16:creationId xmlns:a16="http://schemas.microsoft.com/office/drawing/2014/main" id="{9EF562B3-5253-72EA-5F02-E01C9E345365}"/>
+                <a16:creationId xmlns:a16="http://schemas.microsoft.com/office/drawing/2014/main" xmlns="" id="{9EF562B3-5253-72EA-5F02-E01C9E345365}"/>
               </a:ext>
             </a:extLst>
           </p:cNvPr>
@@ -11536,7 +11536,7 @@
           <p:cNvPr id="191" name="Flecha derecha 190">
             <a:extLst>
               <a:ext uri="{FF2B5EF4-FFF2-40B4-BE49-F238E27FC236}">
-                <a16:creationId xmlns:a16="http://schemas.microsoft.com/office/drawing/2014/main" id="{492F63C2-AC18-C8EE-5D05-F8FDBCC86628}"/>
+                <a16:creationId xmlns:a16="http://schemas.microsoft.com/office/drawing/2014/main" xmlns="" id="{492F63C2-AC18-C8EE-5D05-F8FDBCC86628}"/>
               </a:ext>
             </a:extLst>
           </p:cNvPr>
@@ -11582,7 +11582,7 @@
           <p:cNvPr id="192" name="CuadroTexto 191">
             <a:extLst>
               <a:ext uri="{FF2B5EF4-FFF2-40B4-BE49-F238E27FC236}">
-                <a16:creationId xmlns:a16="http://schemas.microsoft.com/office/drawing/2014/main" id="{AFA797A2-ADD1-1329-E3EF-4F1CA78BFA03}"/>
+                <a16:creationId xmlns:a16="http://schemas.microsoft.com/office/drawing/2014/main" xmlns="" id="{AFA797A2-ADD1-1329-E3EF-4F1CA78BFA03}"/>
               </a:ext>
             </a:extLst>
           </p:cNvPr>
@@ -11625,7 +11625,7 @@
           <p:cNvPr id="193" name="Rectángulo 192">
             <a:extLst>
               <a:ext uri="{FF2B5EF4-FFF2-40B4-BE49-F238E27FC236}">
-                <a16:creationId xmlns:a16="http://schemas.microsoft.com/office/drawing/2014/main" id="{057DB73D-626C-2705-AB36-1F2CFA12929D}"/>
+                <a16:creationId xmlns:a16="http://schemas.microsoft.com/office/drawing/2014/main" xmlns="" id="{057DB73D-626C-2705-AB36-1F2CFA12929D}"/>
               </a:ext>
             </a:extLst>
           </p:cNvPr>
@@ -11684,7 +11684,7 @@
           <p:cNvPr id="194" name="Flecha derecha 193">
             <a:extLst>
               <a:ext uri="{FF2B5EF4-FFF2-40B4-BE49-F238E27FC236}">
-                <a16:creationId xmlns:a16="http://schemas.microsoft.com/office/drawing/2014/main" id="{4210EB42-26AD-C24F-4521-C2321060957E}"/>
+                <a16:creationId xmlns:a16="http://schemas.microsoft.com/office/drawing/2014/main" xmlns="" id="{4210EB42-26AD-C24F-4521-C2321060957E}"/>
               </a:ext>
             </a:extLst>
           </p:cNvPr>
@@ -11730,7 +11730,7 @@
           <p:cNvPr id="195" name="Flecha derecha 194">
             <a:extLst>
               <a:ext uri="{FF2B5EF4-FFF2-40B4-BE49-F238E27FC236}">
-                <a16:creationId xmlns:a16="http://schemas.microsoft.com/office/drawing/2014/main" id="{D4D9500A-FDE1-88B8-B53B-B37D5A643EA7}"/>
+                <a16:creationId xmlns:a16="http://schemas.microsoft.com/office/drawing/2014/main" xmlns="" id="{D4D9500A-FDE1-88B8-B53B-B37D5A643EA7}"/>
               </a:ext>
             </a:extLst>
           </p:cNvPr>
@@ -11776,7 +11776,7 @@
           <p:cNvPr id="196" name="CuadroTexto 195">
             <a:extLst>
               <a:ext uri="{FF2B5EF4-FFF2-40B4-BE49-F238E27FC236}">
-                <a16:creationId xmlns:a16="http://schemas.microsoft.com/office/drawing/2014/main" id="{E2C1ABBE-EE3B-D1CD-38C5-71B0F81FBDC4}"/>
+                <a16:creationId xmlns:a16="http://schemas.microsoft.com/office/drawing/2014/main" xmlns="" id="{E2C1ABBE-EE3B-D1CD-38C5-71B0F81FBDC4}"/>
               </a:ext>
             </a:extLst>
           </p:cNvPr>
@@ -11853,7 +11853,7 @@
           <p:cNvPr id="197" name="CuadroTexto 196">
             <a:extLst>
               <a:ext uri="{FF2B5EF4-FFF2-40B4-BE49-F238E27FC236}">
-                <a16:creationId xmlns:a16="http://schemas.microsoft.com/office/drawing/2014/main" id="{8FBADA0B-086C-D6DC-9C2C-2721A0D94D27}"/>
+                <a16:creationId xmlns:a16="http://schemas.microsoft.com/office/drawing/2014/main" xmlns="" id="{8FBADA0B-086C-D6DC-9C2C-2721A0D94D27}"/>
               </a:ext>
             </a:extLst>
           </p:cNvPr>
@@ -11889,7 +11889,7 @@
           <p:cNvPr id="198" name="CuadroTexto 197">
             <a:extLst>
               <a:ext uri="{FF2B5EF4-FFF2-40B4-BE49-F238E27FC236}">
-                <a16:creationId xmlns:a16="http://schemas.microsoft.com/office/drawing/2014/main" id="{57E036F8-4025-0CE8-5193-1BC8233B2199}"/>
+                <a16:creationId xmlns:a16="http://schemas.microsoft.com/office/drawing/2014/main" xmlns="" id="{57E036F8-4025-0CE8-5193-1BC8233B2199}"/>
               </a:ext>
             </a:extLst>
           </p:cNvPr>
@@ -11925,7 +11925,7 @@
           <p:cNvPr id="199" name="Flecha derecha 198">
             <a:extLst>
               <a:ext uri="{FF2B5EF4-FFF2-40B4-BE49-F238E27FC236}">
-                <a16:creationId xmlns:a16="http://schemas.microsoft.com/office/drawing/2014/main" id="{7E4309DE-4FBB-66B4-AD4E-2AA216957FEA}"/>
+                <a16:creationId xmlns:a16="http://schemas.microsoft.com/office/drawing/2014/main" xmlns="" id="{7E4309DE-4FBB-66B4-AD4E-2AA216957FEA}"/>
               </a:ext>
             </a:extLst>
           </p:cNvPr>
@@ -11971,7 +11971,7 @@
           <p:cNvPr id="200" name="CuadroTexto 199">
             <a:extLst>
               <a:ext uri="{FF2B5EF4-FFF2-40B4-BE49-F238E27FC236}">
-                <a16:creationId xmlns:a16="http://schemas.microsoft.com/office/drawing/2014/main" id="{95B2C97E-4F10-C44F-7A9C-71990C420004}"/>
+                <a16:creationId xmlns:a16="http://schemas.microsoft.com/office/drawing/2014/main" xmlns="" id="{95B2C97E-4F10-C44F-7A9C-71990C420004}"/>
               </a:ext>
             </a:extLst>
           </p:cNvPr>
@@ -12014,7 +12014,7 @@
           <p:cNvPr id="203" name="Rectángulo 202">
             <a:extLst>
               <a:ext uri="{FF2B5EF4-FFF2-40B4-BE49-F238E27FC236}">
-                <a16:creationId xmlns:a16="http://schemas.microsoft.com/office/drawing/2014/main" id="{699643B7-BA78-79C5-4764-C0B74F94E19C}"/>
+                <a16:creationId xmlns:a16="http://schemas.microsoft.com/office/drawing/2014/main" xmlns="" id="{699643B7-BA78-79C5-4764-C0B74F94E19C}"/>
               </a:ext>
             </a:extLst>
           </p:cNvPr>
@@ -12073,7 +12073,7 @@
           <p:cNvPr id="204" name="Flecha derecha 203">
             <a:extLst>
               <a:ext uri="{FF2B5EF4-FFF2-40B4-BE49-F238E27FC236}">
-                <a16:creationId xmlns:a16="http://schemas.microsoft.com/office/drawing/2014/main" id="{6A75EF4F-519C-DCB8-35DD-FCAFA0081228}"/>
+                <a16:creationId xmlns:a16="http://schemas.microsoft.com/office/drawing/2014/main" xmlns="" id="{6A75EF4F-519C-DCB8-35DD-FCAFA0081228}"/>
               </a:ext>
             </a:extLst>
           </p:cNvPr>
@@ -12119,7 +12119,7 @@
           <p:cNvPr id="206" name="CuadroTexto 205">
             <a:extLst>
               <a:ext uri="{FF2B5EF4-FFF2-40B4-BE49-F238E27FC236}">
-                <a16:creationId xmlns:a16="http://schemas.microsoft.com/office/drawing/2014/main" id="{B3702C4E-5E85-EFAA-BA27-00C7D9DDD025}"/>
+                <a16:creationId xmlns:a16="http://schemas.microsoft.com/office/drawing/2014/main" xmlns="" id="{B3702C4E-5E85-EFAA-BA27-00C7D9DDD025}"/>
               </a:ext>
             </a:extLst>
           </p:cNvPr>
@@ -12143,73 +12143,121 @@
           <a:lstStyle/>
           <a:p>
             <a:r>
-              <a:rPr lang="es-ES" sz="700" b="1" i="1"/>
+              <a:rPr lang="es-ES" sz="700" b="1" i="1" dirty="0"/>
               <a:t>Ajusta (alinea) los datos de entrada a múltiplos de GS</a:t>
             </a:r>
           </a:p>
           <a:p>
             <a:r>
-              <a:rPr lang="es-ES" sz="700" i="1"/>
+              <a:rPr lang="es-ES" sz="700" i="1" dirty="0"/>
               <a:t>Parámetros:</a:t>
             </a:r>
           </a:p>
           <a:p>
             <a:r>
-              <a:rPr lang="es-ES" sz="700" i="1"/>
-              <a:t>- initial_offset_lane</a:t>
-            </a:r>
-          </a:p>
-          <a:p>
-            <a:r>
-              <a:rPr lang="es-ES" sz="700" i="1"/>
-              <a:t>- num_iters</a:t>
-            </a:r>
-          </a:p>
-          <a:p>
-            <a:r>
-              <a:rPr lang="es-ES" sz="700" i="1"/>
-              <a:t>- num_cycles_per_iter</a:t>
-            </a:r>
-          </a:p>
-          <a:p>
-            <a:r>
-              <a:rPr lang="es-ES" sz="700" i="1"/>
+              <a:rPr lang="es-ES" sz="700" i="1" dirty="0"/>
+              <a:t>- </a:t>
+            </a:r>
+            <a:r>
+              <a:rPr lang="es-ES" sz="700" i="1" dirty="0" err="1"/>
+              <a:t>initial_offset_lane</a:t>
+            </a:r>
+            <a:endParaRPr lang="es-ES" sz="700" i="1" dirty="0"/>
+          </a:p>
+          <a:p>
+            <a:r>
+              <a:rPr lang="es-ES" sz="700" i="1" dirty="0"/>
+              <a:t>- </a:t>
+            </a:r>
+            <a:r>
+              <a:rPr lang="es-ES" sz="700" i="1" dirty="0" err="1"/>
+              <a:t>num_iters</a:t>
+            </a:r>
+            <a:endParaRPr lang="es-ES" sz="700" i="1" dirty="0"/>
+          </a:p>
+          <a:p>
+            <a:r>
+              <a:rPr lang="es-ES" sz="700" i="1" dirty="0"/>
+              <a:t>- </a:t>
+            </a:r>
+            <a:r>
+              <a:rPr lang="es-ES" sz="700" i="1" dirty="0" err="1"/>
+              <a:t>num_cycles_per_iter</a:t>
+            </a:r>
+            <a:endParaRPr lang="es-ES" sz="700" i="1" dirty="0"/>
+          </a:p>
+          <a:p>
+            <a:r>
+              <a:rPr lang="es-ES" sz="700" i="1" dirty="0"/>
               <a:t>----</a:t>
             </a:r>
           </a:p>
           <a:p>
             <a:r>
-              <a:rPr lang="es-ES" sz="700" i="1"/>
-              <a:t>Offset_lane (registro):</a:t>
-            </a:r>
-          </a:p>
-          <a:p>
-            <a:r>
-              <a:rPr lang="es-ES" sz="700" i="1"/>
-              <a:t>  - se inicializa cada iteración al valor del parámetro initial_offset_lane</a:t>
-            </a:r>
-          </a:p>
-          <a:p>
-            <a:r>
-              <a:rPr lang="es-ES" sz="700" i="1"/>
-              <a:t>  - offset_lane puede tener un valor negativo</a:t>
-            </a:r>
-          </a:p>
-          <a:p>
-            <a:r>
-              <a:rPr lang="es-ES" sz="700" i="1"/>
-              <a:t>  - Offset_lane se incrementa en GS unidades en cada ciclo</a:t>
-            </a:r>
-          </a:p>
-          <a:p>
-            <a:r>
-              <a:rPr lang="es-ES" sz="700" i="1"/>
-              <a:t>  - Los datos de entrada se desplazan a la izquierda según offset_lane y GS</a:t>
-            </a:r>
-          </a:p>
-          <a:p>
-            <a:r>
-              <a:rPr lang="es-ES" sz="700" i="1"/>
+              <a:rPr lang="es-ES" sz="700" i="1" dirty="0" err="1"/>
+              <a:t>Offset_lane</a:t>
+            </a:r>
+            <a:r>
+              <a:rPr lang="es-ES" sz="700" i="1" dirty="0"/>
+              <a:t> (registro):</a:t>
+            </a:r>
+          </a:p>
+          <a:p>
+            <a:r>
+              <a:rPr lang="es-ES" sz="700" i="1" dirty="0"/>
+              <a:t>  - se inicializa cada iteración al valor del parámetro </a:t>
+            </a:r>
+            <a:r>
+              <a:rPr lang="es-ES" sz="700" i="1" dirty="0" err="1"/>
+              <a:t>initial_offset_lane</a:t>
+            </a:r>
+            <a:endParaRPr lang="es-ES" sz="700" i="1" dirty="0"/>
+          </a:p>
+          <a:p>
+            <a:r>
+              <a:rPr lang="es-ES" sz="700" i="1" dirty="0"/>
+              <a:t>  - </a:t>
+            </a:r>
+            <a:r>
+              <a:rPr lang="es-ES" sz="700" i="1" dirty="0" err="1"/>
+              <a:t>offset_lane</a:t>
+            </a:r>
+            <a:r>
+              <a:rPr lang="es-ES" sz="700" i="1" dirty="0"/>
+              <a:t> puede tener un valor negativo</a:t>
+            </a:r>
+          </a:p>
+          <a:p>
+            <a:r>
+              <a:rPr lang="es-ES" sz="700" i="1" dirty="0"/>
+              <a:t>  - </a:t>
+            </a:r>
+            <a:r>
+              <a:rPr lang="es-ES" sz="700" i="1" dirty="0" err="1"/>
+              <a:t>Offset_lane</a:t>
+            </a:r>
+            <a:r>
+              <a:rPr lang="es-ES" sz="700" i="1" dirty="0"/>
+              <a:t> se incrementa en GS unidades en cada ciclo</a:t>
+            </a:r>
+          </a:p>
+          <a:p>
+            <a:r>
+              <a:rPr lang="es-ES" sz="700" i="1" dirty="0"/>
+              <a:t>  - Los datos de entrada se desplazan a la izquierda según </a:t>
+            </a:r>
+            <a:r>
+              <a:rPr lang="es-ES" sz="700" i="1" dirty="0" err="1"/>
+              <a:t>offset_lane</a:t>
+            </a:r>
+            <a:r>
+              <a:rPr lang="es-ES" sz="700" i="1" dirty="0"/>
+              <a:t> y GS</a:t>
+            </a:r>
+          </a:p>
+          <a:p>
+            <a:r>
+              <a:rPr lang="es-ES" sz="700" i="1" dirty="0"/>
               <a:t>  - Los datos de entrada se combinan entre dos ciclos para generar la salida</a:t>
             </a:r>
           </a:p>
@@ -12220,7 +12268,7 @@
           <p:cNvPr id="208" name="CuadroTexto 207">
             <a:extLst>
               <a:ext uri="{FF2B5EF4-FFF2-40B4-BE49-F238E27FC236}">
-                <a16:creationId xmlns:a16="http://schemas.microsoft.com/office/drawing/2014/main" id="{22474006-11AA-74CD-EEB6-0DBB77120CFD}"/>
+                <a16:creationId xmlns:a16="http://schemas.microsoft.com/office/drawing/2014/main" xmlns="" id="{22474006-11AA-74CD-EEB6-0DBB77120CFD}"/>
               </a:ext>
             </a:extLst>
           </p:cNvPr>
@@ -12256,7 +12304,7 @@
           <p:cNvPr id="209" name="Flecha derecha 208">
             <a:extLst>
               <a:ext uri="{FF2B5EF4-FFF2-40B4-BE49-F238E27FC236}">
-                <a16:creationId xmlns:a16="http://schemas.microsoft.com/office/drawing/2014/main" id="{2F19916D-506C-8703-6C21-AFACC57A0CFE}"/>
+                <a16:creationId xmlns:a16="http://schemas.microsoft.com/office/drawing/2014/main" xmlns="" id="{2F19916D-506C-8703-6C21-AFACC57A0CFE}"/>
               </a:ext>
             </a:extLst>
           </p:cNvPr>
@@ -12302,7 +12350,7 @@
           <p:cNvPr id="210" name="CuadroTexto 209">
             <a:extLst>
               <a:ext uri="{FF2B5EF4-FFF2-40B4-BE49-F238E27FC236}">
-                <a16:creationId xmlns:a16="http://schemas.microsoft.com/office/drawing/2014/main" id="{768DAE91-35F2-616A-A4EB-A3F77C2701C3}"/>
+                <a16:creationId xmlns:a16="http://schemas.microsoft.com/office/drawing/2014/main" xmlns="" id="{768DAE91-35F2-616A-A4EB-A3F77C2701C3}"/>
               </a:ext>
             </a:extLst>
           </p:cNvPr>
@@ -12338,7 +12386,7 @@
           <p:cNvPr id="213" name="Rectángulo 212">
             <a:extLst>
               <a:ext uri="{FF2B5EF4-FFF2-40B4-BE49-F238E27FC236}">
-                <a16:creationId xmlns:a16="http://schemas.microsoft.com/office/drawing/2014/main" id="{2E9409FC-CD46-C497-77F9-2452B6473DAE}"/>
+                <a16:creationId xmlns:a16="http://schemas.microsoft.com/office/drawing/2014/main" xmlns="" id="{2E9409FC-CD46-C497-77F9-2452B6473DAE}"/>
               </a:ext>
             </a:extLst>
           </p:cNvPr>
@@ -12397,7 +12445,7 @@
           <p:cNvPr id="214" name="Flecha derecha 213">
             <a:extLst>
               <a:ext uri="{FF2B5EF4-FFF2-40B4-BE49-F238E27FC236}">
-                <a16:creationId xmlns:a16="http://schemas.microsoft.com/office/drawing/2014/main" id="{1F92D7DC-B84E-CE2C-FEAF-D87786EF7013}"/>
+                <a16:creationId xmlns:a16="http://schemas.microsoft.com/office/drawing/2014/main" xmlns="" id="{1F92D7DC-B84E-CE2C-FEAF-D87786EF7013}"/>
               </a:ext>
             </a:extLst>
           </p:cNvPr>
@@ -12443,7 +12491,7 @@
           <p:cNvPr id="215" name="CuadroTexto 214">
             <a:extLst>
               <a:ext uri="{FF2B5EF4-FFF2-40B4-BE49-F238E27FC236}">
-                <a16:creationId xmlns:a16="http://schemas.microsoft.com/office/drawing/2014/main" id="{FC197B75-35C7-74A0-A050-02B2C80EA227}"/>
+                <a16:creationId xmlns:a16="http://schemas.microsoft.com/office/drawing/2014/main" xmlns="" id="{FC197B75-35C7-74A0-A050-02B2C80EA227}"/>
               </a:ext>
             </a:extLst>
           </p:cNvPr>
@@ -12544,7 +12592,7 @@
           <p:cNvPr id="216" name="CuadroTexto 215">
             <a:extLst>
               <a:ext uri="{FF2B5EF4-FFF2-40B4-BE49-F238E27FC236}">
-                <a16:creationId xmlns:a16="http://schemas.microsoft.com/office/drawing/2014/main" id="{16185944-C18A-A2DD-4592-829576B24F00}"/>
+                <a16:creationId xmlns:a16="http://schemas.microsoft.com/office/drawing/2014/main" xmlns="" id="{16185944-C18A-A2DD-4592-829576B24F00}"/>
               </a:ext>
             </a:extLst>
           </p:cNvPr>
@@ -12580,7 +12628,7 @@
           <p:cNvPr id="217" name="Flecha derecha 216">
             <a:extLst>
               <a:ext uri="{FF2B5EF4-FFF2-40B4-BE49-F238E27FC236}">
-                <a16:creationId xmlns:a16="http://schemas.microsoft.com/office/drawing/2014/main" id="{B6DBCEA5-A04A-D635-FE8F-2A64ADBF4215}"/>
+                <a16:creationId xmlns:a16="http://schemas.microsoft.com/office/drawing/2014/main" xmlns="" id="{B6DBCEA5-A04A-D635-FE8F-2A64ADBF4215}"/>
               </a:ext>
             </a:extLst>
           </p:cNvPr>
@@ -12626,7 +12674,7 @@
           <p:cNvPr id="218" name="CuadroTexto 217">
             <a:extLst>
               <a:ext uri="{FF2B5EF4-FFF2-40B4-BE49-F238E27FC236}">
-                <a16:creationId xmlns:a16="http://schemas.microsoft.com/office/drawing/2014/main" id="{AFF5A6A9-711E-5769-71DF-C88D24E4FB91}"/>
+                <a16:creationId xmlns:a16="http://schemas.microsoft.com/office/drawing/2014/main" xmlns="" id="{AFF5A6A9-711E-5769-71DF-C88D24E4FB91}"/>
               </a:ext>
             </a:extLst>
           </p:cNvPr>
@@ -12662,7 +12710,7 @@
           <p:cNvPr id="219" name="Rectángulo 218">
             <a:extLst>
               <a:ext uri="{FF2B5EF4-FFF2-40B4-BE49-F238E27FC236}">
-                <a16:creationId xmlns:a16="http://schemas.microsoft.com/office/drawing/2014/main" id="{6C36FC56-2055-17F6-B39F-0120E9BD3CB6}"/>
+                <a16:creationId xmlns:a16="http://schemas.microsoft.com/office/drawing/2014/main" xmlns="" id="{6C36FC56-2055-17F6-B39F-0120E9BD3CB6}"/>
               </a:ext>
             </a:extLst>
           </p:cNvPr>
@@ -12732,7 +12780,7 @@
           <p:cNvPr id="220" name="Flecha derecha 219">
             <a:extLst>
               <a:ext uri="{FF2B5EF4-FFF2-40B4-BE49-F238E27FC236}">
-                <a16:creationId xmlns:a16="http://schemas.microsoft.com/office/drawing/2014/main" id="{A6A7054E-1787-808C-9EBC-35F114977ACC}"/>
+                <a16:creationId xmlns:a16="http://schemas.microsoft.com/office/drawing/2014/main" xmlns="" id="{A6A7054E-1787-808C-9EBC-35F114977ACC}"/>
               </a:ext>
             </a:extLst>
           </p:cNvPr>
@@ -12778,7 +12826,7 @@
           <p:cNvPr id="221" name="CuadroTexto 220">
             <a:extLst>
               <a:ext uri="{FF2B5EF4-FFF2-40B4-BE49-F238E27FC236}">
-                <a16:creationId xmlns:a16="http://schemas.microsoft.com/office/drawing/2014/main" id="{8CC98BA5-66F7-02A9-4FD9-49021E9A815A}"/>
+                <a16:creationId xmlns:a16="http://schemas.microsoft.com/office/drawing/2014/main" xmlns="" id="{8CC98BA5-66F7-02A9-4FD9-49021E9A815A}"/>
               </a:ext>
             </a:extLst>
           </p:cNvPr>
@@ -12855,7 +12903,7 @@
           <p:cNvPr id="222" name="CuadroTexto 221">
             <a:extLst>
               <a:ext uri="{FF2B5EF4-FFF2-40B4-BE49-F238E27FC236}">
-                <a16:creationId xmlns:a16="http://schemas.microsoft.com/office/drawing/2014/main" id="{485A3B46-4164-AF01-8590-C1AEEB85DB61}"/>
+                <a16:creationId xmlns:a16="http://schemas.microsoft.com/office/drawing/2014/main" xmlns="" id="{485A3B46-4164-AF01-8590-C1AEEB85DB61}"/>
               </a:ext>
             </a:extLst>
           </p:cNvPr>
@@ -12891,7 +12939,7 @@
           <p:cNvPr id="223" name="Flecha derecha 222">
             <a:extLst>
               <a:ext uri="{FF2B5EF4-FFF2-40B4-BE49-F238E27FC236}">
-                <a16:creationId xmlns:a16="http://schemas.microsoft.com/office/drawing/2014/main" id="{83653A19-9932-C47A-C9B5-598B231E8EF8}"/>
+                <a16:creationId xmlns:a16="http://schemas.microsoft.com/office/drawing/2014/main" xmlns="" id="{83653A19-9932-C47A-C9B5-598B231E8EF8}"/>
               </a:ext>
             </a:extLst>
           </p:cNvPr>
@@ -12937,7 +12985,7 @@
           <p:cNvPr id="224" name="CuadroTexto 223">
             <a:extLst>
               <a:ext uri="{FF2B5EF4-FFF2-40B4-BE49-F238E27FC236}">
-                <a16:creationId xmlns:a16="http://schemas.microsoft.com/office/drawing/2014/main" id="{2B23445D-0B6F-0E96-7925-FA924B72AFFE}"/>
+                <a16:creationId xmlns:a16="http://schemas.microsoft.com/office/drawing/2014/main" xmlns="" id="{2B23445D-0B6F-0E96-7925-FA924B72AFFE}"/>
               </a:ext>
             </a:extLst>
           </p:cNvPr>
@@ -12973,7 +13021,7 @@
           <p:cNvPr id="225" name="Rectángulo 224">
             <a:extLst>
               <a:ext uri="{FF2B5EF4-FFF2-40B4-BE49-F238E27FC236}">
-                <a16:creationId xmlns:a16="http://schemas.microsoft.com/office/drawing/2014/main" id="{8A7393AC-0D8D-D04F-CE31-2D95A2D55D66}"/>
+                <a16:creationId xmlns:a16="http://schemas.microsoft.com/office/drawing/2014/main" xmlns="" id="{8A7393AC-0D8D-D04F-CE31-2D95A2D55D66}"/>
               </a:ext>
             </a:extLst>
           </p:cNvPr>
@@ -13032,7 +13080,7 @@
           <p:cNvPr id="226" name="Flecha derecha 225">
             <a:extLst>
               <a:ext uri="{FF2B5EF4-FFF2-40B4-BE49-F238E27FC236}">
-                <a16:creationId xmlns:a16="http://schemas.microsoft.com/office/drawing/2014/main" id="{77437AEF-CCE8-EEE7-DB83-5F9628280C3E}"/>
+                <a16:creationId xmlns:a16="http://schemas.microsoft.com/office/drawing/2014/main" xmlns="" id="{77437AEF-CCE8-EEE7-DB83-5F9628280C3E}"/>
               </a:ext>
             </a:extLst>
           </p:cNvPr>
@@ -13078,7 +13126,7 @@
           <p:cNvPr id="227" name="Flecha derecha 226">
             <a:extLst>
               <a:ext uri="{FF2B5EF4-FFF2-40B4-BE49-F238E27FC236}">
-                <a16:creationId xmlns:a16="http://schemas.microsoft.com/office/drawing/2014/main" id="{E53686F0-E1AD-4C87-17A3-FB2165F6E2CD}"/>
+                <a16:creationId xmlns:a16="http://schemas.microsoft.com/office/drawing/2014/main" xmlns="" id="{E53686F0-E1AD-4C87-17A3-FB2165F6E2CD}"/>
               </a:ext>
             </a:extLst>
           </p:cNvPr>
@@ -13124,7 +13172,7 @@
           <p:cNvPr id="228" name="CuadroTexto 227">
             <a:extLst>
               <a:ext uri="{FF2B5EF4-FFF2-40B4-BE49-F238E27FC236}">
-                <a16:creationId xmlns:a16="http://schemas.microsoft.com/office/drawing/2014/main" id="{DED66366-9AEF-F31B-726C-5E846085E5C8}"/>
+                <a16:creationId xmlns:a16="http://schemas.microsoft.com/office/drawing/2014/main" xmlns="" id="{DED66366-9AEF-F31B-726C-5E846085E5C8}"/>
               </a:ext>
             </a:extLst>
           </p:cNvPr>
@@ -13134,7 +13182,7 @@
         <p:spPr>
           <a:xfrm>
             <a:off x="10444822" y="5436538"/>
-            <a:ext cx="1369793" cy="1384995"/>
+            <a:ext cx="1369793" cy="1169551"/>
           </a:xfrm>
           <a:prstGeom prst="rect">
             <a:avLst/>
@@ -13148,64 +13196,91 @@
           <a:lstStyle/>
           <a:p>
             <a:r>
-              <a:rPr lang="es-ES" sz="700" b="1" i="1"/>
-              <a:t>Escribe GS pixels en cada ciclo</a:t>
-            </a:r>
-          </a:p>
-          <a:p>
-            <a:r>
-              <a:rPr lang="es-ES" sz="700" i="1"/>
+              <a:rPr lang="es-ES" sz="700" b="1" i="1" dirty="0"/>
+              <a:t>Escribe GS </a:t>
+            </a:r>
+            <a:r>
+              <a:rPr lang="es-ES" sz="700" b="1" i="1" dirty="0" err="1"/>
+              <a:t>pixels</a:t>
+            </a:r>
+            <a:r>
+              <a:rPr lang="es-ES" sz="700" b="1" i="1" dirty="0"/>
+              <a:t> en cada ciclo</a:t>
+            </a:r>
+          </a:p>
+          <a:p>
+            <a:r>
+              <a:rPr lang="es-ES" sz="700" i="1" dirty="0"/>
               <a:t>Parámetros:</a:t>
             </a:r>
           </a:p>
           <a:p>
             <a:r>
-              <a:rPr lang="es-ES" sz="700" i="1"/>
-              <a:t>- address, num_iters</a:t>
-            </a:r>
-          </a:p>
-          <a:p>
-            <a:r>
-              <a:rPr lang="es-ES" sz="700" i="1"/>
-              <a:t>- num_writes_per_iter</a:t>
-            </a:r>
-          </a:p>
-          <a:p>
-            <a:r>
-              <a:rPr lang="es-ES" sz="700" i="1"/>
-              <a:t>- clip_min, clip_max</a:t>
-            </a:r>
-          </a:p>
-          <a:p>
-            <a:endParaRPr lang="es-ES" sz="700" i="1"/>
-          </a:p>
-          <a:p>
-            <a:r>
-              <a:rPr lang="es-ES" sz="700" i="1"/>
+              <a:rPr lang="es-ES" sz="700" i="1" dirty="0"/>
+              <a:t>- </a:t>
+            </a:r>
+            <a:r>
+              <a:rPr lang="es-ES" sz="700" i="1" dirty="0" err="1" smtClean="0"/>
+              <a:t>address</a:t>
+            </a:r>
+            <a:endParaRPr lang="es-ES" sz="700" i="1" dirty="0"/>
+          </a:p>
+          <a:p>
+            <a:r>
+              <a:rPr lang="es-ES" sz="700" i="1" dirty="0"/>
+              <a:t>- </a:t>
+            </a:r>
+            <a:r>
+              <a:rPr lang="es-ES" sz="700" i="1" dirty="0" err="1"/>
+              <a:t>num_writes_per_iter</a:t>
+            </a:r>
+            <a:endParaRPr lang="es-ES" sz="700" i="1" dirty="0"/>
+          </a:p>
+          <a:p>
+            <a:r>
+              <a:rPr lang="es-ES" sz="700" i="1" dirty="0"/>
+              <a:t>- </a:t>
+            </a:r>
+            <a:r>
+              <a:rPr lang="es-ES" sz="700" i="1" dirty="0" err="1"/>
+              <a:t>clip_min</a:t>
+            </a:r>
+            <a:r>
+              <a:rPr lang="es-ES" sz="700" i="1" dirty="0"/>
+              <a:t>, </a:t>
+            </a:r>
+            <a:r>
+              <a:rPr lang="es-ES" sz="700" i="1" dirty="0" err="1"/>
+              <a:t>clip_max</a:t>
+            </a:r>
+            <a:endParaRPr lang="es-ES" sz="700" i="1" dirty="0"/>
+          </a:p>
+          <a:p>
+            <a:endParaRPr lang="es-ES" sz="700" i="1" dirty="0"/>
+          </a:p>
+          <a:p>
+            <a:r>
+              <a:rPr lang="es-ES" sz="700" i="1" dirty="0"/>
               <a:t>----</a:t>
             </a:r>
           </a:p>
           <a:p>
             <a:r>
-              <a:rPr lang="es-ES" sz="700" i="1"/>
-              <a:t>En cada inicio de iteración se</a:t>
-            </a:r>
-          </a:p>
-          <a:p>
-            <a:r>
-              <a:rPr lang="es-ES" sz="700" i="1"/>
-              <a:t>inicializa el registro de dirección</a:t>
-            </a:r>
-          </a:p>
-          <a:p>
-            <a:r>
-              <a:rPr lang="es-ES" sz="700" i="1"/>
-              <a:t>Hace cliping de los datos, pasándolos</a:t>
-            </a:r>
-          </a:p>
-          <a:p>
-            <a:r>
-              <a:rPr lang="es-ES" sz="700" i="1"/>
+              <a:rPr lang="es-ES" sz="700" i="1" smtClean="0"/>
+              <a:t>Hace </a:t>
+            </a:r>
+            <a:r>
+              <a:rPr lang="es-ES" sz="700" i="1" dirty="0" err="1"/>
+              <a:t>cliping</a:t>
+            </a:r>
+            <a:r>
+              <a:rPr lang="es-ES" sz="700" i="1" dirty="0"/>
+              <a:t> de los datos, pasándolos</a:t>
+            </a:r>
+          </a:p>
+          <a:p>
+            <a:r>
+              <a:rPr lang="es-ES" sz="700" i="1" dirty="0"/>
               <a:t>a 8 bits.</a:t>
             </a:r>
           </a:p>
@@ -13216,7 +13291,7 @@
           <p:cNvPr id="229" name="CuadroTexto 228">
             <a:extLst>
               <a:ext uri="{FF2B5EF4-FFF2-40B4-BE49-F238E27FC236}">
-                <a16:creationId xmlns:a16="http://schemas.microsoft.com/office/drawing/2014/main" id="{498FC819-B8BB-9754-467E-7F8C5D0D7C30}"/>
+                <a16:creationId xmlns:a16="http://schemas.microsoft.com/office/drawing/2014/main" xmlns="" id="{498FC819-B8BB-9754-467E-7F8C5D0D7C30}"/>
               </a:ext>
             </a:extLst>
           </p:cNvPr>
@@ -13251,7 +13326,7 @@
           <p:cNvPr id="230" name="CuadroTexto 229">
             <a:extLst>
               <a:ext uri="{FF2B5EF4-FFF2-40B4-BE49-F238E27FC236}">
-                <a16:creationId xmlns:a16="http://schemas.microsoft.com/office/drawing/2014/main" id="{5A0D0CC8-9F66-D2CD-B2C1-10082A55E468}"/>
+                <a16:creationId xmlns:a16="http://schemas.microsoft.com/office/drawing/2014/main" xmlns="" id="{5A0D0CC8-9F66-D2CD-B2C1-10082A55E468}"/>
               </a:ext>
             </a:extLst>
           </p:cNvPr>
@@ -13286,7 +13361,7 @@
           <p:cNvPr id="232" name="Flecha abajo 231">
             <a:extLst>
               <a:ext uri="{FF2B5EF4-FFF2-40B4-BE49-F238E27FC236}">
-                <a16:creationId xmlns:a16="http://schemas.microsoft.com/office/drawing/2014/main" id="{5653F1C9-734D-BCE4-8BE5-C4A8ACEF4EB9}"/>
+                <a16:creationId xmlns:a16="http://schemas.microsoft.com/office/drawing/2014/main" xmlns="" id="{5653F1C9-734D-BCE4-8BE5-C4A8ACEF4EB9}"/>
               </a:ext>
             </a:extLst>
           </p:cNvPr>
@@ -13332,7 +13407,7 @@
           <p:cNvPr id="233" name="CuadroTexto 232">
             <a:extLst>
               <a:ext uri="{FF2B5EF4-FFF2-40B4-BE49-F238E27FC236}">
-                <a16:creationId xmlns:a16="http://schemas.microsoft.com/office/drawing/2014/main" id="{7FFE3ABE-E776-61C9-0441-99644217D42E}"/>
+                <a16:creationId xmlns:a16="http://schemas.microsoft.com/office/drawing/2014/main" xmlns="" id="{7FFE3ABE-E776-61C9-0441-99644217D42E}"/>
               </a:ext>
             </a:extLst>
           </p:cNvPr>
@@ -13367,7 +13442,7 @@
           <p:cNvPr id="234" name="Flecha abajo 233">
             <a:extLst>
               <a:ext uri="{FF2B5EF4-FFF2-40B4-BE49-F238E27FC236}">
-                <a16:creationId xmlns:a16="http://schemas.microsoft.com/office/drawing/2014/main" id="{AC66BDCD-D501-64F7-DC1D-5DA568160B11}"/>
+                <a16:creationId xmlns:a16="http://schemas.microsoft.com/office/drawing/2014/main" xmlns="" id="{AC66BDCD-D501-64F7-DC1D-5DA568160B11}"/>
               </a:ext>
             </a:extLst>
           </p:cNvPr>
@@ -13413,7 +13488,7 @@
           <p:cNvPr id="235" name="CuadroTexto 234">
             <a:extLst>
               <a:ext uri="{FF2B5EF4-FFF2-40B4-BE49-F238E27FC236}">
-                <a16:creationId xmlns:a16="http://schemas.microsoft.com/office/drawing/2014/main" id="{B2D885C6-0735-EE98-3AD6-93F157A3DCF5}"/>
+                <a16:creationId xmlns:a16="http://schemas.microsoft.com/office/drawing/2014/main" xmlns="" id="{B2D885C6-0735-EE98-3AD6-93F157A3DCF5}"/>
               </a:ext>
             </a:extLst>
           </p:cNvPr>
@@ -13448,7 +13523,7 @@
           <p:cNvPr id="236" name="Flecha abajo 235">
             <a:extLst>
               <a:ext uri="{FF2B5EF4-FFF2-40B4-BE49-F238E27FC236}">
-                <a16:creationId xmlns:a16="http://schemas.microsoft.com/office/drawing/2014/main" id="{0780F27B-A540-EAE8-4501-D5508A590940}"/>
+                <a16:creationId xmlns:a16="http://schemas.microsoft.com/office/drawing/2014/main" xmlns="" id="{0780F27B-A540-EAE8-4501-D5508A590940}"/>
               </a:ext>
             </a:extLst>
           </p:cNvPr>
@@ -13494,7 +13569,7 @@
           <p:cNvPr id="237" name="CuadroTexto 236">
             <a:extLst>
               <a:ext uri="{FF2B5EF4-FFF2-40B4-BE49-F238E27FC236}">
-                <a16:creationId xmlns:a16="http://schemas.microsoft.com/office/drawing/2014/main" id="{284B14E2-9CB3-5461-7DB8-4B4FEE41B4B6}"/>
+                <a16:creationId xmlns:a16="http://schemas.microsoft.com/office/drawing/2014/main" xmlns="" id="{284B14E2-9CB3-5461-7DB8-4B4FEE41B4B6}"/>
               </a:ext>
             </a:extLst>
           </p:cNvPr>
@@ -13529,7 +13604,7 @@
           <p:cNvPr id="238" name="Flecha abajo 237">
             <a:extLst>
               <a:ext uri="{FF2B5EF4-FFF2-40B4-BE49-F238E27FC236}">
-                <a16:creationId xmlns:a16="http://schemas.microsoft.com/office/drawing/2014/main" id="{FB0D8010-9A77-2B6D-8291-7EE967591D42}"/>
+                <a16:creationId xmlns:a16="http://schemas.microsoft.com/office/drawing/2014/main" xmlns="" id="{FB0D8010-9A77-2B6D-8291-7EE967591D42}"/>
               </a:ext>
             </a:extLst>
           </p:cNvPr>
@@ -13575,7 +13650,7 @@
           <p:cNvPr id="239" name="CuadroTexto 238">
             <a:extLst>
               <a:ext uri="{FF2B5EF4-FFF2-40B4-BE49-F238E27FC236}">
-                <a16:creationId xmlns:a16="http://schemas.microsoft.com/office/drawing/2014/main" id="{24AF7BFB-897E-02A1-F84F-FE1292A3D90B}"/>
+                <a16:creationId xmlns:a16="http://schemas.microsoft.com/office/drawing/2014/main" xmlns="" id="{24AF7BFB-897E-02A1-F84F-FE1292A3D90B}"/>
               </a:ext>
             </a:extLst>
           </p:cNvPr>
@@ -13610,7 +13685,7 @@
           <p:cNvPr id="240" name="Rectángulo 239">
             <a:extLst>
               <a:ext uri="{FF2B5EF4-FFF2-40B4-BE49-F238E27FC236}">
-                <a16:creationId xmlns:a16="http://schemas.microsoft.com/office/drawing/2014/main" id="{6740243F-8BB0-2239-9293-CB3737CD109B}"/>
+                <a16:creationId xmlns:a16="http://schemas.microsoft.com/office/drawing/2014/main" xmlns="" id="{6740243F-8BB0-2239-9293-CB3737CD109B}"/>
               </a:ext>
             </a:extLst>
           </p:cNvPr>
@@ -13669,7 +13744,7 @@
           <p:cNvPr id="241" name="Rectángulo 240">
             <a:extLst>
               <a:ext uri="{FF2B5EF4-FFF2-40B4-BE49-F238E27FC236}">
-                <a16:creationId xmlns:a16="http://schemas.microsoft.com/office/drawing/2014/main" id="{4CFF51B3-B7A7-7345-578C-0F4DFA289695}"/>
+                <a16:creationId xmlns:a16="http://schemas.microsoft.com/office/drawing/2014/main" xmlns="" id="{4CFF51B3-B7A7-7345-578C-0F4DFA289695}"/>
               </a:ext>
             </a:extLst>
           </p:cNvPr>
@@ -13728,7 +13803,7 @@
           <p:cNvPr id="242" name="Rectángulo 241">
             <a:extLst>
               <a:ext uri="{FF2B5EF4-FFF2-40B4-BE49-F238E27FC236}">
-                <a16:creationId xmlns:a16="http://schemas.microsoft.com/office/drawing/2014/main" id="{0F8222F5-56AD-1988-0B04-BAFA310FB9F8}"/>
+                <a16:creationId xmlns:a16="http://schemas.microsoft.com/office/drawing/2014/main" xmlns="" id="{0F8222F5-56AD-1988-0B04-BAFA310FB9F8}"/>
               </a:ext>
             </a:extLst>
           </p:cNvPr>
@@ -13787,7 +13862,7 @@
           <p:cNvPr id="243" name="Rectángulo 242">
             <a:extLst>
               <a:ext uri="{FF2B5EF4-FFF2-40B4-BE49-F238E27FC236}">
-                <a16:creationId xmlns:a16="http://schemas.microsoft.com/office/drawing/2014/main" id="{3737A297-672C-CB11-E8CF-0B1608813C04}"/>
+                <a16:creationId xmlns:a16="http://schemas.microsoft.com/office/drawing/2014/main" xmlns="" id="{3737A297-672C-CB11-E8CF-0B1608813C04}"/>
               </a:ext>
             </a:extLst>
           </p:cNvPr>
@@ -13846,7 +13921,7 @@
           <p:cNvPr id="244" name="Rectángulo 243">
             <a:extLst>
               <a:ext uri="{FF2B5EF4-FFF2-40B4-BE49-F238E27FC236}">
-                <a16:creationId xmlns:a16="http://schemas.microsoft.com/office/drawing/2014/main" id="{C1FE07E9-EDCF-3986-312A-2F72E84D386B}"/>
+                <a16:creationId xmlns:a16="http://schemas.microsoft.com/office/drawing/2014/main" xmlns="" id="{C1FE07E9-EDCF-3986-312A-2F72E84D386B}"/>
               </a:ext>
             </a:extLst>
           </p:cNvPr>
@@ -13905,7 +13980,7 @@
           <p:cNvPr id="245" name="Rectángulo 244">
             <a:extLst>
               <a:ext uri="{FF2B5EF4-FFF2-40B4-BE49-F238E27FC236}">
-                <a16:creationId xmlns:a16="http://schemas.microsoft.com/office/drawing/2014/main" id="{0F3DA105-039B-8513-234F-4F2AC8146C5B}"/>
+                <a16:creationId xmlns:a16="http://schemas.microsoft.com/office/drawing/2014/main" xmlns="" id="{0F3DA105-039B-8513-234F-4F2AC8146C5B}"/>
               </a:ext>
             </a:extLst>
           </p:cNvPr>
@@ -13964,7 +14039,7 @@
           <p:cNvPr id="246" name="Rectángulo 245">
             <a:extLst>
               <a:ext uri="{FF2B5EF4-FFF2-40B4-BE49-F238E27FC236}">
-                <a16:creationId xmlns:a16="http://schemas.microsoft.com/office/drawing/2014/main" id="{253AA008-51AE-663F-EA0F-7D5FC6413782}"/>
+                <a16:creationId xmlns:a16="http://schemas.microsoft.com/office/drawing/2014/main" xmlns="" id="{253AA008-51AE-663F-EA0F-7D5FC6413782}"/>
               </a:ext>
             </a:extLst>
           </p:cNvPr>
@@ -14023,7 +14098,7 @@
           <p:cNvPr id="247" name="Rectángulo 246">
             <a:extLst>
               <a:ext uri="{FF2B5EF4-FFF2-40B4-BE49-F238E27FC236}">
-                <a16:creationId xmlns:a16="http://schemas.microsoft.com/office/drawing/2014/main" id="{3B4EE8F8-D002-812A-EC8D-217579308538}"/>
+                <a16:creationId xmlns:a16="http://schemas.microsoft.com/office/drawing/2014/main" xmlns="" id="{3B4EE8F8-D002-812A-EC8D-217579308538}"/>
               </a:ext>
             </a:extLst>
           </p:cNvPr>
@@ -14112,7 +14187,7 @@
           <p:cNvPr id="4" name="Rectángulo 3">
             <a:extLst>
               <a:ext uri="{FF2B5EF4-FFF2-40B4-BE49-F238E27FC236}">
-                <a16:creationId xmlns:a16="http://schemas.microsoft.com/office/drawing/2014/main" id="{610A6117-40F7-D113-5C45-A5C735F3D157}"/>
+                <a16:creationId xmlns:a16="http://schemas.microsoft.com/office/drawing/2014/main" xmlns="" id="{610A6117-40F7-D113-5C45-A5C735F3D157}"/>
               </a:ext>
             </a:extLst>
           </p:cNvPr>
@@ -14161,7 +14236,7 @@
           <p:cNvPr id="5" name="Rectángulo 4">
             <a:extLst>
               <a:ext uri="{FF2B5EF4-FFF2-40B4-BE49-F238E27FC236}">
-                <a16:creationId xmlns:a16="http://schemas.microsoft.com/office/drawing/2014/main" id="{9A975246-2BAC-1505-1437-E3E43F305FEE}"/>
+                <a16:creationId xmlns:a16="http://schemas.microsoft.com/office/drawing/2014/main" xmlns="" id="{9A975246-2BAC-1505-1437-E3E43F305FEE}"/>
               </a:ext>
             </a:extLst>
           </p:cNvPr>
@@ -14210,7 +14285,7 @@
           <p:cNvPr id="6" name="CuadroTexto 5">
             <a:extLst>
               <a:ext uri="{FF2B5EF4-FFF2-40B4-BE49-F238E27FC236}">
-                <a16:creationId xmlns:a16="http://schemas.microsoft.com/office/drawing/2014/main" id="{DF6345E0-BA79-07E7-3CE0-5EEA068F63C4}"/>
+                <a16:creationId xmlns:a16="http://schemas.microsoft.com/office/drawing/2014/main" xmlns="" id="{DF6345E0-BA79-07E7-3CE0-5EEA068F63C4}"/>
               </a:ext>
             </a:extLst>
           </p:cNvPr>
@@ -14245,7 +14320,7 @@
           <p:cNvPr id="7" name="CuadroTexto 6">
             <a:extLst>
               <a:ext uri="{FF2B5EF4-FFF2-40B4-BE49-F238E27FC236}">
-                <a16:creationId xmlns:a16="http://schemas.microsoft.com/office/drawing/2014/main" id="{5A9860CE-115A-7E65-A3FE-916766B20B2E}"/>
+                <a16:creationId xmlns:a16="http://schemas.microsoft.com/office/drawing/2014/main" xmlns="" id="{5A9860CE-115A-7E65-A3FE-916766B20B2E}"/>
               </a:ext>
             </a:extLst>
           </p:cNvPr>
@@ -14280,7 +14355,7 @@
           <p:cNvPr id="8" name="Rectángulo 7">
             <a:extLst>
               <a:ext uri="{FF2B5EF4-FFF2-40B4-BE49-F238E27FC236}">
-                <a16:creationId xmlns:a16="http://schemas.microsoft.com/office/drawing/2014/main" id="{EE47F4DA-F3B7-2406-FCB8-25780B54F613}"/>
+                <a16:creationId xmlns:a16="http://schemas.microsoft.com/office/drawing/2014/main" xmlns="" id="{EE47F4DA-F3B7-2406-FCB8-25780B54F613}"/>
               </a:ext>
             </a:extLst>
           </p:cNvPr>
@@ -14339,7 +14414,7 @@
           <p:cNvPr id="9" name="Flecha derecha 8">
             <a:extLst>
               <a:ext uri="{FF2B5EF4-FFF2-40B4-BE49-F238E27FC236}">
-                <a16:creationId xmlns:a16="http://schemas.microsoft.com/office/drawing/2014/main" id="{E75A6010-E518-C9BC-58FD-105EECF8DCD5}"/>
+                <a16:creationId xmlns:a16="http://schemas.microsoft.com/office/drawing/2014/main" xmlns="" id="{E75A6010-E518-C9BC-58FD-105EECF8DCD5}"/>
               </a:ext>
             </a:extLst>
           </p:cNvPr>
@@ -14395,7 +14470,7 @@
           <p:cNvPr id="10" name="CuadroTexto 9">
             <a:extLst>
               <a:ext uri="{FF2B5EF4-FFF2-40B4-BE49-F238E27FC236}">
-                <a16:creationId xmlns:a16="http://schemas.microsoft.com/office/drawing/2014/main" id="{79AD70CA-4D14-C21C-AF0A-2E16DED31D46}"/>
+                <a16:creationId xmlns:a16="http://schemas.microsoft.com/office/drawing/2014/main" xmlns="" id="{79AD70CA-4D14-C21C-AF0A-2E16DED31D46}"/>
               </a:ext>
             </a:extLst>
           </p:cNvPr>
@@ -14431,7 +14506,7 @@
           <p:cNvPr id="11" name="Flecha derecha 10">
             <a:extLst>
               <a:ext uri="{FF2B5EF4-FFF2-40B4-BE49-F238E27FC236}">
-                <a16:creationId xmlns:a16="http://schemas.microsoft.com/office/drawing/2014/main" id="{6C1F77ED-11A3-93DE-316E-A2EDB34A431C}"/>
+                <a16:creationId xmlns:a16="http://schemas.microsoft.com/office/drawing/2014/main" xmlns="" id="{6C1F77ED-11A3-93DE-316E-A2EDB34A431C}"/>
               </a:ext>
             </a:extLst>
           </p:cNvPr>
@@ -14487,7 +14562,7 @@
           <p:cNvPr id="12" name="CuadroTexto 11">
             <a:extLst>
               <a:ext uri="{FF2B5EF4-FFF2-40B4-BE49-F238E27FC236}">
-                <a16:creationId xmlns:a16="http://schemas.microsoft.com/office/drawing/2014/main" id="{BFB6859A-BE2F-F776-1F65-6955626372D2}"/>
+                <a16:creationId xmlns:a16="http://schemas.microsoft.com/office/drawing/2014/main" xmlns="" id="{BFB6859A-BE2F-F776-1F65-6955626372D2}"/>
               </a:ext>
             </a:extLst>
           </p:cNvPr>
@@ -14523,7 +14598,7 @@
           <p:cNvPr id="13" name="Rectángulo 12">
             <a:extLst>
               <a:ext uri="{FF2B5EF4-FFF2-40B4-BE49-F238E27FC236}">
-                <a16:creationId xmlns:a16="http://schemas.microsoft.com/office/drawing/2014/main" id="{527D77D1-E2CA-6909-5125-F850B6F47AF1}"/>
+                <a16:creationId xmlns:a16="http://schemas.microsoft.com/office/drawing/2014/main" xmlns="" id="{527D77D1-E2CA-6909-5125-F850B6F47AF1}"/>
               </a:ext>
             </a:extLst>
           </p:cNvPr>
@@ -14582,7 +14657,7 @@
           <p:cNvPr id="14" name="Flecha derecha 13">
             <a:extLst>
               <a:ext uri="{FF2B5EF4-FFF2-40B4-BE49-F238E27FC236}">
-                <a16:creationId xmlns:a16="http://schemas.microsoft.com/office/drawing/2014/main" id="{8C87A165-B711-22DC-14BF-CA206FA4B4DC}"/>
+                <a16:creationId xmlns:a16="http://schemas.microsoft.com/office/drawing/2014/main" xmlns="" id="{8C87A165-B711-22DC-14BF-CA206FA4B4DC}"/>
               </a:ext>
             </a:extLst>
           </p:cNvPr>
@@ -14638,7 +14713,7 @@
           <p:cNvPr id="15" name="CuadroTexto 14">
             <a:extLst>
               <a:ext uri="{FF2B5EF4-FFF2-40B4-BE49-F238E27FC236}">
-                <a16:creationId xmlns:a16="http://schemas.microsoft.com/office/drawing/2014/main" id="{26249480-6D14-AE71-F379-4A1CB9B0FB6A}"/>
+                <a16:creationId xmlns:a16="http://schemas.microsoft.com/office/drawing/2014/main" xmlns="" id="{26249480-6D14-AE71-F379-4A1CB9B0FB6A}"/>
               </a:ext>
             </a:extLst>
           </p:cNvPr>
@@ -14674,7 +14749,7 @@
           <p:cNvPr id="16" name="Flecha derecha 15">
             <a:extLst>
               <a:ext uri="{FF2B5EF4-FFF2-40B4-BE49-F238E27FC236}">
-                <a16:creationId xmlns:a16="http://schemas.microsoft.com/office/drawing/2014/main" id="{62954772-1625-EF19-2BAC-68CE884178B9}"/>
+                <a16:creationId xmlns:a16="http://schemas.microsoft.com/office/drawing/2014/main" xmlns="" id="{62954772-1625-EF19-2BAC-68CE884178B9}"/>
               </a:ext>
             </a:extLst>
           </p:cNvPr>
@@ -14733,7 +14808,7 @@
           <p:cNvPr id="17" name="CuadroTexto 16">
             <a:extLst>
               <a:ext uri="{FF2B5EF4-FFF2-40B4-BE49-F238E27FC236}">
-                <a16:creationId xmlns:a16="http://schemas.microsoft.com/office/drawing/2014/main" id="{E1CDFDDB-7E5D-6E3E-27C2-7E8EE2E518C9}"/>
+                <a16:creationId xmlns:a16="http://schemas.microsoft.com/office/drawing/2014/main" xmlns="" id="{E1CDFDDB-7E5D-6E3E-27C2-7E8EE2E518C9}"/>
               </a:ext>
             </a:extLst>
           </p:cNvPr>
@@ -14769,7 +14844,7 @@
           <p:cNvPr id="18" name="Rectángulo 17">
             <a:extLst>
               <a:ext uri="{FF2B5EF4-FFF2-40B4-BE49-F238E27FC236}">
-                <a16:creationId xmlns:a16="http://schemas.microsoft.com/office/drawing/2014/main" id="{DCEF6FE8-AAF3-5EC7-BC6E-E3BB192FB5F7}"/>
+                <a16:creationId xmlns:a16="http://schemas.microsoft.com/office/drawing/2014/main" xmlns="" id="{DCEF6FE8-AAF3-5EC7-BC6E-E3BB192FB5F7}"/>
               </a:ext>
             </a:extLst>
           </p:cNvPr>
@@ -14828,7 +14903,7 @@
           <p:cNvPr id="19" name="Flecha derecha 18">
             <a:extLst>
               <a:ext uri="{FF2B5EF4-FFF2-40B4-BE49-F238E27FC236}">
-                <a16:creationId xmlns:a16="http://schemas.microsoft.com/office/drawing/2014/main" id="{6230FD16-A48C-BBD5-4321-FADB474131CD}"/>
+                <a16:creationId xmlns:a16="http://schemas.microsoft.com/office/drawing/2014/main" xmlns="" id="{6230FD16-A48C-BBD5-4321-FADB474131CD}"/>
               </a:ext>
             </a:extLst>
           </p:cNvPr>
@@ -14884,7 +14959,7 @@
           <p:cNvPr id="20" name="CuadroTexto 19">
             <a:extLst>
               <a:ext uri="{FF2B5EF4-FFF2-40B4-BE49-F238E27FC236}">
-                <a16:creationId xmlns:a16="http://schemas.microsoft.com/office/drawing/2014/main" id="{F0F00401-3A7B-0F39-9BFB-C7E06BE23A3C}"/>
+                <a16:creationId xmlns:a16="http://schemas.microsoft.com/office/drawing/2014/main" xmlns="" id="{F0F00401-3A7B-0F39-9BFB-C7E06BE23A3C}"/>
               </a:ext>
             </a:extLst>
           </p:cNvPr>
@@ -14920,7 +14995,7 @@
           <p:cNvPr id="21" name="Rectángulo 20">
             <a:extLst>
               <a:ext uri="{FF2B5EF4-FFF2-40B4-BE49-F238E27FC236}">
-                <a16:creationId xmlns:a16="http://schemas.microsoft.com/office/drawing/2014/main" id="{46FDBD73-6A2A-EFE0-EF47-B0796D441DE6}"/>
+                <a16:creationId xmlns:a16="http://schemas.microsoft.com/office/drawing/2014/main" xmlns="" id="{46FDBD73-6A2A-EFE0-EF47-B0796D441DE6}"/>
               </a:ext>
             </a:extLst>
           </p:cNvPr>
@@ -14979,7 +15054,7 @@
           <p:cNvPr id="22" name="Flecha derecha 21">
             <a:extLst>
               <a:ext uri="{FF2B5EF4-FFF2-40B4-BE49-F238E27FC236}">
-                <a16:creationId xmlns:a16="http://schemas.microsoft.com/office/drawing/2014/main" id="{0192B4DE-5108-D4FD-2A5B-D40D412D7997}"/>
+                <a16:creationId xmlns:a16="http://schemas.microsoft.com/office/drawing/2014/main" xmlns="" id="{0192B4DE-5108-D4FD-2A5B-D40D412D7997}"/>
               </a:ext>
             </a:extLst>
           </p:cNvPr>
@@ -15038,7 +15113,7 @@
           <p:cNvPr id="23" name="CuadroTexto 22">
             <a:extLst>
               <a:ext uri="{FF2B5EF4-FFF2-40B4-BE49-F238E27FC236}">
-                <a16:creationId xmlns:a16="http://schemas.microsoft.com/office/drawing/2014/main" id="{E770A1F6-40AC-C1EC-99FC-8B7C06C900FB}"/>
+                <a16:creationId xmlns:a16="http://schemas.microsoft.com/office/drawing/2014/main" xmlns="" id="{E770A1F6-40AC-C1EC-99FC-8B7C06C900FB}"/>
               </a:ext>
             </a:extLst>
           </p:cNvPr>
@@ -15074,7 +15149,7 @@
           <p:cNvPr id="24" name="Rectángulo 23">
             <a:extLst>
               <a:ext uri="{FF2B5EF4-FFF2-40B4-BE49-F238E27FC236}">
-                <a16:creationId xmlns:a16="http://schemas.microsoft.com/office/drawing/2014/main" id="{72311D3D-9FF4-ED5E-29A7-CB4940044B82}"/>
+                <a16:creationId xmlns:a16="http://schemas.microsoft.com/office/drawing/2014/main" xmlns="" id="{72311D3D-9FF4-ED5E-29A7-CB4940044B82}"/>
               </a:ext>
             </a:extLst>
           </p:cNvPr>
@@ -15133,7 +15208,7 @@
           <p:cNvPr id="25" name="Flecha derecha 24">
             <a:extLst>
               <a:ext uri="{FF2B5EF4-FFF2-40B4-BE49-F238E27FC236}">
-                <a16:creationId xmlns:a16="http://schemas.microsoft.com/office/drawing/2014/main" id="{C2B0B9D0-EEF6-B7EB-0FE9-E03CEC9FCFE4}"/>
+                <a16:creationId xmlns:a16="http://schemas.microsoft.com/office/drawing/2014/main" xmlns="" id="{C2B0B9D0-EEF6-B7EB-0FE9-E03CEC9FCFE4}"/>
               </a:ext>
             </a:extLst>
           </p:cNvPr>
@@ -15189,7 +15264,7 @@
           <p:cNvPr id="26" name="CuadroTexto 25">
             <a:extLst>
               <a:ext uri="{FF2B5EF4-FFF2-40B4-BE49-F238E27FC236}">
-                <a16:creationId xmlns:a16="http://schemas.microsoft.com/office/drawing/2014/main" id="{C30522C0-91DB-2469-0E4C-51134671EA68}"/>
+                <a16:creationId xmlns:a16="http://schemas.microsoft.com/office/drawing/2014/main" xmlns="" id="{C30522C0-91DB-2469-0E4C-51134671EA68}"/>
               </a:ext>
             </a:extLst>
           </p:cNvPr>
@@ -15225,7 +15300,7 @@
           <p:cNvPr id="27" name="Flecha derecha 26">
             <a:extLst>
               <a:ext uri="{FF2B5EF4-FFF2-40B4-BE49-F238E27FC236}">
-                <a16:creationId xmlns:a16="http://schemas.microsoft.com/office/drawing/2014/main" id="{DDBDF0E1-617C-0C34-8C43-837F9FC05C5A}"/>
+                <a16:creationId xmlns:a16="http://schemas.microsoft.com/office/drawing/2014/main" xmlns="" id="{DDBDF0E1-617C-0C34-8C43-837F9FC05C5A}"/>
               </a:ext>
             </a:extLst>
           </p:cNvPr>
@@ -15284,7 +15359,7 @@
           <p:cNvPr id="28" name="CuadroTexto 27">
             <a:extLst>
               <a:ext uri="{FF2B5EF4-FFF2-40B4-BE49-F238E27FC236}">
-                <a16:creationId xmlns:a16="http://schemas.microsoft.com/office/drawing/2014/main" id="{1CAA5DF2-17CA-C661-8E60-38164713C04B}"/>
+                <a16:creationId xmlns:a16="http://schemas.microsoft.com/office/drawing/2014/main" xmlns="" id="{1CAA5DF2-17CA-C661-8E60-38164713C04B}"/>
               </a:ext>
             </a:extLst>
           </p:cNvPr>
@@ -15320,7 +15395,7 @@
           <p:cNvPr id="29" name="Rectángulo 28">
             <a:extLst>
               <a:ext uri="{FF2B5EF4-FFF2-40B4-BE49-F238E27FC236}">
-                <a16:creationId xmlns:a16="http://schemas.microsoft.com/office/drawing/2014/main" id="{45FD781D-0CD2-3649-04DF-B3FE549CD2C6}"/>
+                <a16:creationId xmlns:a16="http://schemas.microsoft.com/office/drawing/2014/main" xmlns="" id="{45FD781D-0CD2-3649-04DF-B3FE549CD2C6}"/>
               </a:ext>
             </a:extLst>
           </p:cNvPr>
@@ -15369,7 +15444,7 @@
           <p:cNvPr id="31" name="Rectángulo 30">
             <a:extLst>
               <a:ext uri="{FF2B5EF4-FFF2-40B4-BE49-F238E27FC236}">
-                <a16:creationId xmlns:a16="http://schemas.microsoft.com/office/drawing/2014/main" id="{CECFCCD5-3606-FC20-FACE-6AE86ED17B8F}"/>
+                <a16:creationId xmlns:a16="http://schemas.microsoft.com/office/drawing/2014/main" xmlns="" id="{CECFCCD5-3606-FC20-FACE-6AE86ED17B8F}"/>
               </a:ext>
             </a:extLst>
           </p:cNvPr>
@@ -15418,7 +15493,7 @@
           <p:cNvPr id="32" name="Rectángulo 31">
             <a:extLst>
               <a:ext uri="{FF2B5EF4-FFF2-40B4-BE49-F238E27FC236}">
-                <a16:creationId xmlns:a16="http://schemas.microsoft.com/office/drawing/2014/main" id="{A1A29D7E-8AC3-9469-1C48-86014810749C}"/>
+                <a16:creationId xmlns:a16="http://schemas.microsoft.com/office/drawing/2014/main" xmlns="" id="{A1A29D7E-8AC3-9469-1C48-86014810749C}"/>
               </a:ext>
             </a:extLst>
           </p:cNvPr>
@@ -15467,7 +15542,7 @@
           <p:cNvPr id="33" name="Rectángulo 32">
             <a:extLst>
               <a:ext uri="{FF2B5EF4-FFF2-40B4-BE49-F238E27FC236}">
-                <a16:creationId xmlns:a16="http://schemas.microsoft.com/office/drawing/2014/main" id="{5787B6DA-8437-4820-EE55-EE8DE0E9341A}"/>
+                <a16:creationId xmlns:a16="http://schemas.microsoft.com/office/drawing/2014/main" xmlns="" id="{5787B6DA-8437-4820-EE55-EE8DE0E9341A}"/>
               </a:ext>
             </a:extLst>
           </p:cNvPr>
@@ -15516,7 +15591,7 @@
           <p:cNvPr id="34" name="CuadroTexto 33">
             <a:extLst>
               <a:ext uri="{FF2B5EF4-FFF2-40B4-BE49-F238E27FC236}">
-                <a16:creationId xmlns:a16="http://schemas.microsoft.com/office/drawing/2014/main" id="{93D1646F-63F9-869F-27F2-E87963B327EE}"/>
+                <a16:creationId xmlns:a16="http://schemas.microsoft.com/office/drawing/2014/main" xmlns="" id="{93D1646F-63F9-869F-27F2-E87963B327EE}"/>
               </a:ext>
             </a:extLst>
           </p:cNvPr>
@@ -15552,7 +15627,7 @@
           <p:cNvPr id="36" name="Conector angular 35">
             <a:extLst>
               <a:ext uri="{FF2B5EF4-FFF2-40B4-BE49-F238E27FC236}">
-                <a16:creationId xmlns:a16="http://schemas.microsoft.com/office/drawing/2014/main" id="{9FB0A27D-E41A-33CC-8A40-2CB7CDCF9EC7}"/>
+                <a16:creationId xmlns:a16="http://schemas.microsoft.com/office/drawing/2014/main" xmlns="" id="{9FB0A27D-E41A-33CC-8A40-2CB7CDCF9EC7}"/>
               </a:ext>
             </a:extLst>
           </p:cNvPr>
@@ -15593,7 +15668,7 @@
           <p:cNvPr id="37" name="Flecha derecha 36">
             <a:extLst>
               <a:ext uri="{FF2B5EF4-FFF2-40B4-BE49-F238E27FC236}">
-                <a16:creationId xmlns:a16="http://schemas.microsoft.com/office/drawing/2014/main" id="{D86C5218-4081-7CF8-B11D-D164A0556C9B}"/>
+                <a16:creationId xmlns:a16="http://schemas.microsoft.com/office/drawing/2014/main" xmlns="" id="{D86C5218-4081-7CF8-B11D-D164A0556C9B}"/>
               </a:ext>
             </a:extLst>
           </p:cNvPr>
@@ -15649,7 +15724,7 @@
           <p:cNvPr id="38" name="CuadroTexto 37">
             <a:extLst>
               <a:ext uri="{FF2B5EF4-FFF2-40B4-BE49-F238E27FC236}">
-                <a16:creationId xmlns:a16="http://schemas.microsoft.com/office/drawing/2014/main" id="{65AD267C-1F8B-90F5-C8DF-11C29BA5BE4C}"/>
+                <a16:creationId xmlns:a16="http://schemas.microsoft.com/office/drawing/2014/main" xmlns="" id="{65AD267C-1F8B-90F5-C8DF-11C29BA5BE4C}"/>
               </a:ext>
             </a:extLst>
           </p:cNvPr>
@@ -15685,7 +15760,7 @@
           <p:cNvPr id="39" name="Rectángulo 38">
             <a:extLst>
               <a:ext uri="{FF2B5EF4-FFF2-40B4-BE49-F238E27FC236}">
-                <a16:creationId xmlns:a16="http://schemas.microsoft.com/office/drawing/2014/main" id="{E814E3A3-76C0-A2A7-E534-65A5B6583CA6}"/>
+                <a16:creationId xmlns:a16="http://schemas.microsoft.com/office/drawing/2014/main" xmlns="" id="{E814E3A3-76C0-A2A7-E534-65A5B6583CA6}"/>
               </a:ext>
             </a:extLst>
           </p:cNvPr>
@@ -15744,7 +15819,7 @@
           <p:cNvPr id="40" name="Flecha derecha 39">
             <a:extLst>
               <a:ext uri="{FF2B5EF4-FFF2-40B4-BE49-F238E27FC236}">
-                <a16:creationId xmlns:a16="http://schemas.microsoft.com/office/drawing/2014/main" id="{6D0F1B2C-00A1-8E4C-9CD6-0D715070266A}"/>
+                <a16:creationId xmlns:a16="http://schemas.microsoft.com/office/drawing/2014/main" xmlns="" id="{6D0F1B2C-00A1-8E4C-9CD6-0D715070266A}"/>
               </a:ext>
             </a:extLst>
           </p:cNvPr>
@@ -15800,7 +15875,7 @@
           <p:cNvPr id="41" name="CuadroTexto 40">
             <a:extLst>
               <a:ext uri="{FF2B5EF4-FFF2-40B4-BE49-F238E27FC236}">
-                <a16:creationId xmlns:a16="http://schemas.microsoft.com/office/drawing/2014/main" id="{497622AA-D9D5-29BB-824F-0CAF2BA21A3D}"/>
+                <a16:creationId xmlns:a16="http://schemas.microsoft.com/office/drawing/2014/main" xmlns="" id="{497622AA-D9D5-29BB-824F-0CAF2BA21A3D}"/>
               </a:ext>
             </a:extLst>
           </p:cNvPr>
@@ -15836,7 +15911,7 @@
           <p:cNvPr id="42" name="Rectángulo 41">
             <a:extLst>
               <a:ext uri="{FF2B5EF4-FFF2-40B4-BE49-F238E27FC236}">
-                <a16:creationId xmlns:a16="http://schemas.microsoft.com/office/drawing/2014/main" id="{7301A2E0-EA14-8668-EC12-1F195ADF19DD}"/>
+                <a16:creationId xmlns:a16="http://schemas.microsoft.com/office/drawing/2014/main" xmlns="" id="{7301A2E0-EA14-8668-EC12-1F195ADF19DD}"/>
               </a:ext>
             </a:extLst>
           </p:cNvPr>
@@ -15885,7 +15960,7 @@
           <p:cNvPr id="43" name="CuadroTexto 42">
             <a:extLst>
               <a:ext uri="{FF2B5EF4-FFF2-40B4-BE49-F238E27FC236}">
-                <a16:creationId xmlns:a16="http://schemas.microsoft.com/office/drawing/2014/main" id="{C18868E3-E398-DFBC-EDB5-7EF403BA7F3D}"/>
+                <a16:creationId xmlns:a16="http://schemas.microsoft.com/office/drawing/2014/main" xmlns="" id="{C18868E3-E398-DFBC-EDB5-7EF403BA7F3D}"/>
               </a:ext>
             </a:extLst>
           </p:cNvPr>
@@ -15920,7 +15995,7 @@
           <p:cNvPr id="44" name="Rectángulo 43">
             <a:extLst>
               <a:ext uri="{FF2B5EF4-FFF2-40B4-BE49-F238E27FC236}">
-                <a16:creationId xmlns:a16="http://schemas.microsoft.com/office/drawing/2014/main" id="{3D07F28F-4A6B-14C0-FA12-E6646C29DB8B}"/>
+                <a16:creationId xmlns:a16="http://schemas.microsoft.com/office/drawing/2014/main" xmlns="" id="{3D07F28F-4A6B-14C0-FA12-E6646C29DB8B}"/>
               </a:ext>
             </a:extLst>
           </p:cNvPr>
@@ -15979,7 +16054,7 @@
           <p:cNvPr id="45" name="Flecha derecha 44">
             <a:extLst>
               <a:ext uri="{FF2B5EF4-FFF2-40B4-BE49-F238E27FC236}">
-                <a16:creationId xmlns:a16="http://schemas.microsoft.com/office/drawing/2014/main" id="{0EE6CC89-2313-5D7D-A2C9-6DD0151AEFF3}"/>
+                <a16:creationId xmlns:a16="http://schemas.microsoft.com/office/drawing/2014/main" xmlns="" id="{0EE6CC89-2313-5D7D-A2C9-6DD0151AEFF3}"/>
               </a:ext>
             </a:extLst>
           </p:cNvPr>
@@ -16035,7 +16110,7 @@
           <p:cNvPr id="46" name="CuadroTexto 45">
             <a:extLst>
               <a:ext uri="{FF2B5EF4-FFF2-40B4-BE49-F238E27FC236}">
-                <a16:creationId xmlns:a16="http://schemas.microsoft.com/office/drawing/2014/main" id="{75E30002-B72B-E593-9F95-876CE6B255BE}"/>
+                <a16:creationId xmlns:a16="http://schemas.microsoft.com/office/drawing/2014/main" xmlns="" id="{75E30002-B72B-E593-9F95-876CE6B255BE}"/>
               </a:ext>
             </a:extLst>
           </p:cNvPr>
@@ -16071,7 +16146,7 @@
           <p:cNvPr id="47" name="Flecha doblada hacia arriba 46">
             <a:extLst>
               <a:ext uri="{FF2B5EF4-FFF2-40B4-BE49-F238E27FC236}">
-                <a16:creationId xmlns:a16="http://schemas.microsoft.com/office/drawing/2014/main" id="{9139217A-98CE-9452-1996-4675FE76E8D7}"/>
+                <a16:creationId xmlns:a16="http://schemas.microsoft.com/office/drawing/2014/main" xmlns="" id="{9139217A-98CE-9452-1996-4675FE76E8D7}"/>
               </a:ext>
             </a:extLst>
           </p:cNvPr>
@@ -16121,7 +16196,7 @@
           <p:cNvPr id="48" name="CuadroTexto 47">
             <a:extLst>
               <a:ext uri="{FF2B5EF4-FFF2-40B4-BE49-F238E27FC236}">
-                <a16:creationId xmlns:a16="http://schemas.microsoft.com/office/drawing/2014/main" id="{3BDD3AAE-5583-F740-728D-A0CB4BD59249}"/>
+                <a16:creationId xmlns:a16="http://schemas.microsoft.com/office/drawing/2014/main" xmlns="" id="{3BDD3AAE-5583-F740-728D-A0CB4BD59249}"/>
               </a:ext>
             </a:extLst>
           </p:cNvPr>
@@ -16208,7 +16283,7 @@
     </a:clrScheme>
     <a:fontScheme name="Office">
       <a:majorFont>
-        <a:latin typeface="Calibri Light" panose="020F0302020204030204"/>
+        <a:latin typeface="Calibri Light"/>
         <a:ea typeface=""/>
         <a:cs typeface=""/>
         <a:font script="Jpan" typeface="游ゴシック Light"/>
@@ -16260,7 +16335,7 @@
         <a:font script="Tfng" typeface="Ebrima"/>
       </a:majorFont>
       <a:minorFont>
-        <a:latin typeface="Calibri" panose="020F0502020204030204"/>
+        <a:latin typeface="Calibri"/>
         <a:ea typeface=""/>
         <a:cs typeface=""/>
         <a:font script="Jpan" typeface="游ゴシック"/>
@@ -16454,7 +16529,7 @@
   <a:extraClrSchemeLst/>
   <a:extLst>
     <a:ext uri="{05A4C25C-085E-4340-85A3-A5531E510DB2}">
-      <thm15:themeFamily xmlns:thm15="http://schemas.microsoft.com/office/thememl/2012/main" name="Office Theme" id="{62F939B6-93AF-4DB8-9C6B-D6C7DFDC589F}" vid="{4A3C46E8-61CC-4603-A589-7422A47A8E4A}"/>
+      <thm15:themeFamily xmlns:thm15="http://schemas.microsoft.com/office/thememl/2012/main" xmlns="" name="Office Theme" id="{62F939B6-93AF-4DB8-9C6B-D6C7DFDC589F}" vid="{4A3C46E8-61CC-4603-A589-7422A47A8E4A}"/>
     </a:ext>
   </a:extLst>
 </a:theme>

</xml_diff>